<commit_message>
Added figure for the architecture.
</commit_message>
<xml_diff>
--- a/docs/design/figures/fs-design.pptx
+++ b/docs/design/figures/fs-design.pptx
@@ -9,6 +9,8 @@
     <p:sldId id="257" r:id="rId3"/>
     <p:sldId id="258" r:id="rId4"/>
     <p:sldId id="259" r:id="rId5"/>
+    <p:sldId id="260" r:id="rId6"/>
+    <p:sldId id="261" r:id="rId7"/>
   </p:sldIdLst>
   <p:sldSz cx="6858000" cy="4572000"/>
   <p:notesSz cx="9144000" cy="6858000"/>
@@ -246,7 +248,7 @@
           <a:p>
             <a:fld id="{305C3DB1-8177-46AD-AF81-2EEE95D844A8}" type="datetimeFigureOut">
               <a:rPr lang="en-US" smtClean="0"/>
-              <a:t>3/2/2017</a:t>
+              <a:t>3/3/2017</a:t>
             </a:fld>
             <a:endParaRPr lang="en-US"/>
           </a:p>
@@ -416,7 +418,7 @@
           <a:p>
             <a:fld id="{305C3DB1-8177-46AD-AF81-2EEE95D844A8}" type="datetimeFigureOut">
               <a:rPr lang="en-US" smtClean="0"/>
-              <a:t>3/2/2017</a:t>
+              <a:t>3/3/2017</a:t>
             </a:fld>
             <a:endParaRPr lang="en-US"/>
           </a:p>
@@ -596,7 +598,7 @@
           <a:p>
             <a:fld id="{305C3DB1-8177-46AD-AF81-2EEE95D844A8}" type="datetimeFigureOut">
               <a:rPr lang="en-US" smtClean="0"/>
-              <a:t>3/2/2017</a:t>
+              <a:t>3/3/2017</a:t>
             </a:fld>
             <a:endParaRPr lang="en-US"/>
           </a:p>
@@ -766,7 +768,7 @@
           <a:p>
             <a:fld id="{305C3DB1-8177-46AD-AF81-2EEE95D844A8}" type="datetimeFigureOut">
               <a:rPr lang="en-US" smtClean="0"/>
-              <a:t>3/2/2017</a:t>
+              <a:t>3/3/2017</a:t>
             </a:fld>
             <a:endParaRPr lang="en-US"/>
           </a:p>
@@ -1010,7 +1012,7 @@
           <a:p>
             <a:fld id="{305C3DB1-8177-46AD-AF81-2EEE95D844A8}" type="datetimeFigureOut">
               <a:rPr lang="en-US" smtClean="0"/>
-              <a:t>3/2/2017</a:t>
+              <a:t>3/3/2017</a:t>
             </a:fld>
             <a:endParaRPr lang="en-US"/>
           </a:p>
@@ -1242,7 +1244,7 @@
           <a:p>
             <a:fld id="{305C3DB1-8177-46AD-AF81-2EEE95D844A8}" type="datetimeFigureOut">
               <a:rPr lang="en-US" smtClean="0"/>
-              <a:t>3/2/2017</a:t>
+              <a:t>3/3/2017</a:t>
             </a:fld>
             <a:endParaRPr lang="en-US"/>
           </a:p>
@@ -1609,7 +1611,7 @@
           <a:p>
             <a:fld id="{305C3DB1-8177-46AD-AF81-2EEE95D844A8}" type="datetimeFigureOut">
               <a:rPr lang="en-US" smtClean="0"/>
-              <a:t>3/2/2017</a:t>
+              <a:t>3/3/2017</a:t>
             </a:fld>
             <a:endParaRPr lang="en-US"/>
           </a:p>
@@ -1727,7 +1729,7 @@
           <a:p>
             <a:fld id="{305C3DB1-8177-46AD-AF81-2EEE95D844A8}" type="datetimeFigureOut">
               <a:rPr lang="en-US" smtClean="0"/>
-              <a:t>3/2/2017</a:t>
+              <a:t>3/3/2017</a:t>
             </a:fld>
             <a:endParaRPr lang="en-US"/>
           </a:p>
@@ -1822,7 +1824,7 @@
           <a:p>
             <a:fld id="{305C3DB1-8177-46AD-AF81-2EEE95D844A8}" type="datetimeFigureOut">
               <a:rPr lang="en-US" smtClean="0"/>
-              <a:t>3/2/2017</a:t>
+              <a:t>3/3/2017</a:t>
             </a:fld>
             <a:endParaRPr lang="en-US"/>
           </a:p>
@@ -2099,7 +2101,7 @@
           <a:p>
             <a:fld id="{305C3DB1-8177-46AD-AF81-2EEE95D844A8}" type="datetimeFigureOut">
               <a:rPr lang="en-US" smtClean="0"/>
-              <a:t>3/2/2017</a:t>
+              <a:t>3/3/2017</a:t>
             </a:fld>
             <a:endParaRPr lang="en-US"/>
           </a:p>
@@ -2356,7 +2358,7 @@
           <a:p>
             <a:fld id="{305C3DB1-8177-46AD-AF81-2EEE95D844A8}" type="datetimeFigureOut">
               <a:rPr lang="en-US" smtClean="0"/>
-              <a:t>3/2/2017</a:t>
+              <a:t>3/3/2017</a:t>
             </a:fld>
             <a:endParaRPr lang="en-US"/>
           </a:p>
@@ -2569,7 +2571,7 @@
           <a:p>
             <a:fld id="{305C3DB1-8177-46AD-AF81-2EEE95D844A8}" type="datetimeFigureOut">
               <a:rPr lang="en-US" smtClean="0"/>
-              <a:t>3/2/2017</a:t>
+              <a:t>3/3/2017</a:t>
             </a:fld>
             <a:endParaRPr lang="en-US"/>
           </a:p>
@@ -3056,13 +3058,6 @@
                   </a:rPr>
                   <a:t>File name</a:t>
                 </a:r>
-                <a:endParaRPr lang="en-US" sz="1000" dirty="0">
-                  <a:solidFill>
-                    <a:schemeClr val="tx1"/>
-                  </a:solidFill>
-                  <a:latin typeface="Times New Roman" panose="02020603050405020304" pitchFamily="18" charset="0"/>
-                  <a:cs typeface="Times New Roman" panose="02020603050405020304" pitchFamily="18" charset="0"/>
-                </a:endParaRPr>
               </a:p>
             </p:txBody>
           </p:sp>
@@ -3120,13 +3115,6 @@
                   </a:rPr>
                   <a:t>File Directory</a:t>
                 </a:r>
-                <a:endParaRPr lang="en-US" sz="1000" b="1" dirty="0">
-                  <a:solidFill>
-                    <a:schemeClr val="tx1"/>
-                  </a:solidFill>
-                  <a:latin typeface="Times New Roman" panose="02020603050405020304" pitchFamily="18" charset="0"/>
-                  <a:cs typeface="Times New Roman" panose="02020603050405020304" pitchFamily="18" charset="0"/>
-                </a:endParaRPr>
               </a:p>
             </p:txBody>
           </p:sp>
@@ -3248,13 +3236,6 @@
                   </a:rPr>
                   <a:t>“/home/file1”</a:t>
                 </a:r>
-                <a:endParaRPr lang="en-US" sz="1000" dirty="0">
-                  <a:solidFill>
-                    <a:schemeClr val="tx1"/>
-                  </a:solidFill>
-                  <a:latin typeface="Times New Roman" panose="02020603050405020304" pitchFamily="18" charset="0"/>
-                  <a:cs typeface="Times New Roman" panose="02020603050405020304" pitchFamily="18" charset="0"/>
-                </a:endParaRPr>
               </a:p>
             </p:txBody>
           </p:sp>
@@ -3312,13 +3293,6 @@
                   </a:rPr>
                   <a:t>1</a:t>
                 </a:r>
-                <a:endParaRPr lang="en-US" sz="1000" dirty="0">
-                  <a:solidFill>
-                    <a:schemeClr val="tx1"/>
-                  </a:solidFill>
-                  <a:latin typeface="Times New Roman" panose="02020603050405020304" pitchFamily="18" charset="0"/>
-                  <a:cs typeface="Times New Roman" panose="02020603050405020304" pitchFamily="18" charset="0"/>
-                </a:endParaRPr>
               </a:p>
             </p:txBody>
           </p:sp>
@@ -3376,13 +3350,6 @@
                   </a:rPr>
                   <a:t>“/home/file2”</a:t>
                 </a:r>
-                <a:endParaRPr lang="en-US" sz="1000" dirty="0">
-                  <a:solidFill>
-                    <a:schemeClr val="tx1"/>
-                  </a:solidFill>
-                  <a:latin typeface="Times New Roman" panose="02020603050405020304" pitchFamily="18" charset="0"/>
-                  <a:cs typeface="Times New Roman" panose="02020603050405020304" pitchFamily="18" charset="0"/>
-                </a:endParaRPr>
               </a:p>
             </p:txBody>
           </p:sp>
@@ -3440,13 +3407,6 @@
                   </a:rPr>
                   <a:t>2</a:t>
                 </a:r>
-                <a:endParaRPr lang="en-US" sz="1000" dirty="0">
-                  <a:solidFill>
-                    <a:schemeClr val="tx1"/>
-                  </a:solidFill>
-                  <a:latin typeface="Times New Roman" panose="02020603050405020304" pitchFamily="18" charset="0"/>
-                  <a:cs typeface="Times New Roman" panose="02020603050405020304" pitchFamily="18" charset="0"/>
-                </a:endParaRPr>
               </a:p>
             </p:txBody>
           </p:sp>
@@ -3504,13 +3464,6 @@
                   </a:rPr>
                   <a:t>…</a:t>
                 </a:r>
-                <a:endParaRPr lang="en-US" sz="1000" dirty="0">
-                  <a:solidFill>
-                    <a:schemeClr val="tx1"/>
-                  </a:solidFill>
-                  <a:latin typeface="Times New Roman" panose="02020603050405020304" pitchFamily="18" charset="0"/>
-                  <a:cs typeface="Times New Roman" panose="02020603050405020304" pitchFamily="18" charset="0"/>
-                </a:endParaRPr>
               </a:p>
             </p:txBody>
           </p:sp>
@@ -3568,13 +3521,6 @@
                   </a:rPr>
                   <a:t>…</a:t>
                 </a:r>
-                <a:endParaRPr lang="en-US" sz="1000" dirty="0">
-                  <a:solidFill>
-                    <a:schemeClr val="tx1"/>
-                  </a:solidFill>
-                  <a:latin typeface="Times New Roman" panose="02020603050405020304" pitchFamily="18" charset="0"/>
-                  <a:cs typeface="Times New Roman" panose="02020603050405020304" pitchFamily="18" charset="0"/>
-                </a:endParaRPr>
               </a:p>
             </p:txBody>
           </p:sp>
@@ -3688,13 +3634,6 @@
                   </a:rPr>
                   <a:t>List of UUIDs, append times of N data blocks</a:t>
                 </a:r>
-                <a:endParaRPr lang="en-US" sz="1000" dirty="0">
-                  <a:solidFill>
-                    <a:schemeClr val="tx1"/>
-                  </a:solidFill>
-                  <a:latin typeface="Times New Roman" panose="02020603050405020304" pitchFamily="18" charset="0"/>
-                  <a:cs typeface="Times New Roman" panose="02020603050405020304" pitchFamily="18" charset="0"/>
-                </a:endParaRPr>
               </a:p>
             </p:txBody>
           </p:sp>
@@ -3752,13 +3691,6 @@
                   </a:rPr>
                   <a:t>Indirect Block</a:t>
                 </a:r>
-                <a:endParaRPr lang="en-US" sz="1000" b="1" dirty="0">
-                  <a:solidFill>
-                    <a:schemeClr val="tx1"/>
-                  </a:solidFill>
-                  <a:latin typeface="Times New Roman" panose="02020603050405020304" pitchFamily="18" charset="0"/>
-                  <a:cs typeface="Times New Roman" panose="02020603050405020304" pitchFamily="18" charset="0"/>
-                </a:endParaRPr>
               </a:p>
             </p:txBody>
           </p:sp>
@@ -3939,13 +3871,6 @@
                   </a:rPr>
                   <a:t>Data blocks</a:t>
                 </a:r>
-                <a:endParaRPr lang="en-US" sz="1000" dirty="0">
-                  <a:solidFill>
-                    <a:schemeClr val="tx1"/>
-                  </a:solidFill>
-                  <a:latin typeface="Times New Roman" panose="02020603050405020304" pitchFamily="18" charset="0"/>
-                  <a:cs typeface="Times New Roman" panose="02020603050405020304" pitchFamily="18" charset="0"/>
-                </a:endParaRPr>
               </a:p>
             </p:txBody>
           </p:sp>
@@ -4126,13 +4051,6 @@
                   </a:rPr>
                   <a:t>Data blocks</a:t>
                 </a:r>
-                <a:endParaRPr lang="en-US" sz="1000" dirty="0">
-                  <a:solidFill>
-                    <a:schemeClr val="tx1"/>
-                  </a:solidFill>
-                  <a:latin typeface="Times New Roman" panose="02020603050405020304" pitchFamily="18" charset="0"/>
-                  <a:cs typeface="Times New Roman" panose="02020603050405020304" pitchFamily="18" charset="0"/>
-                </a:endParaRPr>
               </a:p>
             </p:txBody>
           </p:sp>
@@ -4326,13 +4244,6 @@
                   </a:rPr>
                   <a:t>N Indirect Blocks</a:t>
                 </a:r>
-                <a:endParaRPr lang="en-US" sz="1000" dirty="0">
-                  <a:solidFill>
-                    <a:schemeClr val="tx1"/>
-                  </a:solidFill>
-                  <a:latin typeface="Times New Roman" panose="02020603050405020304" pitchFamily="18" charset="0"/>
-                  <a:cs typeface="Times New Roman" panose="02020603050405020304" pitchFamily="18" charset="0"/>
-                </a:endParaRPr>
               </a:p>
             </p:txBody>
           </p:sp>
@@ -4390,13 +4301,6 @@
                   </a:rPr>
                   <a:t>Double Indirect Block</a:t>
                 </a:r>
-                <a:endParaRPr lang="en-US" sz="1000" b="1" dirty="0">
-                  <a:solidFill>
-                    <a:schemeClr val="tx1"/>
-                  </a:solidFill>
-                  <a:latin typeface="Times New Roman" panose="02020603050405020304" pitchFamily="18" charset="0"/>
-                  <a:cs typeface="Times New Roman" panose="02020603050405020304" pitchFamily="18" charset="0"/>
-                </a:endParaRPr>
               </a:p>
             </p:txBody>
           </p:sp>
@@ -4616,25 +4520,8 @@
                     <a:latin typeface="Times New Roman" panose="02020603050405020304" pitchFamily="18" charset="0"/>
                     <a:cs typeface="Times New Roman" panose="02020603050405020304" pitchFamily="18" charset="0"/>
                   </a:rPr>
-                  <a:t>Data </a:t>
+                  <a:t>Data blocks</a:t>
                 </a:r>
-                <a:r>
-                  <a:rPr lang="en-US" sz="1000" dirty="0">
-                    <a:solidFill>
-                      <a:schemeClr val="tx1"/>
-                    </a:solidFill>
-                    <a:latin typeface="Times New Roman" panose="02020603050405020304" pitchFamily="18" charset="0"/>
-                    <a:cs typeface="Times New Roman" panose="02020603050405020304" pitchFamily="18" charset="0"/>
-                  </a:rPr>
-                  <a:t>blocks</a:t>
-                </a:r>
-                <a:endParaRPr lang="en-US" sz="1000" dirty="0">
-                  <a:solidFill>
-                    <a:schemeClr val="tx1"/>
-                  </a:solidFill>
-                  <a:latin typeface="Times New Roman" panose="02020603050405020304" pitchFamily="18" charset="0"/>
-                  <a:cs typeface="Times New Roman" panose="02020603050405020304" pitchFamily="18" charset="0"/>
-                </a:endParaRPr>
               </a:p>
             </p:txBody>
           </p:sp>
@@ -4721,13 +4608,6 @@
                     </a:rPr>
                     <a:t>N data blocks</a:t>
                   </a:r>
-                  <a:endParaRPr lang="en-US" sz="1000" dirty="0">
-                    <a:solidFill>
-                      <a:schemeClr val="tx1"/>
-                    </a:solidFill>
-                    <a:latin typeface="Times New Roman" panose="02020603050405020304" pitchFamily="18" charset="0"/>
-                    <a:cs typeface="Times New Roman" panose="02020603050405020304" pitchFamily="18" charset="0"/>
-                  </a:endParaRPr>
                 </a:p>
               </p:txBody>
             </p:sp>
@@ -4785,13 +4665,6 @@
                     </a:rPr>
                     <a:t>Indirect Block</a:t>
                   </a:r>
-                  <a:endParaRPr lang="en-US" sz="1000" b="1" dirty="0">
-                    <a:solidFill>
-                      <a:schemeClr val="tx1"/>
-                    </a:solidFill>
-                    <a:latin typeface="Times New Roman" panose="02020603050405020304" pitchFamily="18" charset="0"/>
-                    <a:cs typeface="Times New Roman" panose="02020603050405020304" pitchFamily="18" charset="0"/>
-                  </a:endParaRPr>
                 </a:p>
               </p:txBody>
             </p:sp>
@@ -4864,13 +4737,6 @@
                     </a:rPr>
                     <a:t>N data blocks</a:t>
                   </a:r>
-                  <a:endParaRPr lang="en-US" sz="1000" dirty="0">
-                    <a:solidFill>
-                      <a:schemeClr val="tx1"/>
-                    </a:solidFill>
-                    <a:latin typeface="Times New Roman" panose="02020603050405020304" pitchFamily="18" charset="0"/>
-                    <a:cs typeface="Times New Roman" panose="02020603050405020304" pitchFamily="18" charset="0"/>
-                  </a:endParaRPr>
                 </a:p>
               </p:txBody>
             </p:sp>
@@ -4928,13 +4794,6 @@
                     </a:rPr>
                     <a:t>Indirect Block</a:t>
                   </a:r>
-                  <a:endParaRPr lang="en-US" sz="1000" b="1" dirty="0">
-                    <a:solidFill>
-                      <a:schemeClr val="tx1"/>
-                    </a:solidFill>
-                    <a:latin typeface="Times New Roman" panose="02020603050405020304" pitchFamily="18" charset="0"/>
-                    <a:cs typeface="Times New Roman" panose="02020603050405020304" pitchFamily="18" charset="0"/>
-                  </a:endParaRPr>
                 </a:p>
               </p:txBody>
             </p:sp>
@@ -5007,13 +4866,6 @@
                     </a:rPr>
                     <a:t>N data blocks</a:t>
                   </a:r>
-                  <a:endParaRPr lang="en-US" sz="1000" dirty="0">
-                    <a:solidFill>
-                      <a:schemeClr val="tx1"/>
-                    </a:solidFill>
-                    <a:latin typeface="Times New Roman" panose="02020603050405020304" pitchFamily="18" charset="0"/>
-                    <a:cs typeface="Times New Roman" panose="02020603050405020304" pitchFamily="18" charset="0"/>
-                  </a:endParaRPr>
                 </a:p>
               </p:txBody>
             </p:sp>
@@ -5071,13 +4923,6 @@
                     </a:rPr>
                     <a:t>Indirect Block</a:t>
                   </a:r>
-                  <a:endParaRPr lang="en-US" sz="1000" b="1" dirty="0">
-                    <a:solidFill>
-                      <a:schemeClr val="tx1"/>
-                    </a:solidFill>
-                    <a:latin typeface="Times New Roman" panose="02020603050405020304" pitchFamily="18" charset="0"/>
-                    <a:cs typeface="Times New Roman" panose="02020603050405020304" pitchFamily="18" charset="0"/>
-                  </a:endParaRPr>
                 </a:p>
               </p:txBody>
             </p:sp>
@@ -5254,13 +5099,6 @@
                   </a:rPr>
                   <a:t>Index Node</a:t>
                 </a:r>
-                <a:endParaRPr lang="en-US" sz="1000" b="1" dirty="0">
-                  <a:solidFill>
-                    <a:schemeClr val="tx1"/>
-                  </a:solidFill>
-                  <a:latin typeface="Times New Roman" panose="02020603050405020304" pitchFamily="18" charset="0"/>
-                  <a:cs typeface="Times New Roman" panose="02020603050405020304" pitchFamily="18" charset="0"/>
-                </a:endParaRPr>
               </a:p>
             </p:txBody>
           </p:sp>
@@ -5318,13 +5156,6 @@
                   </a:rPr>
                   <a:t>File metadata (e.g., creation time)</a:t>
                 </a:r>
-                <a:endParaRPr lang="en-US" sz="1000" dirty="0">
-                  <a:solidFill>
-                    <a:schemeClr val="tx1"/>
-                  </a:solidFill>
-                  <a:latin typeface="Times New Roman" panose="02020603050405020304" pitchFamily="18" charset="0"/>
-                  <a:cs typeface="Times New Roman" panose="02020603050405020304" pitchFamily="18" charset="0"/>
-                </a:endParaRPr>
               </a:p>
             </p:txBody>
           </p:sp>
@@ -5382,13 +5213,6 @@
                   </a:rPr>
                   <a:t>List of UUIDs, first and last append time of first N data blocks</a:t>
                 </a:r>
-                <a:endParaRPr lang="en-US" sz="1000" dirty="0">
-                  <a:solidFill>
-                    <a:schemeClr val="tx1"/>
-                  </a:solidFill>
-                  <a:latin typeface="Times New Roman" panose="02020603050405020304" pitchFamily="18" charset="0"/>
-                  <a:cs typeface="Times New Roman" panose="02020603050405020304" pitchFamily="18" charset="0"/>
-                </a:endParaRPr>
               </a:p>
             </p:txBody>
           </p:sp>
@@ -5446,13 +5270,6 @@
                   </a:rPr>
                   <a:t>UUID, first and last append time of an indirect block</a:t>
                 </a:r>
-                <a:endParaRPr lang="en-US" sz="1000" dirty="0">
-                  <a:solidFill>
-                    <a:schemeClr val="tx1"/>
-                  </a:solidFill>
-                  <a:latin typeface="Times New Roman" panose="02020603050405020304" pitchFamily="18" charset="0"/>
-                  <a:cs typeface="Times New Roman" panose="02020603050405020304" pitchFamily="18" charset="0"/>
-                </a:endParaRPr>
               </a:p>
             </p:txBody>
           </p:sp>
@@ -5510,13 +5327,6 @@
                   </a:rPr>
                   <a:t>UUID of a double Indirect Block</a:t>
                 </a:r>
-                <a:endParaRPr lang="en-US" sz="1000" dirty="0">
-                  <a:solidFill>
-                    <a:schemeClr val="tx1"/>
-                  </a:solidFill>
-                  <a:latin typeface="Times New Roman" panose="02020603050405020304" pitchFamily="18" charset="0"/>
-                  <a:cs typeface="Times New Roman" panose="02020603050405020304" pitchFamily="18" charset="0"/>
-                </a:endParaRPr>
               </a:p>
             </p:txBody>
           </p:sp>
@@ -5574,13 +5384,6 @@
                   </a:rPr>
                   <a:t>UUID of a triple double Indirect Block</a:t>
                 </a:r>
-                <a:endParaRPr lang="en-US" sz="1000" dirty="0">
-                  <a:solidFill>
-                    <a:schemeClr val="tx1"/>
-                  </a:solidFill>
-                  <a:latin typeface="Times New Roman" panose="02020603050405020304" pitchFamily="18" charset="0"/>
-                  <a:cs typeface="Times New Roman" panose="02020603050405020304" pitchFamily="18" charset="0"/>
-                </a:endParaRPr>
               </a:p>
             </p:txBody>
           </p:sp>
@@ -5707,13 +5510,6 @@
                     </a:rPr>
                     <a:t>N data blocks</a:t>
                   </a:r>
-                  <a:endParaRPr lang="en-US" sz="1000" dirty="0">
-                    <a:solidFill>
-                      <a:schemeClr val="tx1"/>
-                    </a:solidFill>
-                    <a:latin typeface="Times New Roman" panose="02020603050405020304" pitchFamily="18" charset="0"/>
-                    <a:cs typeface="Times New Roman" panose="02020603050405020304" pitchFamily="18" charset="0"/>
-                  </a:endParaRPr>
                 </a:p>
               </p:txBody>
             </p:sp>
@@ -5771,13 +5567,6 @@
                     </a:rPr>
                     <a:t>Indirect Block</a:t>
                   </a:r>
-                  <a:endParaRPr lang="en-US" sz="1000" b="1" dirty="0">
-                    <a:solidFill>
-                      <a:schemeClr val="tx1"/>
-                    </a:solidFill>
-                    <a:latin typeface="Times New Roman" panose="02020603050405020304" pitchFamily="18" charset="0"/>
-                    <a:cs typeface="Times New Roman" panose="02020603050405020304" pitchFamily="18" charset="0"/>
-                  </a:endParaRPr>
                 </a:p>
               </p:txBody>
             </p:sp>
@@ -5850,13 +5639,6 @@
                     </a:rPr>
                     <a:t>N data blocks</a:t>
                   </a:r>
-                  <a:endParaRPr lang="en-US" sz="1000" dirty="0">
-                    <a:solidFill>
-                      <a:schemeClr val="tx1"/>
-                    </a:solidFill>
-                    <a:latin typeface="Times New Roman" panose="02020603050405020304" pitchFamily="18" charset="0"/>
-                    <a:cs typeface="Times New Roman" panose="02020603050405020304" pitchFamily="18" charset="0"/>
-                  </a:endParaRPr>
                 </a:p>
               </p:txBody>
             </p:sp>
@@ -5914,13 +5696,6 @@
                     </a:rPr>
                     <a:t>Indirect Block</a:t>
                   </a:r>
-                  <a:endParaRPr lang="en-US" sz="1000" b="1" dirty="0">
-                    <a:solidFill>
-                      <a:schemeClr val="tx1"/>
-                    </a:solidFill>
-                    <a:latin typeface="Times New Roman" panose="02020603050405020304" pitchFamily="18" charset="0"/>
-                    <a:cs typeface="Times New Roman" panose="02020603050405020304" pitchFamily="18" charset="0"/>
-                  </a:endParaRPr>
                 </a:p>
               </p:txBody>
             </p:sp>
@@ -5993,13 +5768,6 @@
                     </a:rPr>
                     <a:t>N data blocks</a:t>
                   </a:r>
-                  <a:endParaRPr lang="en-US" sz="1000" dirty="0">
-                    <a:solidFill>
-                      <a:schemeClr val="tx1"/>
-                    </a:solidFill>
-                    <a:latin typeface="Times New Roman" panose="02020603050405020304" pitchFamily="18" charset="0"/>
-                    <a:cs typeface="Times New Roman" panose="02020603050405020304" pitchFamily="18" charset="0"/>
-                  </a:endParaRPr>
                 </a:p>
               </p:txBody>
             </p:sp>
@@ -6057,13 +5825,6 @@
                     </a:rPr>
                     <a:t>Indirect Block</a:t>
                   </a:r>
-                  <a:endParaRPr lang="en-US" sz="1000" b="1" dirty="0">
-                    <a:solidFill>
-                      <a:schemeClr val="tx1"/>
-                    </a:solidFill>
-                    <a:latin typeface="Times New Roman" panose="02020603050405020304" pitchFamily="18" charset="0"/>
-                    <a:cs typeface="Times New Roman" panose="02020603050405020304" pitchFamily="18" charset="0"/>
-                  </a:endParaRPr>
                 </a:p>
               </p:txBody>
             </p:sp>
@@ -6243,25 +6004,8 @@
                     <a:latin typeface="Times New Roman" panose="02020603050405020304" pitchFamily="18" charset="0"/>
                     <a:cs typeface="Times New Roman" panose="02020603050405020304" pitchFamily="18" charset="0"/>
                   </a:rPr>
-                  <a:t>Data </a:t>
+                  <a:t>Data blocks</a:t>
                 </a:r>
-                <a:r>
-                  <a:rPr lang="en-US" sz="1000" dirty="0">
-                    <a:solidFill>
-                      <a:schemeClr val="tx1"/>
-                    </a:solidFill>
-                    <a:latin typeface="Times New Roman" panose="02020603050405020304" pitchFamily="18" charset="0"/>
-                    <a:cs typeface="Times New Roman" panose="02020603050405020304" pitchFamily="18" charset="0"/>
-                  </a:rPr>
-                  <a:t>blocks</a:t>
-                </a:r>
-                <a:endParaRPr lang="en-US" sz="1000" dirty="0">
-                  <a:solidFill>
-                    <a:schemeClr val="tx1"/>
-                  </a:solidFill>
-                  <a:latin typeface="Times New Roman" panose="02020603050405020304" pitchFamily="18" charset="0"/>
-                  <a:cs typeface="Times New Roman" panose="02020603050405020304" pitchFamily="18" charset="0"/>
-                </a:endParaRPr>
               </a:p>
             </p:txBody>
           </p:sp>
@@ -6334,13 +6078,6 @@
                   </a:rPr>
                   <a:t>N Indirect Blocks</a:t>
                 </a:r>
-                <a:endParaRPr lang="en-US" sz="1000" dirty="0">
-                  <a:solidFill>
-                    <a:schemeClr val="tx1"/>
-                  </a:solidFill>
-                  <a:latin typeface="Times New Roman" panose="02020603050405020304" pitchFamily="18" charset="0"/>
-                  <a:cs typeface="Times New Roman" panose="02020603050405020304" pitchFamily="18" charset="0"/>
-                </a:endParaRPr>
               </a:p>
             </p:txBody>
           </p:sp>
@@ -6398,13 +6135,6 @@
                   </a:rPr>
                   <a:t>Double Indirect Block</a:t>
                 </a:r>
-                <a:endParaRPr lang="en-US" sz="1000" b="1" dirty="0">
-                  <a:solidFill>
-                    <a:schemeClr val="tx1"/>
-                  </a:solidFill>
-                  <a:latin typeface="Times New Roman" panose="02020603050405020304" pitchFamily="18" charset="0"/>
-                  <a:cs typeface="Times New Roman" panose="02020603050405020304" pitchFamily="18" charset="0"/>
-                </a:endParaRPr>
               </a:p>
             </p:txBody>
           </p:sp>
@@ -6462,13 +6192,6 @@
                   </a:rPr>
                   <a:t>N Indirect Blocks</a:t>
                 </a:r>
-                <a:endParaRPr lang="en-US" sz="1000" dirty="0">
-                  <a:solidFill>
-                    <a:schemeClr val="tx1"/>
-                  </a:solidFill>
-                  <a:latin typeface="Times New Roman" panose="02020603050405020304" pitchFamily="18" charset="0"/>
-                  <a:cs typeface="Times New Roman" panose="02020603050405020304" pitchFamily="18" charset="0"/>
-                </a:endParaRPr>
               </a:p>
             </p:txBody>
           </p:sp>
@@ -6526,13 +6249,6 @@
                   </a:rPr>
                   <a:t>Double Indirect Block</a:t>
                 </a:r>
-                <a:endParaRPr lang="en-US" sz="1000" b="1" dirty="0">
-                  <a:solidFill>
-                    <a:schemeClr val="tx1"/>
-                  </a:solidFill>
-                  <a:latin typeface="Times New Roman" panose="02020603050405020304" pitchFamily="18" charset="0"/>
-                  <a:cs typeface="Times New Roman" panose="02020603050405020304" pitchFamily="18" charset="0"/>
-                </a:endParaRPr>
               </a:p>
             </p:txBody>
           </p:sp>
@@ -6590,13 +6306,6 @@
                   </a:rPr>
                   <a:t>N indirect blocks</a:t>
                 </a:r>
-                <a:endParaRPr lang="en-US" sz="1000" dirty="0">
-                  <a:solidFill>
-                    <a:schemeClr val="tx1"/>
-                  </a:solidFill>
-                  <a:latin typeface="Times New Roman" panose="02020603050405020304" pitchFamily="18" charset="0"/>
-                  <a:cs typeface="Times New Roman" panose="02020603050405020304" pitchFamily="18" charset="0"/>
-                </a:endParaRPr>
               </a:p>
             </p:txBody>
           </p:sp>
@@ -6654,13 +6363,6 @@
                   </a:rPr>
                   <a:t>Double Indirect Block</a:t>
                 </a:r>
-                <a:endParaRPr lang="en-US" sz="1000" b="1" dirty="0">
-                  <a:solidFill>
-                    <a:schemeClr val="tx1"/>
-                  </a:solidFill>
-                  <a:latin typeface="Times New Roman" panose="02020603050405020304" pitchFamily="18" charset="0"/>
-                  <a:cs typeface="Times New Roman" panose="02020603050405020304" pitchFamily="18" charset="0"/>
-                </a:endParaRPr>
               </a:p>
             </p:txBody>
           </p:sp>
@@ -6733,13 +6435,6 @@
                   </a:rPr>
                   <a:t>N double indirect Blocks</a:t>
                 </a:r>
-                <a:endParaRPr lang="en-US" sz="1000" dirty="0">
-                  <a:solidFill>
-                    <a:schemeClr val="tx1"/>
-                  </a:solidFill>
-                  <a:latin typeface="Times New Roman" panose="02020603050405020304" pitchFamily="18" charset="0"/>
-                  <a:cs typeface="Times New Roman" panose="02020603050405020304" pitchFamily="18" charset="0"/>
-                </a:endParaRPr>
               </a:p>
             </p:txBody>
           </p:sp>
@@ -6797,13 +6492,6 @@
                   </a:rPr>
                   <a:t>Triple Indirect Block</a:t>
                 </a:r>
-                <a:endParaRPr lang="en-US" sz="1000" b="1" dirty="0">
-                  <a:solidFill>
-                    <a:schemeClr val="tx1"/>
-                  </a:solidFill>
-                  <a:latin typeface="Times New Roman" panose="02020603050405020304" pitchFamily="18" charset="0"/>
-                  <a:cs typeface="Times New Roman" panose="02020603050405020304" pitchFamily="18" charset="0"/>
-                </a:endParaRPr>
               </a:p>
             </p:txBody>
           </p:sp>
@@ -7052,13 +6740,6 @@
               </a:rPr>
               <a:t>1</a:t>
             </a:r>
-            <a:endParaRPr lang="en-US" sz="667" dirty="0">
-              <a:solidFill>
-                <a:schemeClr val="tx1"/>
-              </a:solidFill>
-              <a:latin typeface="Times New Roman" panose="02020603050405020304" pitchFamily="18" charset="0"/>
-              <a:cs typeface="Times New Roman" panose="02020603050405020304" pitchFamily="18" charset="0"/>
-            </a:endParaRPr>
           </a:p>
         </p:txBody>
       </p:sp>
@@ -7116,13 +6797,6 @@
               </a:rPr>
               <a:t>2</a:t>
             </a:r>
-            <a:endParaRPr lang="en-US" sz="667" dirty="0">
-              <a:solidFill>
-                <a:schemeClr val="tx1"/>
-              </a:solidFill>
-              <a:latin typeface="Times New Roman" panose="02020603050405020304" pitchFamily="18" charset="0"/>
-              <a:cs typeface="Times New Roman" panose="02020603050405020304" pitchFamily="18" charset="0"/>
-            </a:endParaRPr>
           </a:p>
         </p:txBody>
       </p:sp>
@@ -7180,13 +6854,6 @@
               </a:rPr>
               <a:t>…</a:t>
             </a:r>
-            <a:endParaRPr lang="en-US" sz="667" dirty="0">
-              <a:solidFill>
-                <a:schemeClr val="tx1"/>
-              </a:solidFill>
-              <a:latin typeface="Times New Roman" panose="02020603050405020304" pitchFamily="18" charset="0"/>
-              <a:cs typeface="Times New Roman" panose="02020603050405020304" pitchFamily="18" charset="0"/>
-            </a:endParaRPr>
           </a:p>
         </p:txBody>
       </p:sp>
@@ -7301,13 +6968,6 @@
               </a:rPr>
               <a:t>N+1</a:t>
             </a:r>
-            <a:endParaRPr lang="en-US" sz="667" dirty="0">
-              <a:solidFill>
-                <a:schemeClr val="tx1"/>
-              </a:solidFill>
-              <a:latin typeface="Times New Roman" panose="02020603050405020304" pitchFamily="18" charset="0"/>
-              <a:cs typeface="Times New Roman" panose="02020603050405020304" pitchFamily="18" charset="0"/>
-            </a:endParaRPr>
           </a:p>
         </p:txBody>
       </p:sp>
@@ -7379,13 +7039,6 @@
                 </a:rPr>
                 <a:t>File Index Number</a:t>
               </a:r>
-              <a:endParaRPr lang="en-US" sz="600" dirty="0">
-                <a:solidFill>
-                  <a:schemeClr val="tx1"/>
-                </a:solidFill>
-                <a:latin typeface="Times New Roman" panose="02020603050405020304" pitchFamily="18" charset="0"/>
-                <a:cs typeface="Times New Roman" panose="02020603050405020304" pitchFamily="18" charset="0"/>
-              </a:endParaRPr>
             </a:p>
           </p:txBody>
         </p:sp>
@@ -7443,13 +7096,6 @@
                 </a:rPr>
                 <a:t>File Index</a:t>
               </a:r>
-              <a:endParaRPr lang="en-US" sz="667" b="1" dirty="0">
-                <a:solidFill>
-                  <a:schemeClr val="tx1"/>
-                </a:solidFill>
-                <a:latin typeface="Times New Roman" panose="02020603050405020304" pitchFamily="18" charset="0"/>
-                <a:cs typeface="Times New Roman" panose="02020603050405020304" pitchFamily="18" charset="0"/>
-              </a:endParaRPr>
             </a:p>
           </p:txBody>
         </p:sp>
@@ -7507,13 +7153,6 @@
                 </a:rPr>
                 <a:t>File metadata (e.g., creation time)</a:t>
               </a:r>
-              <a:endParaRPr lang="en-US" sz="533" dirty="0">
-                <a:solidFill>
-                  <a:schemeClr val="tx1"/>
-                </a:solidFill>
-                <a:latin typeface="Times New Roman" panose="02020603050405020304" pitchFamily="18" charset="0"/>
-                <a:cs typeface="Times New Roman" panose="02020603050405020304" pitchFamily="18" charset="0"/>
-              </a:endParaRPr>
             </a:p>
           </p:txBody>
         </p:sp>
@@ -7571,13 +7210,6 @@
                 </a:rPr>
                 <a:t>Block 1</a:t>
               </a:r>
-              <a:endParaRPr lang="en-US" sz="667" dirty="0">
-                <a:solidFill>
-                  <a:schemeClr val="tx1"/>
-                </a:solidFill>
-                <a:latin typeface="Times New Roman" panose="02020603050405020304" pitchFamily="18" charset="0"/>
-                <a:cs typeface="Times New Roman" panose="02020603050405020304" pitchFamily="18" charset="0"/>
-              </a:endParaRPr>
             </a:p>
           </p:txBody>
         </p:sp>
@@ -7635,13 +7267,6 @@
                 </a:rPr>
                 <a:t>Block 2</a:t>
               </a:r>
-              <a:endParaRPr lang="en-US" sz="667" dirty="0">
-                <a:solidFill>
-                  <a:schemeClr val="tx1"/>
-                </a:solidFill>
-                <a:latin typeface="Times New Roman" panose="02020603050405020304" pitchFamily="18" charset="0"/>
-                <a:cs typeface="Times New Roman" panose="02020603050405020304" pitchFamily="18" charset="0"/>
-              </a:endParaRPr>
             </a:p>
           </p:txBody>
         </p:sp>
@@ -7699,13 +7324,6 @@
                 </a:rPr>
                 <a:t>…</a:t>
               </a:r>
-              <a:endParaRPr lang="en-US" sz="667" dirty="0">
-                <a:solidFill>
-                  <a:schemeClr val="tx1"/>
-                </a:solidFill>
-                <a:latin typeface="Times New Roman" panose="02020603050405020304" pitchFamily="18" charset="0"/>
-                <a:cs typeface="Times New Roman" panose="02020603050405020304" pitchFamily="18" charset="0"/>
-              </a:endParaRPr>
             </a:p>
           </p:txBody>
         </p:sp>
@@ -7763,13 +7381,6 @@
                 </a:rPr>
                 <a:t>Block N</a:t>
               </a:r>
-              <a:endParaRPr lang="en-US" sz="667" dirty="0">
-                <a:solidFill>
-                  <a:schemeClr val="tx1"/>
-                </a:solidFill>
-                <a:latin typeface="Times New Roman" panose="02020603050405020304" pitchFamily="18" charset="0"/>
-                <a:cs typeface="Times New Roman" panose="02020603050405020304" pitchFamily="18" charset="0"/>
-              </a:endParaRPr>
             </a:p>
           </p:txBody>
         </p:sp>
@@ -7827,13 +7438,6 @@
                 </a:rPr>
                 <a:t>Indirect block 1</a:t>
               </a:r>
-              <a:endParaRPr lang="en-US" sz="600" dirty="0">
-                <a:solidFill>
-                  <a:schemeClr val="tx1"/>
-                </a:solidFill>
-                <a:latin typeface="Times New Roman" panose="02020603050405020304" pitchFamily="18" charset="0"/>
-                <a:cs typeface="Times New Roman" panose="02020603050405020304" pitchFamily="18" charset="0"/>
-              </a:endParaRPr>
             </a:p>
           </p:txBody>
         </p:sp>
@@ -7891,13 +7495,6 @@
                 </a:rPr>
                 <a:t>Double Indirect block</a:t>
               </a:r>
-              <a:endParaRPr lang="en-US" sz="667" dirty="0">
-                <a:solidFill>
-                  <a:schemeClr val="tx1"/>
-                </a:solidFill>
-                <a:latin typeface="Times New Roman" panose="02020603050405020304" pitchFamily="18" charset="0"/>
-                <a:cs typeface="Times New Roman" panose="02020603050405020304" pitchFamily="18" charset="0"/>
-              </a:endParaRPr>
             </a:p>
           </p:txBody>
         </p:sp>
@@ -7984,13 +7581,6 @@
                   </a:rPr>
                   <a:t>Block N+1</a:t>
                 </a:r>
-                <a:endParaRPr lang="en-US" sz="667" dirty="0">
-                  <a:solidFill>
-                    <a:schemeClr val="tx1"/>
-                  </a:solidFill>
-                  <a:latin typeface="Times New Roman" panose="02020603050405020304" pitchFamily="18" charset="0"/>
-                  <a:cs typeface="Times New Roman" panose="02020603050405020304" pitchFamily="18" charset="0"/>
-                </a:endParaRPr>
               </a:p>
             </p:txBody>
           </p:sp>
@@ -8048,13 +7638,6 @@
                   </a:rPr>
                   <a:t>Block N+2</a:t>
                 </a:r>
-                <a:endParaRPr lang="en-US" sz="667" dirty="0">
-                  <a:solidFill>
-                    <a:schemeClr val="tx1"/>
-                  </a:solidFill>
-                  <a:latin typeface="Times New Roman" panose="02020603050405020304" pitchFamily="18" charset="0"/>
-                  <a:cs typeface="Times New Roman" panose="02020603050405020304" pitchFamily="18" charset="0"/>
-                </a:endParaRPr>
               </a:p>
             </p:txBody>
           </p:sp>
@@ -8112,13 +7695,6 @@
                   </a:rPr>
                   <a:t>…</a:t>
                 </a:r>
-                <a:endParaRPr lang="en-US" sz="667" dirty="0">
-                  <a:solidFill>
-                    <a:schemeClr val="tx1"/>
-                  </a:solidFill>
-                  <a:latin typeface="Times New Roman" panose="02020603050405020304" pitchFamily="18" charset="0"/>
-                  <a:cs typeface="Times New Roman" panose="02020603050405020304" pitchFamily="18" charset="0"/>
-                </a:endParaRPr>
               </a:p>
             </p:txBody>
           </p:sp>
@@ -8176,13 +7752,6 @@
                   </a:rPr>
                   <a:t>Block M</a:t>
                 </a:r>
-                <a:endParaRPr lang="en-US" sz="667" dirty="0">
-                  <a:solidFill>
-                    <a:schemeClr val="tx1"/>
-                  </a:solidFill>
-                  <a:latin typeface="Times New Roman" panose="02020603050405020304" pitchFamily="18" charset="0"/>
-                  <a:cs typeface="Times New Roman" panose="02020603050405020304" pitchFamily="18" charset="0"/>
-                </a:endParaRPr>
               </a:p>
             </p:txBody>
           </p:sp>
@@ -8281,13 +7850,6 @@
               </a:rPr>
               <a:t>N+2</a:t>
             </a:r>
-            <a:endParaRPr lang="en-US" sz="667" dirty="0">
-              <a:solidFill>
-                <a:schemeClr val="tx1"/>
-              </a:solidFill>
-              <a:latin typeface="Times New Roman" panose="02020603050405020304" pitchFamily="18" charset="0"/>
-              <a:cs typeface="Times New Roman" panose="02020603050405020304" pitchFamily="18" charset="0"/>
-            </a:endParaRPr>
           </a:p>
         </p:txBody>
       </p:sp>
@@ -8345,13 +7907,6 @@
               </a:rPr>
               <a:t>…</a:t>
             </a:r>
-            <a:endParaRPr lang="en-US" sz="667" dirty="0">
-              <a:solidFill>
-                <a:schemeClr val="tx1"/>
-              </a:solidFill>
-              <a:latin typeface="Times New Roman" panose="02020603050405020304" pitchFamily="18" charset="0"/>
-              <a:cs typeface="Times New Roman" panose="02020603050405020304" pitchFamily="18" charset="0"/>
-            </a:endParaRPr>
           </a:p>
         </p:txBody>
       </p:sp>
@@ -8409,13 +7964,6 @@
               </a:rPr>
               <a:t>M</a:t>
             </a:r>
-            <a:endParaRPr lang="en-US" sz="667" dirty="0">
-              <a:solidFill>
-                <a:schemeClr val="tx1"/>
-              </a:solidFill>
-              <a:latin typeface="Times New Roman" panose="02020603050405020304" pitchFamily="18" charset="0"/>
-              <a:cs typeface="Times New Roman" panose="02020603050405020304" pitchFamily="18" charset="0"/>
-            </a:endParaRPr>
           </a:p>
         </p:txBody>
       </p:sp>
@@ -8569,10 +8117,6 @@
               </a:rPr>
               <a:t>Data Blocks</a:t>
             </a:r>
-            <a:endParaRPr lang="en-US" sz="667" dirty="0">
-              <a:latin typeface="Times New Roman" panose="02020603050405020304" pitchFamily="18" charset="0"/>
-              <a:cs typeface="Times New Roman" panose="02020603050405020304" pitchFamily="18" charset="0"/>
-            </a:endParaRPr>
           </a:p>
         </p:txBody>
       </p:sp>
@@ -8644,13 +8188,6 @@
                 </a:rPr>
                 <a:t>Indirect block 2</a:t>
               </a:r>
-              <a:endParaRPr lang="en-US" sz="600" dirty="0">
-                <a:solidFill>
-                  <a:schemeClr val="tx1"/>
-                </a:solidFill>
-                <a:latin typeface="Times New Roman" panose="02020603050405020304" pitchFamily="18" charset="0"/>
-                <a:cs typeface="Times New Roman" panose="02020603050405020304" pitchFamily="18" charset="0"/>
-              </a:endParaRPr>
             </a:p>
           </p:txBody>
         </p:sp>
@@ -8765,13 +8302,6 @@
                 </a:rPr>
                 <a:t>…</a:t>
               </a:r>
-              <a:endParaRPr lang="en-US" sz="667" dirty="0">
-                <a:solidFill>
-                  <a:schemeClr val="tx1"/>
-                </a:solidFill>
-                <a:latin typeface="Times New Roman" panose="02020603050405020304" pitchFamily="18" charset="0"/>
-                <a:cs typeface="Times New Roman" panose="02020603050405020304" pitchFamily="18" charset="0"/>
-              </a:endParaRPr>
             </a:p>
           </p:txBody>
         </p:sp>
@@ -8901,13 +8431,6 @@
                 </a:rPr>
                 <a:t>Block M+1</a:t>
               </a:r>
-              <a:endParaRPr lang="en-US" sz="667" dirty="0">
-                <a:solidFill>
-                  <a:schemeClr val="tx1"/>
-                </a:solidFill>
-                <a:latin typeface="Times New Roman" panose="02020603050405020304" pitchFamily="18" charset="0"/>
-                <a:cs typeface="Times New Roman" panose="02020603050405020304" pitchFamily="18" charset="0"/>
-              </a:endParaRPr>
             </a:p>
           </p:txBody>
         </p:sp>
@@ -8965,13 +8488,6 @@
                 </a:rPr>
                 <a:t>Block N+2</a:t>
               </a:r>
-              <a:endParaRPr lang="en-US" sz="667" dirty="0">
-                <a:solidFill>
-                  <a:schemeClr val="tx1"/>
-                </a:solidFill>
-                <a:latin typeface="Times New Roman" panose="02020603050405020304" pitchFamily="18" charset="0"/>
-                <a:cs typeface="Times New Roman" panose="02020603050405020304" pitchFamily="18" charset="0"/>
-              </a:endParaRPr>
             </a:p>
           </p:txBody>
         </p:sp>
@@ -9029,13 +8545,6 @@
                 </a:rPr>
                 <a:t>…</a:t>
               </a:r>
-              <a:endParaRPr lang="en-US" sz="667" dirty="0">
-                <a:solidFill>
-                  <a:schemeClr val="tx1"/>
-                </a:solidFill>
-                <a:latin typeface="Times New Roman" panose="02020603050405020304" pitchFamily="18" charset="0"/>
-                <a:cs typeface="Times New Roman" panose="02020603050405020304" pitchFamily="18" charset="0"/>
-              </a:endParaRPr>
             </a:p>
           </p:txBody>
         </p:sp>
@@ -9093,13 +8602,6 @@
                 </a:rPr>
                 <a:t>Block K</a:t>
               </a:r>
-              <a:endParaRPr lang="en-US" sz="667" dirty="0">
-                <a:solidFill>
-                  <a:schemeClr val="tx1"/>
-                </a:solidFill>
-                <a:latin typeface="Times New Roman" panose="02020603050405020304" pitchFamily="18" charset="0"/>
-                <a:cs typeface="Times New Roman" panose="02020603050405020304" pitchFamily="18" charset="0"/>
-              </a:endParaRPr>
             </a:p>
           </p:txBody>
         </p:sp>
@@ -10191,7 +9693,7 @@
       </p:grpSpPr>
       <p:grpSp>
         <p:nvGrpSpPr>
-          <p:cNvPr id="218" name="Group 217"/>
+          <p:cNvPr id="3" name="Group 2"/>
           <p:cNvGrpSpPr/>
           <p:nvPr/>
         </p:nvGrpSpPr>
@@ -13744,17 +13246,19 @@
               </a:prstGeom>
             </p:spPr>
             <p:style>
-              <a:lnRef idx="1">
-                <a:schemeClr val="accent2"/>
+              <a:lnRef idx="2">
+                <a:schemeClr val="accent2">
+                  <a:shade val="50000"/>
+                </a:schemeClr>
               </a:lnRef>
-              <a:fillRef idx="2">
+              <a:fillRef idx="1">
                 <a:schemeClr val="accent2"/>
               </a:fillRef>
-              <a:effectRef idx="1">
+              <a:effectRef idx="0">
                 <a:schemeClr val="accent2"/>
               </a:effectRef>
               <a:fontRef idx="minor">
-                <a:schemeClr val="dk1"/>
+                <a:schemeClr val="lt1"/>
               </a:fontRef>
             </p:style>
             <p:txBody>
@@ -13763,13 +13267,19 @@
               <a:p>
                 <a:pPr algn="ctr"/>
                 <a:r>
-                  <a:rPr lang="en-US" sz="1000" dirty="0" smtClean="0">
+                  <a:rPr lang="en-US" sz="1000" dirty="0">
+                    <a:solidFill>
+                      <a:schemeClr val="lt1"/>
+                    </a:solidFill>
                     <a:latin typeface="Times New Roman" panose="02020603050405020304" pitchFamily="18" charset="0"/>
                     <a:cs typeface="Times New Roman" panose="02020603050405020304" pitchFamily="18" charset="0"/>
                   </a:rPr>
                   <a:t>21</a:t>
                 </a:r>
                 <a:endParaRPr lang="en-US" sz="1000" dirty="0">
+                  <a:solidFill>
+                    <a:schemeClr val="lt1"/>
+                  </a:solidFill>
                   <a:latin typeface="Times New Roman" panose="02020603050405020304" pitchFamily="18" charset="0"/>
                   <a:cs typeface="Times New Roman" panose="02020603050405020304" pitchFamily="18" charset="0"/>
                 </a:endParaRPr>
@@ -14285,8 +13795,8 @@
           </p:nvSpPr>
           <p:spPr>
             <a:xfrm>
-              <a:off x="2072640" y="868680"/>
-              <a:ext cx="257816" cy="1288970"/>
+              <a:off x="2070100" y="868680"/>
+              <a:ext cx="236220" cy="1288970"/>
             </a:xfrm>
             <a:custGeom>
               <a:avLst/>
@@ -14296,6 +13806,18 @@
                 <a:gd name="connsiteX1" fmla="*/ 228600 w 257816"/>
                 <a:gd name="connsiteY1" fmla="*/ 297180 h 1234440"/>
                 <a:gd name="connsiteX2" fmla="*/ 251460 w 257816"/>
+                <a:gd name="connsiteY2" fmla="*/ 1234440 h 1234440"/>
+                <a:gd name="connsiteX0" fmla="*/ 2540 w 235587"/>
+                <a:gd name="connsiteY0" fmla="*/ 0 h 1234440"/>
+                <a:gd name="connsiteX1" fmla="*/ 231140 w 235587"/>
+                <a:gd name="connsiteY1" fmla="*/ 297180 h 1234440"/>
+                <a:gd name="connsiteX2" fmla="*/ 0 w 235587"/>
+                <a:gd name="connsiteY2" fmla="*/ 1234440 h 1234440"/>
+                <a:gd name="connsiteX0" fmla="*/ 2540 w 236220"/>
+                <a:gd name="connsiteY0" fmla="*/ 0 h 1234440"/>
+                <a:gd name="connsiteX1" fmla="*/ 231140 w 236220"/>
+                <a:gd name="connsiteY1" fmla="*/ 297180 h 1234440"/>
+                <a:gd name="connsiteX2" fmla="*/ 0 w 236220"/>
                 <a:gd name="connsiteY2" fmla="*/ 1234440 h 1234440"/>
               </a:gdLst>
               <a:ahLst/>
@@ -14312,19 +13834,19 @@
               </a:cxnLst>
               <a:rect l="l" t="t" r="r" b="b"/>
               <a:pathLst>
-                <a:path w="257816" h="1234440">
+                <a:path w="236220" h="1234440">
                   <a:moveTo>
-                    <a:pt x="0" y="0"/>
+                    <a:pt x="2540" y="0"/>
                   </a:moveTo>
                   <a:cubicBezTo>
-                    <a:pt x="93345" y="45720"/>
-                    <a:pt x="186690" y="91440"/>
-                    <a:pt x="228600" y="297180"/>
+                    <a:pt x="95885" y="45720"/>
+                    <a:pt x="189230" y="91440"/>
+                    <a:pt x="231140" y="297180"/>
                   </a:cubicBezTo>
                   <a:cubicBezTo>
-                    <a:pt x="270510" y="502920"/>
-                    <a:pt x="256540" y="1064260"/>
-                    <a:pt x="251460" y="1234440"/>
+                    <a:pt x="273050" y="502920"/>
+                    <a:pt x="43180" y="1064260"/>
+                    <a:pt x="0" y="1234440"/>
                   </a:cubicBezTo>
                 </a:path>
               </a:pathLst>
@@ -15486,7 +15008,14 @@
                   <a:latin typeface="Times New Roman" panose="02020603050405020304" pitchFamily="18" charset="0"/>
                   <a:cs typeface="Times New Roman" panose="02020603050405020304" pitchFamily="18" charset="0"/>
                 </a:rPr>
-                <a:t> 21</a:t>
+                <a:t> </a:t>
+              </a:r>
+              <a:r>
+                <a:rPr lang="en-US" sz="1000" dirty="0" smtClean="0">
+                  <a:latin typeface="Times New Roman" panose="02020603050405020304" pitchFamily="18" charset="0"/>
+                  <a:cs typeface="Times New Roman" panose="02020603050405020304" pitchFamily="18" charset="0"/>
+                </a:rPr>
+                <a:t>20</a:t>
               </a:r>
               <a:endParaRPr lang="en-US" sz="1000" dirty="0">
                 <a:latin typeface="Times New Roman" panose="02020603050405020304" pitchFamily="18" charset="0"/>
@@ -15834,7 +15363,7 @@
           <p:nvCxnSpPr>
             <p:cNvPr id="204" name="Straight Arrow Connector 203"/>
             <p:cNvCxnSpPr>
-              <a:stCxn id="97" idx="2"/>
+              <a:stCxn id="100" idx="0"/>
               <a:endCxn id="168" idx="3"/>
             </p:cNvCxnSpPr>
             <p:nvPr/>
@@ -15842,7 +15371,7 @@
           <p:spPr>
             <a:xfrm flipH="1">
               <a:off x="1566406" y="2348865"/>
-              <a:ext cx="682583" cy="812483"/>
+              <a:ext cx="419955" cy="812483"/>
             </a:xfrm>
             <a:prstGeom prst="straightConnector1">
               <a:avLst/>
@@ -16126,6 +15655,1250 @@
 </p:sld>
 </file>
 
+<file path=ppt/slides/slide5.xml><?xml version="1.0" encoding="utf-8"?>
+<p:sld xmlns:a="http://schemas.openxmlformats.org/drawingml/2006/main" xmlns:r="http://schemas.openxmlformats.org/officeDocument/2006/relationships" xmlns:p="http://schemas.openxmlformats.org/presentationml/2006/main">
+  <p:cSld>
+    <p:spTree>
+      <p:nvGrpSpPr>
+        <p:cNvPr id="1" name=""/>
+        <p:cNvGrpSpPr/>
+        <p:nvPr/>
+      </p:nvGrpSpPr>
+      <p:grpSpPr>
+        <a:xfrm>
+          <a:off x="0" y="0"/>
+          <a:ext cx="0" cy="0"/>
+          <a:chOff x="0" y="0"/>
+          <a:chExt cx="0" cy="0"/>
+        </a:xfrm>
+      </p:grpSpPr>
+      <p:grpSp>
+        <p:nvGrpSpPr>
+          <p:cNvPr id="53" name="Group 52"/>
+          <p:cNvGrpSpPr/>
+          <p:nvPr/>
+        </p:nvGrpSpPr>
+        <p:grpSpPr>
+          <a:xfrm>
+            <a:off x="1884218" y="176643"/>
+            <a:ext cx="3193474" cy="4221739"/>
+            <a:chOff x="1884218" y="176643"/>
+            <a:chExt cx="3193474" cy="4221739"/>
+          </a:xfrm>
+        </p:grpSpPr>
+        <p:sp>
+          <p:nvSpPr>
+            <p:cNvPr id="4" name="Rounded Rectangle 3"/>
+            <p:cNvSpPr/>
+            <p:nvPr/>
+          </p:nvSpPr>
+          <p:spPr>
+            <a:xfrm>
+              <a:off x="1884218" y="1496289"/>
+              <a:ext cx="3193474" cy="346364"/>
+            </a:xfrm>
+            <a:prstGeom prst="roundRect">
+              <a:avLst/>
+            </a:prstGeom>
+          </p:spPr>
+          <p:style>
+            <a:lnRef idx="2">
+              <a:schemeClr val="accent1"/>
+            </a:lnRef>
+            <a:fillRef idx="1">
+              <a:schemeClr val="lt1"/>
+            </a:fillRef>
+            <a:effectRef idx="0">
+              <a:schemeClr val="accent1"/>
+            </a:effectRef>
+            <a:fontRef idx="minor">
+              <a:schemeClr val="dk1"/>
+            </a:fontRef>
+          </p:style>
+          <p:txBody>
+            <a:bodyPr rtlCol="0" anchor="ctr"/>
+            <a:lstStyle/>
+            <a:p>
+              <a:pPr algn="ctr"/>
+              <a:r>
+                <a:rPr lang="en-US" sz="1000" b="1" dirty="0" smtClean="0">
+                  <a:latin typeface="Times New Roman" panose="02020603050405020304" pitchFamily="18" charset="0"/>
+                  <a:cs typeface="Times New Roman" panose="02020603050405020304" pitchFamily="18" charset="0"/>
+                </a:rPr>
+                <a:t>API</a:t>
+              </a:r>
+              <a:endParaRPr lang="en-US" sz="1000" b="1" dirty="0">
+                <a:latin typeface="Times New Roman" panose="02020603050405020304" pitchFamily="18" charset="0"/>
+                <a:cs typeface="Times New Roman" panose="02020603050405020304" pitchFamily="18" charset="0"/>
+              </a:endParaRPr>
+            </a:p>
+          </p:txBody>
+        </p:sp>
+        <p:sp>
+          <p:nvSpPr>
+            <p:cNvPr id="5" name="Rounded Rectangle 4"/>
+            <p:cNvSpPr/>
+            <p:nvPr/>
+          </p:nvSpPr>
+          <p:spPr>
+            <a:xfrm>
+              <a:off x="1884218" y="1911925"/>
+              <a:ext cx="3193474" cy="626042"/>
+            </a:xfrm>
+            <a:prstGeom prst="roundRect">
+              <a:avLst>
+                <a:gd name="adj" fmla="val 4740"/>
+              </a:avLst>
+            </a:prstGeom>
+          </p:spPr>
+          <p:style>
+            <a:lnRef idx="2">
+              <a:schemeClr val="accent1"/>
+            </a:lnRef>
+            <a:fillRef idx="1">
+              <a:schemeClr val="lt1"/>
+            </a:fillRef>
+            <a:effectRef idx="0">
+              <a:schemeClr val="accent1"/>
+            </a:effectRef>
+            <a:fontRef idx="minor">
+              <a:schemeClr val="dk1"/>
+            </a:fontRef>
+          </p:style>
+          <p:txBody>
+            <a:bodyPr rtlCol="0" anchor="t"/>
+            <a:lstStyle/>
+            <a:p>
+              <a:r>
+                <a:rPr lang="en-US" sz="1000" b="1" dirty="0" smtClean="0">
+                  <a:latin typeface="Times New Roman" panose="02020603050405020304" pitchFamily="18" charset="0"/>
+                  <a:cs typeface="Times New Roman" panose="02020603050405020304" pitchFamily="18" charset="0"/>
+                </a:rPr>
+                <a:t>Core</a:t>
+              </a:r>
+              <a:endParaRPr lang="en-US" sz="1000" b="1" dirty="0">
+                <a:latin typeface="Times New Roman" panose="02020603050405020304" pitchFamily="18" charset="0"/>
+                <a:cs typeface="Times New Roman" panose="02020603050405020304" pitchFamily="18" charset="0"/>
+              </a:endParaRPr>
+            </a:p>
+          </p:txBody>
+        </p:sp>
+        <p:sp>
+          <p:nvSpPr>
+            <p:cNvPr id="6" name="Rounded Rectangle 5"/>
+            <p:cNvSpPr/>
+            <p:nvPr/>
+          </p:nvSpPr>
+          <p:spPr>
+            <a:xfrm>
+              <a:off x="2175163" y="831271"/>
+              <a:ext cx="914400" cy="401782"/>
+            </a:xfrm>
+            <a:prstGeom prst="roundRect">
+              <a:avLst/>
+            </a:prstGeom>
+          </p:spPr>
+          <p:style>
+            <a:lnRef idx="2">
+              <a:schemeClr val="accent1"/>
+            </a:lnRef>
+            <a:fillRef idx="1">
+              <a:schemeClr val="lt1"/>
+            </a:fillRef>
+            <a:effectRef idx="0">
+              <a:schemeClr val="accent1"/>
+            </a:effectRef>
+            <a:fontRef idx="minor">
+              <a:schemeClr val="dk1"/>
+            </a:fontRef>
+          </p:style>
+          <p:txBody>
+            <a:bodyPr rtlCol="0" anchor="ctr"/>
+            <a:lstStyle/>
+            <a:p>
+              <a:pPr algn="ctr"/>
+              <a:r>
+                <a:rPr lang="en-US" sz="1000" dirty="0" smtClean="0">
+                  <a:latin typeface="Times New Roman" panose="02020603050405020304" pitchFamily="18" charset="0"/>
+                  <a:cs typeface="Times New Roman" panose="02020603050405020304" pitchFamily="18" charset="0"/>
+                </a:rPr>
+                <a:t>Client Program</a:t>
+              </a:r>
+              <a:endParaRPr lang="en-US" sz="1000" dirty="0">
+                <a:latin typeface="Times New Roman" panose="02020603050405020304" pitchFamily="18" charset="0"/>
+                <a:cs typeface="Times New Roman" panose="02020603050405020304" pitchFamily="18" charset="0"/>
+              </a:endParaRPr>
+            </a:p>
+          </p:txBody>
+        </p:sp>
+        <p:sp>
+          <p:nvSpPr>
+            <p:cNvPr id="7" name="Rounded Rectangle 6"/>
+            <p:cNvSpPr/>
+            <p:nvPr/>
+          </p:nvSpPr>
+          <p:spPr>
+            <a:xfrm>
+              <a:off x="3269672" y="176643"/>
+              <a:ext cx="914400" cy="401782"/>
+            </a:xfrm>
+            <a:prstGeom prst="roundRect">
+              <a:avLst/>
+            </a:prstGeom>
+          </p:spPr>
+          <p:style>
+            <a:lnRef idx="2">
+              <a:schemeClr val="accent1"/>
+            </a:lnRef>
+            <a:fillRef idx="1">
+              <a:schemeClr val="lt1"/>
+            </a:fillRef>
+            <a:effectRef idx="0">
+              <a:schemeClr val="accent1"/>
+            </a:effectRef>
+            <a:fontRef idx="minor">
+              <a:schemeClr val="dk1"/>
+            </a:fontRef>
+          </p:style>
+          <p:txBody>
+            <a:bodyPr rtlCol="0" anchor="ctr"/>
+            <a:lstStyle/>
+            <a:p>
+              <a:pPr algn="ctr"/>
+              <a:r>
+                <a:rPr lang="en-US" sz="1000" dirty="0" smtClean="0">
+                  <a:latin typeface="Times New Roman" panose="02020603050405020304" pitchFamily="18" charset="0"/>
+                  <a:cs typeface="Times New Roman" panose="02020603050405020304" pitchFamily="18" charset="0"/>
+                </a:rPr>
+                <a:t>Client Program</a:t>
+              </a:r>
+              <a:endParaRPr lang="en-US" sz="1000" dirty="0">
+                <a:latin typeface="Times New Roman" panose="02020603050405020304" pitchFamily="18" charset="0"/>
+                <a:cs typeface="Times New Roman" panose="02020603050405020304" pitchFamily="18" charset="0"/>
+              </a:endParaRPr>
+            </a:p>
+          </p:txBody>
+        </p:sp>
+        <p:sp>
+          <p:nvSpPr>
+            <p:cNvPr id="8" name="Rounded Rectangle 7"/>
+            <p:cNvSpPr/>
+            <p:nvPr/>
+          </p:nvSpPr>
+          <p:spPr>
+            <a:xfrm>
+              <a:off x="3269672" y="831271"/>
+              <a:ext cx="914400" cy="401782"/>
+            </a:xfrm>
+            <a:prstGeom prst="roundRect">
+              <a:avLst/>
+            </a:prstGeom>
+          </p:spPr>
+          <p:style>
+            <a:lnRef idx="2">
+              <a:schemeClr val="accent1"/>
+            </a:lnRef>
+            <a:fillRef idx="1">
+              <a:schemeClr val="lt1"/>
+            </a:fillRef>
+            <a:effectRef idx="0">
+              <a:schemeClr val="accent1"/>
+            </a:effectRef>
+            <a:fontRef idx="minor">
+              <a:schemeClr val="dk1"/>
+            </a:fontRef>
+          </p:style>
+          <p:txBody>
+            <a:bodyPr rtlCol="0" anchor="ctr"/>
+            <a:lstStyle/>
+            <a:p>
+              <a:pPr algn="ctr"/>
+              <a:r>
+                <a:rPr lang="en-US" sz="1000" dirty="0" smtClean="0">
+                  <a:latin typeface="Times New Roman" panose="02020603050405020304" pitchFamily="18" charset="0"/>
+                  <a:cs typeface="Times New Roman" panose="02020603050405020304" pitchFamily="18" charset="0"/>
+                </a:rPr>
+                <a:t>RPC Framework</a:t>
+              </a:r>
+              <a:endParaRPr lang="en-US" sz="1000" dirty="0">
+                <a:latin typeface="Times New Roman" panose="02020603050405020304" pitchFamily="18" charset="0"/>
+                <a:cs typeface="Times New Roman" panose="02020603050405020304" pitchFamily="18" charset="0"/>
+              </a:endParaRPr>
+            </a:p>
+          </p:txBody>
+        </p:sp>
+        <p:cxnSp>
+          <p:nvCxnSpPr>
+            <p:cNvPr id="10" name="Straight Arrow Connector 9"/>
+            <p:cNvCxnSpPr>
+              <a:stCxn id="6" idx="2"/>
+            </p:cNvCxnSpPr>
+            <p:nvPr/>
+          </p:nvCxnSpPr>
+          <p:spPr>
+            <a:xfrm>
+              <a:off x="2632363" y="1233053"/>
+              <a:ext cx="0" cy="256309"/>
+            </a:xfrm>
+            <a:prstGeom prst="straightConnector1">
+              <a:avLst/>
+            </a:prstGeom>
+            <a:ln w="12700">
+              <a:solidFill>
+                <a:schemeClr val="tx1"/>
+              </a:solidFill>
+              <a:headEnd type="triangle" w="med" len="med"/>
+              <a:tailEnd type="triangle" w="med" len="med"/>
+            </a:ln>
+          </p:spPr>
+          <p:style>
+            <a:lnRef idx="1">
+              <a:schemeClr val="accent1"/>
+            </a:lnRef>
+            <a:fillRef idx="0">
+              <a:schemeClr val="accent1"/>
+            </a:fillRef>
+            <a:effectRef idx="0">
+              <a:schemeClr val="accent1"/>
+            </a:effectRef>
+            <a:fontRef idx="minor">
+              <a:schemeClr val="tx1"/>
+            </a:fontRef>
+          </p:style>
+        </p:cxnSp>
+        <p:cxnSp>
+          <p:nvCxnSpPr>
+            <p:cNvPr id="11" name="Straight Arrow Connector 10"/>
+            <p:cNvCxnSpPr/>
+            <p:nvPr/>
+          </p:nvCxnSpPr>
+          <p:spPr>
+            <a:xfrm>
+              <a:off x="3726872" y="1233053"/>
+              <a:ext cx="0" cy="256309"/>
+            </a:xfrm>
+            <a:prstGeom prst="straightConnector1">
+              <a:avLst/>
+            </a:prstGeom>
+            <a:ln w="12700">
+              <a:solidFill>
+                <a:schemeClr val="tx1"/>
+              </a:solidFill>
+              <a:headEnd type="triangle" w="med" len="med"/>
+              <a:tailEnd type="triangle" w="med" len="med"/>
+            </a:ln>
+          </p:spPr>
+          <p:style>
+            <a:lnRef idx="1">
+              <a:schemeClr val="accent1"/>
+            </a:lnRef>
+            <a:fillRef idx="0">
+              <a:schemeClr val="accent1"/>
+            </a:fillRef>
+            <a:effectRef idx="0">
+              <a:schemeClr val="accent1"/>
+            </a:effectRef>
+            <a:fontRef idx="minor">
+              <a:schemeClr val="tx1"/>
+            </a:fontRef>
+          </p:style>
+        </p:cxnSp>
+        <p:cxnSp>
+          <p:nvCxnSpPr>
+            <p:cNvPr id="12" name="Straight Arrow Connector 11"/>
+            <p:cNvCxnSpPr/>
+            <p:nvPr/>
+          </p:nvCxnSpPr>
+          <p:spPr>
+            <a:xfrm>
+              <a:off x="3726872" y="574962"/>
+              <a:ext cx="0" cy="256309"/>
+            </a:xfrm>
+            <a:prstGeom prst="straightConnector1">
+              <a:avLst/>
+            </a:prstGeom>
+            <a:ln w="12700">
+              <a:solidFill>
+                <a:schemeClr val="tx1"/>
+              </a:solidFill>
+              <a:headEnd type="triangle" w="med" len="med"/>
+              <a:tailEnd type="triangle" w="med" len="med"/>
+            </a:ln>
+          </p:spPr>
+          <p:style>
+            <a:lnRef idx="1">
+              <a:schemeClr val="accent1"/>
+            </a:lnRef>
+            <a:fillRef idx="0">
+              <a:schemeClr val="accent1"/>
+            </a:fillRef>
+            <a:effectRef idx="0">
+              <a:schemeClr val="accent1"/>
+            </a:effectRef>
+            <a:fontRef idx="minor">
+              <a:schemeClr val="tx1"/>
+            </a:fontRef>
+          </p:style>
+        </p:cxnSp>
+        <p:sp>
+          <p:nvSpPr>
+            <p:cNvPr id="16" name="Rounded Rectangle 15"/>
+            <p:cNvSpPr/>
+            <p:nvPr/>
+          </p:nvSpPr>
+          <p:spPr>
+            <a:xfrm>
+              <a:off x="1884218" y="2590784"/>
+              <a:ext cx="3193474" cy="1087598"/>
+            </a:xfrm>
+            <a:prstGeom prst="roundRect">
+              <a:avLst>
+                <a:gd name="adj" fmla="val 4740"/>
+              </a:avLst>
+            </a:prstGeom>
+          </p:spPr>
+          <p:style>
+            <a:lnRef idx="2">
+              <a:schemeClr val="accent1"/>
+            </a:lnRef>
+            <a:fillRef idx="1">
+              <a:schemeClr val="lt1"/>
+            </a:fillRef>
+            <a:effectRef idx="0">
+              <a:schemeClr val="accent1"/>
+            </a:effectRef>
+            <a:fontRef idx="minor">
+              <a:schemeClr val="dk1"/>
+            </a:fontRef>
+          </p:style>
+          <p:txBody>
+            <a:bodyPr rtlCol="0" anchor="t"/>
+            <a:lstStyle/>
+            <a:p>
+              <a:r>
+                <a:rPr lang="en-US" sz="1000" b="1" dirty="0" smtClean="0">
+                  <a:latin typeface="Times New Roman" panose="02020603050405020304" pitchFamily="18" charset="0"/>
+                  <a:cs typeface="Times New Roman" panose="02020603050405020304" pitchFamily="18" charset="0"/>
+                </a:rPr>
+                <a:t>Persistence</a:t>
+              </a:r>
+              <a:endParaRPr lang="en-US" sz="1000" b="1" dirty="0">
+                <a:latin typeface="Times New Roman" panose="02020603050405020304" pitchFamily="18" charset="0"/>
+                <a:cs typeface="Times New Roman" panose="02020603050405020304" pitchFamily="18" charset="0"/>
+              </a:endParaRPr>
+            </a:p>
+          </p:txBody>
+        </p:sp>
+        <p:sp>
+          <p:nvSpPr>
+            <p:cNvPr id="20" name="Rectangle 19"/>
+            <p:cNvSpPr/>
+            <p:nvPr/>
+          </p:nvSpPr>
+          <p:spPr>
+            <a:xfrm>
+              <a:off x="1999934" y="2920281"/>
+              <a:ext cx="2980775" cy="263237"/>
+            </a:xfrm>
+            <a:prstGeom prst="rect">
+              <a:avLst/>
+            </a:prstGeom>
+          </p:spPr>
+          <p:style>
+            <a:lnRef idx="2">
+              <a:schemeClr val="accent2"/>
+            </a:lnRef>
+            <a:fillRef idx="1">
+              <a:schemeClr val="lt1"/>
+            </a:fillRef>
+            <a:effectRef idx="0">
+              <a:schemeClr val="accent2"/>
+            </a:effectRef>
+            <a:fontRef idx="minor">
+              <a:schemeClr val="dk1"/>
+            </a:fontRef>
+          </p:style>
+          <p:txBody>
+            <a:bodyPr rtlCol="0" anchor="ctr"/>
+            <a:lstStyle/>
+            <a:p>
+              <a:pPr algn="ctr"/>
+              <a:r>
+                <a:rPr lang="en-US" sz="1000" dirty="0" smtClean="0">
+                  <a:latin typeface="Times New Roman" panose="02020603050405020304" pitchFamily="18" charset="0"/>
+                  <a:cs typeface="Times New Roman" panose="02020603050405020304" pitchFamily="18" charset="0"/>
+                </a:rPr>
+                <a:t>Caching</a:t>
+              </a:r>
+              <a:endParaRPr lang="en-US" sz="1000" dirty="0">
+                <a:latin typeface="Times New Roman" panose="02020603050405020304" pitchFamily="18" charset="0"/>
+                <a:cs typeface="Times New Roman" panose="02020603050405020304" pitchFamily="18" charset="0"/>
+              </a:endParaRPr>
+            </a:p>
+          </p:txBody>
+        </p:sp>
+        <p:sp>
+          <p:nvSpPr>
+            <p:cNvPr id="21" name="Flowchart: Magnetic Disk 20"/>
+            <p:cNvSpPr/>
+            <p:nvPr/>
+          </p:nvSpPr>
+          <p:spPr>
+            <a:xfrm>
+              <a:off x="2101797" y="3878837"/>
+              <a:ext cx="710675" cy="519545"/>
+            </a:xfrm>
+            <a:prstGeom prst="flowChartMagneticDisk">
+              <a:avLst/>
+            </a:prstGeom>
+          </p:spPr>
+          <p:style>
+            <a:lnRef idx="2">
+              <a:schemeClr val="accent1">
+                <a:shade val="50000"/>
+              </a:schemeClr>
+            </a:lnRef>
+            <a:fillRef idx="1">
+              <a:schemeClr val="accent1"/>
+            </a:fillRef>
+            <a:effectRef idx="0">
+              <a:schemeClr val="accent1"/>
+            </a:effectRef>
+            <a:fontRef idx="minor">
+              <a:schemeClr val="lt1"/>
+            </a:fontRef>
+          </p:style>
+          <p:txBody>
+            <a:bodyPr rtlCol="0" anchor="ctr"/>
+            <a:lstStyle/>
+            <a:p>
+              <a:pPr algn="ctr"/>
+              <a:r>
+                <a:rPr lang="en-US" sz="1000" dirty="0" smtClean="0">
+                  <a:latin typeface="Times New Roman" panose="02020603050405020304" pitchFamily="18" charset="0"/>
+                  <a:cs typeface="Times New Roman" panose="02020603050405020304" pitchFamily="18" charset="0"/>
+                </a:rPr>
+                <a:t>KV Store</a:t>
+              </a:r>
+              <a:endParaRPr lang="en-US" sz="1000" dirty="0">
+                <a:latin typeface="Times New Roman" panose="02020603050405020304" pitchFamily="18" charset="0"/>
+                <a:cs typeface="Times New Roman" panose="02020603050405020304" pitchFamily="18" charset="0"/>
+              </a:endParaRPr>
+            </a:p>
+          </p:txBody>
+        </p:sp>
+        <p:sp>
+          <p:nvSpPr>
+            <p:cNvPr id="22" name="Flowchart: Magnetic Disk 21"/>
+            <p:cNvSpPr/>
+            <p:nvPr/>
+          </p:nvSpPr>
+          <p:spPr>
+            <a:xfrm>
+              <a:off x="3161932" y="3878837"/>
+              <a:ext cx="710675" cy="519545"/>
+            </a:xfrm>
+            <a:prstGeom prst="flowChartMagneticDisk">
+              <a:avLst/>
+            </a:prstGeom>
+          </p:spPr>
+          <p:style>
+            <a:lnRef idx="2">
+              <a:schemeClr val="accent1">
+                <a:shade val="50000"/>
+              </a:schemeClr>
+            </a:lnRef>
+            <a:fillRef idx="1">
+              <a:schemeClr val="accent1"/>
+            </a:fillRef>
+            <a:effectRef idx="0">
+              <a:schemeClr val="accent1"/>
+            </a:effectRef>
+            <a:fontRef idx="minor">
+              <a:schemeClr val="lt1"/>
+            </a:fontRef>
+          </p:style>
+          <p:txBody>
+            <a:bodyPr rtlCol="0" anchor="ctr"/>
+            <a:lstStyle/>
+            <a:p>
+              <a:pPr algn="ctr"/>
+              <a:r>
+                <a:rPr lang="en-US" sz="1000" dirty="0" smtClean="0">
+                  <a:latin typeface="Times New Roman" panose="02020603050405020304" pitchFamily="18" charset="0"/>
+                  <a:cs typeface="Times New Roman" panose="02020603050405020304" pitchFamily="18" charset="0"/>
+                </a:rPr>
+                <a:t>Local Storage</a:t>
+              </a:r>
+              <a:endParaRPr lang="en-US" sz="1000" dirty="0">
+                <a:latin typeface="Times New Roman" panose="02020603050405020304" pitchFamily="18" charset="0"/>
+                <a:cs typeface="Times New Roman" panose="02020603050405020304" pitchFamily="18" charset="0"/>
+              </a:endParaRPr>
+            </a:p>
+          </p:txBody>
+        </p:sp>
+        <p:sp>
+          <p:nvSpPr>
+            <p:cNvPr id="23" name="Flowchart: Magnetic Disk 22"/>
+            <p:cNvSpPr/>
+            <p:nvPr/>
+          </p:nvSpPr>
+          <p:spPr>
+            <a:xfrm>
+              <a:off x="4222067" y="3878837"/>
+              <a:ext cx="710675" cy="519545"/>
+            </a:xfrm>
+            <a:prstGeom prst="flowChartMagneticDisk">
+              <a:avLst/>
+            </a:prstGeom>
+          </p:spPr>
+          <p:style>
+            <a:lnRef idx="2">
+              <a:schemeClr val="accent1">
+                <a:shade val="50000"/>
+              </a:schemeClr>
+            </a:lnRef>
+            <a:fillRef idx="1">
+              <a:schemeClr val="accent1"/>
+            </a:fillRef>
+            <a:effectRef idx="0">
+              <a:schemeClr val="accent1"/>
+            </a:effectRef>
+            <a:fontRef idx="minor">
+              <a:schemeClr val="lt1"/>
+            </a:fontRef>
+          </p:style>
+          <p:txBody>
+            <a:bodyPr rtlCol="0" anchor="ctr"/>
+            <a:lstStyle/>
+            <a:p>
+              <a:pPr algn="ctr"/>
+              <a:r>
+                <a:rPr lang="en-US" sz="1000" dirty="0" smtClean="0">
+                  <a:latin typeface="Times New Roman" panose="02020603050405020304" pitchFamily="18" charset="0"/>
+                  <a:cs typeface="Times New Roman" panose="02020603050405020304" pitchFamily="18" charset="0"/>
+                </a:rPr>
+                <a:t>Remote Storage</a:t>
+              </a:r>
+              <a:endParaRPr lang="en-US" sz="1000" dirty="0">
+                <a:latin typeface="Times New Roman" panose="02020603050405020304" pitchFamily="18" charset="0"/>
+                <a:cs typeface="Times New Roman" panose="02020603050405020304" pitchFamily="18" charset="0"/>
+              </a:endParaRPr>
+            </a:p>
+          </p:txBody>
+        </p:sp>
+        <p:sp>
+          <p:nvSpPr>
+            <p:cNvPr id="13" name="Rectangle 12"/>
+            <p:cNvSpPr/>
+            <p:nvPr/>
+          </p:nvSpPr>
+          <p:spPr>
+            <a:xfrm>
+              <a:off x="1999934" y="3277897"/>
+              <a:ext cx="914400" cy="263237"/>
+            </a:xfrm>
+            <a:prstGeom prst="rect">
+              <a:avLst/>
+            </a:prstGeom>
+          </p:spPr>
+          <p:style>
+            <a:lnRef idx="2">
+              <a:schemeClr val="accent2"/>
+            </a:lnRef>
+            <a:fillRef idx="1">
+              <a:schemeClr val="lt1"/>
+            </a:fillRef>
+            <a:effectRef idx="0">
+              <a:schemeClr val="accent2"/>
+            </a:effectRef>
+            <a:fontRef idx="minor">
+              <a:schemeClr val="dk1"/>
+            </a:fontRef>
+          </p:style>
+          <p:txBody>
+            <a:bodyPr rtlCol="0" anchor="ctr"/>
+            <a:lstStyle/>
+            <a:p>
+              <a:pPr algn="ctr"/>
+              <a:r>
+                <a:rPr lang="en-US" sz="1000" dirty="0" smtClean="0">
+                  <a:latin typeface="Times New Roman" panose="02020603050405020304" pitchFamily="18" charset="0"/>
+                  <a:cs typeface="Times New Roman" panose="02020603050405020304" pitchFamily="18" charset="0"/>
+                </a:rPr>
+                <a:t>File Directory</a:t>
+              </a:r>
+              <a:endParaRPr lang="en-US" sz="1000" dirty="0">
+                <a:latin typeface="Times New Roman" panose="02020603050405020304" pitchFamily="18" charset="0"/>
+                <a:cs typeface="Times New Roman" panose="02020603050405020304" pitchFamily="18" charset="0"/>
+              </a:endParaRPr>
+            </a:p>
+          </p:txBody>
+        </p:sp>
+        <p:sp>
+          <p:nvSpPr>
+            <p:cNvPr id="17" name="Rectangle 16"/>
+            <p:cNvSpPr/>
+            <p:nvPr/>
+          </p:nvSpPr>
+          <p:spPr>
+            <a:xfrm>
+              <a:off x="3572635" y="3277897"/>
+              <a:ext cx="543791" cy="263237"/>
+            </a:xfrm>
+            <a:prstGeom prst="rect">
+              <a:avLst/>
+            </a:prstGeom>
+          </p:spPr>
+          <p:style>
+            <a:lnRef idx="2">
+              <a:schemeClr val="accent2"/>
+            </a:lnRef>
+            <a:fillRef idx="1">
+              <a:schemeClr val="lt1"/>
+            </a:fillRef>
+            <a:effectRef idx="0">
+              <a:schemeClr val="accent2"/>
+            </a:effectRef>
+            <a:fontRef idx="minor">
+              <a:schemeClr val="dk1"/>
+            </a:fontRef>
+          </p:style>
+          <p:txBody>
+            <a:bodyPr rtlCol="0" anchor="ctr"/>
+            <a:lstStyle/>
+            <a:p>
+              <a:pPr algn="ctr"/>
+              <a:r>
+                <a:rPr lang="en-US" sz="1000" dirty="0" err="1" smtClean="0">
+                  <a:latin typeface="Times New Roman" panose="02020603050405020304" pitchFamily="18" charset="0"/>
+                  <a:cs typeface="Times New Roman" panose="02020603050405020304" pitchFamily="18" charset="0"/>
+                </a:rPr>
+                <a:t>inodes</a:t>
+              </a:r>
+              <a:endParaRPr lang="en-US" sz="1000" dirty="0">
+                <a:latin typeface="Times New Roman" panose="02020603050405020304" pitchFamily="18" charset="0"/>
+                <a:cs typeface="Times New Roman" panose="02020603050405020304" pitchFamily="18" charset="0"/>
+              </a:endParaRPr>
+            </a:p>
+          </p:txBody>
+        </p:sp>
+        <p:sp>
+          <p:nvSpPr>
+            <p:cNvPr id="18" name="Rectangle 17"/>
+            <p:cNvSpPr/>
+            <p:nvPr/>
+          </p:nvSpPr>
+          <p:spPr>
+            <a:xfrm>
+              <a:off x="4184071" y="3277897"/>
+              <a:ext cx="796637" cy="263237"/>
+            </a:xfrm>
+            <a:prstGeom prst="rect">
+              <a:avLst/>
+            </a:prstGeom>
+          </p:spPr>
+          <p:style>
+            <a:lnRef idx="2">
+              <a:schemeClr val="accent2"/>
+            </a:lnRef>
+            <a:fillRef idx="1">
+              <a:schemeClr val="lt1"/>
+            </a:fillRef>
+            <a:effectRef idx="0">
+              <a:schemeClr val="accent2"/>
+            </a:effectRef>
+            <a:fontRef idx="minor">
+              <a:schemeClr val="dk1"/>
+            </a:fontRef>
+          </p:style>
+          <p:txBody>
+            <a:bodyPr rtlCol="0" anchor="ctr"/>
+            <a:lstStyle/>
+            <a:p>
+              <a:pPr algn="ctr"/>
+              <a:r>
+                <a:rPr lang="en-US" sz="1000" dirty="0" smtClean="0">
+                  <a:latin typeface="Times New Roman" panose="02020603050405020304" pitchFamily="18" charset="0"/>
+                  <a:cs typeface="Times New Roman" panose="02020603050405020304" pitchFamily="18" charset="0"/>
+                </a:rPr>
+                <a:t>blocks</a:t>
+              </a:r>
+              <a:endParaRPr lang="en-US" sz="1000" dirty="0">
+                <a:latin typeface="Times New Roman" panose="02020603050405020304" pitchFamily="18" charset="0"/>
+                <a:cs typeface="Times New Roman" panose="02020603050405020304" pitchFamily="18" charset="0"/>
+              </a:endParaRPr>
+            </a:p>
+          </p:txBody>
+        </p:sp>
+        <p:sp>
+          <p:nvSpPr>
+            <p:cNvPr id="19" name="Rectangle 18"/>
+            <p:cNvSpPr/>
+            <p:nvPr/>
+          </p:nvSpPr>
+          <p:spPr>
+            <a:xfrm>
+              <a:off x="2981980" y="3273564"/>
+              <a:ext cx="523009" cy="263237"/>
+            </a:xfrm>
+            <a:prstGeom prst="rect">
+              <a:avLst/>
+            </a:prstGeom>
+          </p:spPr>
+          <p:style>
+            <a:lnRef idx="2">
+              <a:schemeClr val="accent2"/>
+            </a:lnRef>
+            <a:fillRef idx="1">
+              <a:schemeClr val="lt1"/>
+            </a:fillRef>
+            <a:effectRef idx="0">
+              <a:schemeClr val="accent2"/>
+            </a:effectRef>
+            <a:fontRef idx="minor">
+              <a:schemeClr val="dk1"/>
+            </a:fontRef>
+          </p:style>
+          <p:txBody>
+            <a:bodyPr rtlCol="0" anchor="ctr"/>
+            <a:lstStyle/>
+            <a:p>
+              <a:pPr algn="ctr"/>
+              <a:r>
+                <a:rPr lang="en-US" sz="1000" dirty="0" err="1" smtClean="0">
+                  <a:latin typeface="Times New Roman" panose="02020603050405020304" pitchFamily="18" charset="0"/>
+                  <a:cs typeface="Times New Roman" panose="02020603050405020304" pitchFamily="18" charset="0"/>
+                </a:rPr>
+                <a:t>ibmap</a:t>
+              </a:r>
+              <a:endParaRPr lang="en-US" sz="1000" dirty="0">
+                <a:latin typeface="Times New Roman" panose="02020603050405020304" pitchFamily="18" charset="0"/>
+                <a:cs typeface="Times New Roman" panose="02020603050405020304" pitchFamily="18" charset="0"/>
+              </a:endParaRPr>
+            </a:p>
+          </p:txBody>
+        </p:sp>
+        <p:sp>
+          <p:nvSpPr>
+            <p:cNvPr id="25" name="Rectangle 24"/>
+            <p:cNvSpPr/>
+            <p:nvPr/>
+          </p:nvSpPr>
+          <p:spPr>
+            <a:xfrm>
+              <a:off x="1999935" y="2161298"/>
+              <a:ext cx="2980774" cy="263237"/>
+            </a:xfrm>
+            <a:prstGeom prst="rect">
+              <a:avLst/>
+            </a:prstGeom>
+          </p:spPr>
+          <p:style>
+            <a:lnRef idx="2">
+              <a:schemeClr val="accent2"/>
+            </a:lnRef>
+            <a:fillRef idx="1">
+              <a:schemeClr val="lt1"/>
+            </a:fillRef>
+            <a:effectRef idx="0">
+              <a:schemeClr val="accent2"/>
+            </a:effectRef>
+            <a:fontRef idx="minor">
+              <a:schemeClr val="dk1"/>
+            </a:fontRef>
+          </p:style>
+          <p:txBody>
+            <a:bodyPr rtlCol="0" anchor="ctr"/>
+            <a:lstStyle/>
+            <a:p>
+              <a:pPr algn="ctr"/>
+              <a:r>
+                <a:rPr lang="en-US" sz="1000" dirty="0" smtClean="0">
+                  <a:latin typeface="Times New Roman" panose="02020603050405020304" pitchFamily="18" charset="0"/>
+                  <a:cs typeface="Times New Roman" panose="02020603050405020304" pitchFamily="18" charset="0"/>
+                </a:rPr>
+                <a:t>Driver</a:t>
+              </a:r>
+              <a:endParaRPr lang="en-US" sz="1000" dirty="0">
+                <a:latin typeface="Times New Roman" panose="02020603050405020304" pitchFamily="18" charset="0"/>
+                <a:cs typeface="Times New Roman" panose="02020603050405020304" pitchFamily="18" charset="0"/>
+              </a:endParaRPr>
+            </a:p>
+          </p:txBody>
+        </p:sp>
+        <p:cxnSp>
+          <p:nvCxnSpPr>
+            <p:cNvPr id="28" name="Straight Connector 27"/>
+            <p:cNvCxnSpPr>
+              <a:stCxn id="21" idx="1"/>
+              <a:endCxn id="13" idx="2"/>
+            </p:cNvCxnSpPr>
+            <p:nvPr/>
+          </p:nvCxnSpPr>
+          <p:spPr>
+            <a:xfrm flipH="1" flipV="1">
+              <a:off x="2457134" y="3541134"/>
+              <a:ext cx="1" cy="337703"/>
+            </a:xfrm>
+            <a:prstGeom prst="line">
+              <a:avLst/>
+            </a:prstGeom>
+            <a:ln w="9525">
+              <a:solidFill>
+                <a:schemeClr val="tx1"/>
+              </a:solidFill>
+              <a:prstDash val="dash"/>
+              <a:headEnd type="triangle" w="med" len="med"/>
+              <a:tailEnd type="triangle" w="med" len="med"/>
+            </a:ln>
+          </p:spPr>
+          <p:style>
+            <a:lnRef idx="1">
+              <a:schemeClr val="accent1"/>
+            </a:lnRef>
+            <a:fillRef idx="0">
+              <a:schemeClr val="accent1"/>
+            </a:fillRef>
+            <a:effectRef idx="0">
+              <a:schemeClr val="accent1"/>
+            </a:effectRef>
+            <a:fontRef idx="minor">
+              <a:schemeClr val="tx1"/>
+            </a:fontRef>
+          </p:style>
+        </p:cxnSp>
+        <p:cxnSp>
+          <p:nvCxnSpPr>
+            <p:cNvPr id="30" name="Straight Connector 29"/>
+            <p:cNvCxnSpPr>
+              <a:stCxn id="19" idx="2"/>
+              <a:endCxn id="22" idx="1"/>
+            </p:cNvCxnSpPr>
+            <p:nvPr/>
+          </p:nvCxnSpPr>
+          <p:spPr>
+            <a:xfrm>
+              <a:off x="3243485" y="3536801"/>
+              <a:ext cx="273785" cy="342036"/>
+            </a:xfrm>
+            <a:prstGeom prst="line">
+              <a:avLst/>
+            </a:prstGeom>
+            <a:ln w="9525">
+              <a:solidFill>
+                <a:schemeClr val="tx1"/>
+              </a:solidFill>
+              <a:prstDash val="dash"/>
+              <a:headEnd type="triangle" w="med" len="med"/>
+              <a:tailEnd type="triangle" w="med" len="med"/>
+            </a:ln>
+          </p:spPr>
+          <p:style>
+            <a:lnRef idx="1">
+              <a:schemeClr val="accent1"/>
+            </a:lnRef>
+            <a:fillRef idx="0">
+              <a:schemeClr val="accent1"/>
+            </a:fillRef>
+            <a:effectRef idx="0">
+              <a:schemeClr val="accent1"/>
+            </a:effectRef>
+            <a:fontRef idx="minor">
+              <a:schemeClr val="tx1"/>
+            </a:fontRef>
+          </p:style>
+        </p:cxnSp>
+        <p:cxnSp>
+          <p:nvCxnSpPr>
+            <p:cNvPr id="32" name="Straight Connector 31"/>
+            <p:cNvCxnSpPr>
+              <a:stCxn id="19" idx="2"/>
+              <a:endCxn id="23" idx="1"/>
+            </p:cNvCxnSpPr>
+            <p:nvPr/>
+          </p:nvCxnSpPr>
+          <p:spPr>
+            <a:xfrm>
+              <a:off x="3243485" y="3536801"/>
+              <a:ext cx="1333920" cy="342036"/>
+            </a:xfrm>
+            <a:prstGeom prst="line">
+              <a:avLst/>
+            </a:prstGeom>
+            <a:ln w="9525">
+              <a:solidFill>
+                <a:schemeClr val="tx1"/>
+              </a:solidFill>
+              <a:prstDash val="dash"/>
+              <a:headEnd type="triangle" w="med" len="med"/>
+              <a:tailEnd type="triangle" w="med" len="med"/>
+            </a:ln>
+          </p:spPr>
+          <p:style>
+            <a:lnRef idx="1">
+              <a:schemeClr val="accent1"/>
+            </a:lnRef>
+            <a:fillRef idx="0">
+              <a:schemeClr val="accent1"/>
+            </a:fillRef>
+            <a:effectRef idx="0">
+              <a:schemeClr val="accent1"/>
+            </a:effectRef>
+            <a:fontRef idx="minor">
+              <a:schemeClr val="tx1"/>
+            </a:fontRef>
+          </p:style>
+        </p:cxnSp>
+        <p:cxnSp>
+          <p:nvCxnSpPr>
+            <p:cNvPr id="34" name="Straight Connector 33"/>
+            <p:cNvCxnSpPr>
+              <a:stCxn id="17" idx="2"/>
+              <a:endCxn id="22" idx="1"/>
+            </p:cNvCxnSpPr>
+            <p:nvPr/>
+          </p:nvCxnSpPr>
+          <p:spPr>
+            <a:xfrm flipH="1">
+              <a:off x="3517270" y="3541134"/>
+              <a:ext cx="327261" cy="337703"/>
+            </a:xfrm>
+            <a:prstGeom prst="line">
+              <a:avLst/>
+            </a:prstGeom>
+            <a:ln w="9525">
+              <a:solidFill>
+                <a:schemeClr val="tx1"/>
+              </a:solidFill>
+              <a:prstDash val="dash"/>
+              <a:headEnd type="triangle" w="med" len="med"/>
+              <a:tailEnd type="triangle" w="med" len="med"/>
+            </a:ln>
+          </p:spPr>
+          <p:style>
+            <a:lnRef idx="1">
+              <a:schemeClr val="accent1"/>
+            </a:lnRef>
+            <a:fillRef idx="0">
+              <a:schemeClr val="accent1"/>
+            </a:fillRef>
+            <a:effectRef idx="0">
+              <a:schemeClr val="accent1"/>
+            </a:effectRef>
+            <a:fontRef idx="minor">
+              <a:schemeClr val="tx1"/>
+            </a:fontRef>
+          </p:style>
+        </p:cxnSp>
+        <p:cxnSp>
+          <p:nvCxnSpPr>
+            <p:cNvPr id="36" name="Straight Connector 35"/>
+            <p:cNvCxnSpPr>
+              <a:stCxn id="17" idx="2"/>
+              <a:endCxn id="23" idx="1"/>
+            </p:cNvCxnSpPr>
+            <p:nvPr/>
+          </p:nvCxnSpPr>
+          <p:spPr>
+            <a:xfrm>
+              <a:off x="3844531" y="3541134"/>
+              <a:ext cx="732874" cy="337703"/>
+            </a:xfrm>
+            <a:prstGeom prst="line">
+              <a:avLst/>
+            </a:prstGeom>
+            <a:ln w="9525">
+              <a:solidFill>
+                <a:schemeClr val="tx1"/>
+              </a:solidFill>
+              <a:prstDash val="dash"/>
+              <a:headEnd type="triangle" w="med" len="med"/>
+              <a:tailEnd type="triangle" w="med" len="med"/>
+            </a:ln>
+          </p:spPr>
+          <p:style>
+            <a:lnRef idx="1">
+              <a:schemeClr val="accent1"/>
+            </a:lnRef>
+            <a:fillRef idx="0">
+              <a:schemeClr val="accent1"/>
+            </a:fillRef>
+            <a:effectRef idx="0">
+              <a:schemeClr val="accent1"/>
+            </a:effectRef>
+            <a:fontRef idx="minor">
+              <a:schemeClr val="tx1"/>
+            </a:fontRef>
+          </p:style>
+        </p:cxnSp>
+        <p:cxnSp>
+          <p:nvCxnSpPr>
+            <p:cNvPr id="38" name="Straight Connector 37"/>
+            <p:cNvCxnSpPr>
+              <a:stCxn id="18" idx="2"/>
+              <a:endCxn id="22" idx="1"/>
+            </p:cNvCxnSpPr>
+            <p:nvPr/>
+          </p:nvCxnSpPr>
+          <p:spPr>
+            <a:xfrm flipH="1">
+              <a:off x="3517270" y="3541134"/>
+              <a:ext cx="1065120" cy="337703"/>
+            </a:xfrm>
+            <a:prstGeom prst="line">
+              <a:avLst/>
+            </a:prstGeom>
+            <a:ln w="9525">
+              <a:solidFill>
+                <a:schemeClr val="tx1"/>
+              </a:solidFill>
+              <a:prstDash val="dash"/>
+              <a:headEnd type="triangle" w="med" len="med"/>
+              <a:tailEnd type="triangle" w="med" len="med"/>
+            </a:ln>
+          </p:spPr>
+          <p:style>
+            <a:lnRef idx="1">
+              <a:schemeClr val="accent1"/>
+            </a:lnRef>
+            <a:fillRef idx="0">
+              <a:schemeClr val="accent1"/>
+            </a:fillRef>
+            <a:effectRef idx="0">
+              <a:schemeClr val="accent1"/>
+            </a:effectRef>
+            <a:fontRef idx="minor">
+              <a:schemeClr val="tx1"/>
+            </a:fontRef>
+          </p:style>
+        </p:cxnSp>
+        <p:cxnSp>
+          <p:nvCxnSpPr>
+            <p:cNvPr id="40" name="Straight Connector 39"/>
+            <p:cNvCxnSpPr>
+              <a:stCxn id="18" idx="2"/>
+              <a:endCxn id="23" idx="1"/>
+            </p:cNvCxnSpPr>
+            <p:nvPr/>
+          </p:nvCxnSpPr>
+          <p:spPr>
+            <a:xfrm flipH="1">
+              <a:off x="4577405" y="3541134"/>
+              <a:ext cx="4985" cy="337703"/>
+            </a:xfrm>
+            <a:prstGeom prst="line">
+              <a:avLst/>
+            </a:prstGeom>
+            <a:ln w="9525">
+              <a:solidFill>
+                <a:schemeClr val="tx1"/>
+              </a:solidFill>
+              <a:prstDash val="dash"/>
+              <a:headEnd type="triangle" w="med" len="med"/>
+              <a:tailEnd type="triangle" w="med" len="med"/>
+            </a:ln>
+          </p:spPr>
+          <p:style>
+            <a:lnRef idx="1">
+              <a:schemeClr val="accent1"/>
+            </a:lnRef>
+            <a:fillRef idx="0">
+              <a:schemeClr val="accent1"/>
+            </a:fillRef>
+            <a:effectRef idx="0">
+              <a:schemeClr val="accent1"/>
+            </a:effectRef>
+            <a:fontRef idx="minor">
+              <a:schemeClr val="tx1"/>
+            </a:fontRef>
+          </p:style>
+        </p:cxnSp>
+        <p:cxnSp>
+          <p:nvCxnSpPr>
+            <p:cNvPr id="42" name="Straight Arrow Connector 41"/>
+            <p:cNvCxnSpPr>
+              <a:stCxn id="25" idx="2"/>
+              <a:endCxn id="20" idx="0"/>
+            </p:cNvCxnSpPr>
+            <p:nvPr/>
+          </p:nvCxnSpPr>
+          <p:spPr>
+            <a:xfrm>
+              <a:off x="3490322" y="2424535"/>
+              <a:ext cx="0" cy="495746"/>
+            </a:xfrm>
+            <a:prstGeom prst="straightConnector1">
+              <a:avLst/>
+            </a:prstGeom>
+            <a:ln w="9525">
+              <a:solidFill>
+                <a:schemeClr val="tx1"/>
+              </a:solidFill>
+              <a:prstDash val="dash"/>
+              <a:headEnd type="triangle" w="med" len="med"/>
+              <a:tailEnd type="triangle" w="med" len="med"/>
+            </a:ln>
+          </p:spPr>
+          <p:style>
+            <a:lnRef idx="1">
+              <a:schemeClr val="accent1"/>
+            </a:lnRef>
+            <a:fillRef idx="0">
+              <a:schemeClr val="accent1"/>
+            </a:fillRef>
+            <a:effectRef idx="0">
+              <a:schemeClr val="accent1"/>
+            </a:effectRef>
+            <a:fontRef idx="minor">
+              <a:schemeClr val="tx1"/>
+            </a:fontRef>
+          </p:style>
+        </p:cxnSp>
+      </p:grpSp>
+    </p:spTree>
+    <p:extLst>
+      <p:ext uri="{BB962C8B-B14F-4D97-AF65-F5344CB8AC3E}">
+        <p14:creationId xmlns:p14="http://schemas.microsoft.com/office/powerpoint/2010/main" val="3717228138"/>
+      </p:ext>
+    </p:extLst>
+  </p:cSld>
+  <p:clrMapOvr>
+    <a:masterClrMapping/>
+  </p:clrMapOvr>
+</p:sld>
+</file>
+
+<file path=ppt/slides/slide6.xml><?xml version="1.0" encoding="utf-8"?>
+<p:sld xmlns:a="http://schemas.openxmlformats.org/drawingml/2006/main" xmlns:r="http://schemas.openxmlformats.org/officeDocument/2006/relationships" xmlns:p="http://schemas.openxmlformats.org/presentationml/2006/main">
+  <p:cSld>
+    <p:spTree>
+      <p:nvGrpSpPr>
+        <p:cNvPr id="1" name=""/>
+        <p:cNvGrpSpPr/>
+        <p:nvPr/>
+      </p:nvGrpSpPr>
+      <p:grpSpPr>
+        <a:xfrm>
+          <a:off x="0" y="0"/>
+          <a:ext cx="0" cy="0"/>
+          <a:chOff x="0" y="0"/>
+          <a:chExt cx="0" cy="0"/>
+        </a:xfrm>
+      </p:grpSpPr>
+    </p:spTree>
+    <p:extLst>
+      <p:ext uri="{BB962C8B-B14F-4D97-AF65-F5344CB8AC3E}">
+        <p14:creationId xmlns:p14="http://schemas.microsoft.com/office/powerpoint/2010/main" val="3911456309"/>
+      </p:ext>
+    </p:extLst>
+  </p:cSld>
+  <p:clrMapOvr>
+    <a:masterClrMapping/>
+  </p:clrMapOvr>
+</p:sld>
+</file>
+
 <file path=ppt/theme/theme1.xml><?xml version="1.0" encoding="utf-8"?>
 <a:theme xmlns:a="http://schemas.openxmlformats.org/drawingml/2006/main" name="Office Theme">
   <a:themeElements>

</xml_diff>

<commit_message>
Added sections 3 and 4. Updated Figure 1.
</commit_message>
<xml_diff>
--- a/docs/design/figures/fs-design.pptx
+++ b/docs/design/figures/fs-design.pptx
@@ -248,7 +248,7 @@
           <a:p>
             <a:fld id="{305C3DB1-8177-46AD-AF81-2EEE95D844A8}" type="datetimeFigureOut">
               <a:rPr lang="en-US" smtClean="0"/>
-              <a:t>3/3/2017</a:t>
+              <a:t>3/9/2017</a:t>
             </a:fld>
             <a:endParaRPr lang="en-US"/>
           </a:p>
@@ -418,7 +418,7 @@
           <a:p>
             <a:fld id="{305C3DB1-8177-46AD-AF81-2EEE95D844A8}" type="datetimeFigureOut">
               <a:rPr lang="en-US" smtClean="0"/>
-              <a:t>3/3/2017</a:t>
+              <a:t>3/9/2017</a:t>
             </a:fld>
             <a:endParaRPr lang="en-US"/>
           </a:p>
@@ -598,7 +598,7 @@
           <a:p>
             <a:fld id="{305C3DB1-8177-46AD-AF81-2EEE95D844A8}" type="datetimeFigureOut">
               <a:rPr lang="en-US" smtClean="0"/>
-              <a:t>3/3/2017</a:t>
+              <a:t>3/9/2017</a:t>
             </a:fld>
             <a:endParaRPr lang="en-US"/>
           </a:p>
@@ -768,7 +768,7 @@
           <a:p>
             <a:fld id="{305C3DB1-8177-46AD-AF81-2EEE95D844A8}" type="datetimeFigureOut">
               <a:rPr lang="en-US" smtClean="0"/>
-              <a:t>3/3/2017</a:t>
+              <a:t>3/9/2017</a:t>
             </a:fld>
             <a:endParaRPr lang="en-US"/>
           </a:p>
@@ -1012,7 +1012,7 @@
           <a:p>
             <a:fld id="{305C3DB1-8177-46AD-AF81-2EEE95D844A8}" type="datetimeFigureOut">
               <a:rPr lang="en-US" smtClean="0"/>
-              <a:t>3/3/2017</a:t>
+              <a:t>3/9/2017</a:t>
             </a:fld>
             <a:endParaRPr lang="en-US"/>
           </a:p>
@@ -1244,7 +1244,7 @@
           <a:p>
             <a:fld id="{305C3DB1-8177-46AD-AF81-2EEE95D844A8}" type="datetimeFigureOut">
               <a:rPr lang="en-US" smtClean="0"/>
-              <a:t>3/3/2017</a:t>
+              <a:t>3/9/2017</a:t>
             </a:fld>
             <a:endParaRPr lang="en-US"/>
           </a:p>
@@ -1611,7 +1611,7 @@
           <a:p>
             <a:fld id="{305C3DB1-8177-46AD-AF81-2EEE95D844A8}" type="datetimeFigureOut">
               <a:rPr lang="en-US" smtClean="0"/>
-              <a:t>3/3/2017</a:t>
+              <a:t>3/9/2017</a:t>
             </a:fld>
             <a:endParaRPr lang="en-US"/>
           </a:p>
@@ -1729,7 +1729,7 @@
           <a:p>
             <a:fld id="{305C3DB1-8177-46AD-AF81-2EEE95D844A8}" type="datetimeFigureOut">
               <a:rPr lang="en-US" smtClean="0"/>
-              <a:t>3/3/2017</a:t>
+              <a:t>3/9/2017</a:t>
             </a:fld>
             <a:endParaRPr lang="en-US"/>
           </a:p>
@@ -1824,7 +1824,7 @@
           <a:p>
             <a:fld id="{305C3DB1-8177-46AD-AF81-2EEE95D844A8}" type="datetimeFigureOut">
               <a:rPr lang="en-US" smtClean="0"/>
-              <a:t>3/3/2017</a:t>
+              <a:t>3/9/2017</a:t>
             </a:fld>
             <a:endParaRPr lang="en-US"/>
           </a:p>
@@ -2101,7 +2101,7 @@
           <a:p>
             <a:fld id="{305C3DB1-8177-46AD-AF81-2EEE95D844A8}" type="datetimeFigureOut">
               <a:rPr lang="en-US" smtClean="0"/>
-              <a:t>3/3/2017</a:t>
+              <a:t>3/9/2017</a:t>
             </a:fld>
             <a:endParaRPr lang="en-US"/>
           </a:p>
@@ -2358,7 +2358,7 @@
           <a:p>
             <a:fld id="{305C3DB1-8177-46AD-AF81-2EEE95D844A8}" type="datetimeFigureOut">
               <a:rPr lang="en-US" smtClean="0"/>
-              <a:t>3/3/2017</a:t>
+              <a:t>3/9/2017</a:t>
             </a:fld>
             <a:endParaRPr lang="en-US"/>
           </a:p>
@@ -2571,7 +2571,7 @@
           <a:p>
             <a:fld id="{305C3DB1-8177-46AD-AF81-2EEE95D844A8}" type="datetimeFigureOut">
               <a:rPr lang="en-US" smtClean="0"/>
-              <a:t>3/3/2017</a:t>
+              <a:t>3/9/2017</a:t>
             </a:fld>
             <a:endParaRPr lang="en-US"/>
           </a:p>
@@ -13276,13 +13276,6 @@
                   </a:rPr>
                   <a:t>21</a:t>
                 </a:r>
-                <a:endParaRPr lang="en-US" sz="1000" dirty="0">
-                  <a:solidFill>
-                    <a:schemeClr val="lt1"/>
-                  </a:solidFill>
-                  <a:latin typeface="Times New Roman" panose="02020603050405020304" pitchFamily="18" charset="0"/>
-                  <a:cs typeface="Times New Roman" panose="02020603050405020304" pitchFamily="18" charset="0"/>
-                </a:endParaRPr>
               </a:p>
             </p:txBody>
           </p:sp>
@@ -15008,14 +15001,7 @@
                   <a:latin typeface="Times New Roman" panose="02020603050405020304" pitchFamily="18" charset="0"/>
                   <a:cs typeface="Times New Roman" panose="02020603050405020304" pitchFamily="18" charset="0"/>
                 </a:rPr>
-                <a:t> </a:t>
-              </a:r>
-              <a:r>
-                <a:rPr lang="en-US" sz="1000" dirty="0" smtClean="0">
-                  <a:latin typeface="Times New Roman" panose="02020603050405020304" pitchFamily="18" charset="0"/>
-                  <a:cs typeface="Times New Roman" panose="02020603050405020304" pitchFamily="18" charset="0"/>
-                </a:rPr>
-                <a:t>20</a:t>
+                <a:t> 20</a:t>
               </a:r>
               <a:endParaRPr lang="en-US" sz="1000" dirty="0">
                 <a:latin typeface="Times New Roman" panose="02020603050405020304" pitchFamily="18" charset="0"/>
@@ -15674,115 +15660,18 @@
       </p:grpSpPr>
       <p:grpSp>
         <p:nvGrpSpPr>
-          <p:cNvPr id="53" name="Group 52"/>
+          <p:cNvPr id="104" name="Group 103"/>
           <p:cNvGrpSpPr/>
           <p:nvPr/>
         </p:nvGrpSpPr>
         <p:grpSpPr>
           <a:xfrm>
-            <a:off x="1884218" y="176643"/>
-            <a:ext cx="3193474" cy="4221739"/>
-            <a:chOff x="1884218" y="176643"/>
-            <a:chExt cx="3193474" cy="4221739"/>
+            <a:off x="976123" y="50519"/>
+            <a:ext cx="4415684" cy="4423538"/>
+            <a:chOff x="976123" y="50519"/>
+            <a:chExt cx="4415684" cy="4423538"/>
           </a:xfrm>
         </p:grpSpPr>
-        <p:sp>
-          <p:nvSpPr>
-            <p:cNvPr id="4" name="Rounded Rectangle 3"/>
-            <p:cNvSpPr/>
-            <p:nvPr/>
-          </p:nvSpPr>
-          <p:spPr>
-            <a:xfrm>
-              <a:off x="1884218" y="1496289"/>
-              <a:ext cx="3193474" cy="346364"/>
-            </a:xfrm>
-            <a:prstGeom prst="roundRect">
-              <a:avLst/>
-            </a:prstGeom>
-          </p:spPr>
-          <p:style>
-            <a:lnRef idx="2">
-              <a:schemeClr val="accent1"/>
-            </a:lnRef>
-            <a:fillRef idx="1">
-              <a:schemeClr val="lt1"/>
-            </a:fillRef>
-            <a:effectRef idx="0">
-              <a:schemeClr val="accent1"/>
-            </a:effectRef>
-            <a:fontRef idx="minor">
-              <a:schemeClr val="dk1"/>
-            </a:fontRef>
-          </p:style>
-          <p:txBody>
-            <a:bodyPr rtlCol="0" anchor="ctr"/>
-            <a:lstStyle/>
-            <a:p>
-              <a:pPr algn="ctr"/>
-              <a:r>
-                <a:rPr lang="en-US" sz="1000" b="1" dirty="0" smtClean="0">
-                  <a:latin typeface="Times New Roman" panose="02020603050405020304" pitchFamily="18" charset="0"/>
-                  <a:cs typeface="Times New Roman" panose="02020603050405020304" pitchFamily="18" charset="0"/>
-                </a:rPr>
-                <a:t>API</a:t>
-              </a:r>
-              <a:endParaRPr lang="en-US" sz="1000" b="1" dirty="0">
-                <a:latin typeface="Times New Roman" panose="02020603050405020304" pitchFamily="18" charset="0"/>
-                <a:cs typeface="Times New Roman" panose="02020603050405020304" pitchFamily="18" charset="0"/>
-              </a:endParaRPr>
-            </a:p>
-          </p:txBody>
-        </p:sp>
-        <p:sp>
-          <p:nvSpPr>
-            <p:cNvPr id="5" name="Rounded Rectangle 4"/>
-            <p:cNvSpPr/>
-            <p:nvPr/>
-          </p:nvSpPr>
-          <p:spPr>
-            <a:xfrm>
-              <a:off x="1884218" y="1911925"/>
-              <a:ext cx="3193474" cy="626042"/>
-            </a:xfrm>
-            <a:prstGeom prst="roundRect">
-              <a:avLst>
-                <a:gd name="adj" fmla="val 4740"/>
-              </a:avLst>
-            </a:prstGeom>
-          </p:spPr>
-          <p:style>
-            <a:lnRef idx="2">
-              <a:schemeClr val="accent1"/>
-            </a:lnRef>
-            <a:fillRef idx="1">
-              <a:schemeClr val="lt1"/>
-            </a:fillRef>
-            <a:effectRef idx="0">
-              <a:schemeClr val="accent1"/>
-            </a:effectRef>
-            <a:fontRef idx="minor">
-              <a:schemeClr val="dk1"/>
-            </a:fontRef>
-          </p:style>
-          <p:txBody>
-            <a:bodyPr rtlCol="0" anchor="t"/>
-            <a:lstStyle/>
-            <a:p>
-              <a:r>
-                <a:rPr lang="en-US" sz="1000" b="1" dirty="0" smtClean="0">
-                  <a:latin typeface="Times New Roman" panose="02020603050405020304" pitchFamily="18" charset="0"/>
-                  <a:cs typeface="Times New Roman" panose="02020603050405020304" pitchFamily="18" charset="0"/>
-                </a:rPr>
-                <a:t>Core</a:t>
-              </a:r>
-              <a:endParaRPr lang="en-US" sz="1000" b="1" dirty="0">
-                <a:latin typeface="Times New Roman" panose="02020603050405020304" pitchFamily="18" charset="0"/>
-                <a:cs typeface="Times New Roman" panose="02020603050405020304" pitchFamily="18" charset="0"/>
-              </a:endParaRPr>
-            </a:p>
-          </p:txBody>
-        </p:sp>
         <p:sp>
           <p:nvSpPr>
             <p:cNvPr id="6" name="Rounded Rectangle 5"/>
@@ -15791,8 +15680,8 @@
           </p:nvSpPr>
           <p:spPr>
             <a:xfrm>
-              <a:off x="2175163" y="831271"/>
-              <a:ext cx="914400" cy="401782"/>
+              <a:off x="1308325" y="705147"/>
+              <a:ext cx="1044067" cy="401782"/>
             </a:xfrm>
             <a:prstGeom prst="roundRect">
               <a:avLst/>
@@ -15839,8 +15728,8 @@
           </p:nvSpPr>
           <p:spPr>
             <a:xfrm>
-              <a:off x="3269672" y="176643"/>
-              <a:ext cx="914400" cy="401782"/>
+              <a:off x="2558041" y="50519"/>
+              <a:ext cx="1044067" cy="401782"/>
             </a:xfrm>
             <a:prstGeom prst="roundRect">
               <a:avLst/>
@@ -15887,8 +15776,8 @@
           </p:nvSpPr>
           <p:spPr>
             <a:xfrm>
-              <a:off x="3269672" y="831271"/>
-              <a:ext cx="914400" cy="401782"/>
+              <a:off x="2558041" y="705147"/>
+              <a:ext cx="1044067" cy="401782"/>
             </a:xfrm>
             <a:prstGeom prst="roundRect">
               <a:avLst/>
@@ -15937,7 +15826,7 @@
           </p:nvCxnSpPr>
           <p:spPr>
             <a:xfrm>
-              <a:off x="2632363" y="1233053"/>
+              <a:off x="1830359" y="1106929"/>
               <a:ext cx="0" cy="256309"/>
             </a:xfrm>
             <a:prstGeom prst="straightConnector1">
@@ -15974,7 +15863,7 @@
           </p:nvCxnSpPr>
           <p:spPr>
             <a:xfrm>
-              <a:off x="3726872" y="1233053"/>
+              <a:off x="3080075" y="1106929"/>
               <a:ext cx="0" cy="256309"/>
             </a:xfrm>
             <a:prstGeom prst="straightConnector1">
@@ -16011,7 +15900,7 @@
           </p:nvCxnSpPr>
           <p:spPr>
             <a:xfrm>
-              <a:off x="3726872" y="574962"/>
+              <a:off x="3080075" y="448838"/>
               <a:ext cx="0" cy="256309"/>
             </a:xfrm>
             <a:prstGeom prst="straightConnector1">
@@ -16042,14 +15931,111 @@
         </p:cxnSp>
         <p:sp>
           <p:nvSpPr>
+            <p:cNvPr id="4" name="Rounded Rectangle 3"/>
+            <p:cNvSpPr/>
+            <p:nvPr/>
+          </p:nvSpPr>
+          <p:spPr>
+            <a:xfrm>
+              <a:off x="976123" y="1370165"/>
+              <a:ext cx="4415684" cy="346364"/>
+            </a:xfrm>
+            <a:prstGeom prst="roundRect">
+              <a:avLst/>
+            </a:prstGeom>
+          </p:spPr>
+          <p:style>
+            <a:lnRef idx="2">
+              <a:schemeClr val="accent1"/>
+            </a:lnRef>
+            <a:fillRef idx="1">
+              <a:schemeClr val="lt1"/>
+            </a:fillRef>
+            <a:effectRef idx="0">
+              <a:schemeClr val="accent1"/>
+            </a:effectRef>
+            <a:fontRef idx="minor">
+              <a:schemeClr val="dk1"/>
+            </a:fontRef>
+          </p:style>
+          <p:txBody>
+            <a:bodyPr rtlCol="0" anchor="ctr"/>
+            <a:lstStyle/>
+            <a:p>
+              <a:pPr algn="ctr"/>
+              <a:r>
+                <a:rPr lang="en-US" sz="1000" b="1" dirty="0" smtClean="0">
+                  <a:latin typeface="Times New Roman" panose="02020603050405020304" pitchFamily="18" charset="0"/>
+                  <a:cs typeface="Times New Roman" panose="02020603050405020304" pitchFamily="18" charset="0"/>
+                </a:rPr>
+                <a:t>API</a:t>
+              </a:r>
+              <a:endParaRPr lang="en-US" sz="1000" b="1" dirty="0">
+                <a:latin typeface="Times New Roman" panose="02020603050405020304" pitchFamily="18" charset="0"/>
+                <a:cs typeface="Times New Roman" panose="02020603050405020304" pitchFamily="18" charset="0"/>
+              </a:endParaRPr>
+            </a:p>
+          </p:txBody>
+        </p:sp>
+        <p:sp>
+          <p:nvSpPr>
+            <p:cNvPr id="5" name="Rounded Rectangle 4"/>
+            <p:cNvSpPr/>
+            <p:nvPr/>
+          </p:nvSpPr>
+          <p:spPr>
+            <a:xfrm>
+              <a:off x="976123" y="1785801"/>
+              <a:ext cx="4415684" cy="615676"/>
+            </a:xfrm>
+            <a:prstGeom prst="roundRect">
+              <a:avLst>
+                <a:gd name="adj" fmla="val 4740"/>
+              </a:avLst>
+            </a:prstGeom>
+          </p:spPr>
+          <p:style>
+            <a:lnRef idx="2">
+              <a:schemeClr val="accent1"/>
+            </a:lnRef>
+            <a:fillRef idx="1">
+              <a:schemeClr val="lt1"/>
+            </a:fillRef>
+            <a:effectRef idx="0">
+              <a:schemeClr val="accent1"/>
+            </a:effectRef>
+            <a:fontRef idx="minor">
+              <a:schemeClr val="dk1"/>
+            </a:fontRef>
+          </p:style>
+          <p:txBody>
+            <a:bodyPr rtlCol="0" anchor="t"/>
+            <a:lstStyle/>
+            <a:p>
+              <a:r>
+                <a:rPr lang="en-US" sz="1000" b="1" dirty="0" smtClean="0">
+                  <a:latin typeface="Times New Roman" panose="02020603050405020304" pitchFamily="18" charset="0"/>
+                  <a:cs typeface="Times New Roman" panose="02020603050405020304" pitchFamily="18" charset="0"/>
+                </a:rPr>
+                <a:t>Core</a:t>
+              </a:r>
+              <a:endParaRPr lang="en-US" sz="1000" b="1" dirty="0">
+                <a:latin typeface="Times New Roman" panose="02020603050405020304" pitchFamily="18" charset="0"/>
+                <a:cs typeface="Times New Roman" panose="02020603050405020304" pitchFamily="18" charset="0"/>
+              </a:endParaRPr>
+            </a:p>
+          </p:txBody>
+        </p:sp>
+        <p:sp>
+          <p:nvSpPr>
             <p:cNvPr id="16" name="Rounded Rectangle 15"/>
             <p:cNvSpPr/>
             <p:nvPr/>
           </p:nvSpPr>
           <p:spPr>
             <a:xfrm>
-              <a:off x="1884218" y="2590784"/>
-              <a:ext cx="3193474" cy="1087598"/>
+              <a:off x="976123" y="2464659"/>
+              <a:ext cx="4415684" cy="1205553"/>
             </a:xfrm>
             <a:prstGeom prst="roundRect">
               <a:avLst>
@@ -16097,8 +16083,8 @@
           </p:nvSpPr>
           <p:spPr>
             <a:xfrm>
-              <a:off x="1999934" y="2920281"/>
-              <a:ext cx="2980775" cy="263237"/>
+              <a:off x="1136127" y="2794157"/>
+              <a:ext cx="4121579" cy="263237"/>
             </a:xfrm>
             <a:prstGeom prst="rect">
               <a:avLst/>
@@ -16145,27 +16131,25 @@
           </p:nvSpPr>
           <p:spPr>
             <a:xfrm>
-              <a:off x="2101797" y="3878837"/>
-              <a:ext cx="710675" cy="519545"/>
+              <a:off x="1136127" y="3954512"/>
+              <a:ext cx="982665" cy="519545"/>
             </a:xfrm>
             <a:prstGeom prst="flowChartMagneticDisk">
               <a:avLst/>
             </a:prstGeom>
           </p:spPr>
           <p:style>
-            <a:lnRef idx="2">
-              <a:schemeClr val="accent1">
-                <a:shade val="50000"/>
-              </a:schemeClr>
+            <a:lnRef idx="1">
+              <a:schemeClr val="accent1"/>
             </a:lnRef>
-            <a:fillRef idx="1">
+            <a:fillRef idx="2">
               <a:schemeClr val="accent1"/>
             </a:fillRef>
-            <a:effectRef idx="0">
+            <a:effectRef idx="1">
               <a:schemeClr val="accent1"/>
             </a:effectRef>
             <a:fontRef idx="minor">
-              <a:schemeClr val="lt1"/>
+              <a:schemeClr val="dk1"/>
             </a:fontRef>
           </p:style>
           <p:txBody>
@@ -16174,11 +16158,11 @@
             <a:p>
               <a:pPr algn="ctr"/>
               <a:r>
-                <a:rPr lang="en-US" sz="1000" dirty="0" smtClean="0">
+                <a:rPr lang="en-US" sz="1000" dirty="0" err="1" smtClean="0">
                   <a:latin typeface="Times New Roman" panose="02020603050405020304" pitchFamily="18" charset="0"/>
                   <a:cs typeface="Times New Roman" panose="02020603050405020304" pitchFamily="18" charset="0"/>
                 </a:rPr>
-                <a:t>KV Store</a:t>
+                <a:t>ZooKeeper</a:t>
               </a:r>
               <a:endParaRPr lang="en-US" sz="1000" dirty="0">
                 <a:latin typeface="Times New Roman" panose="02020603050405020304" pitchFamily="18" charset="0"/>
@@ -16195,27 +16179,25 @@
           </p:nvSpPr>
           <p:spPr>
             <a:xfrm>
-              <a:off x="3161932" y="3878837"/>
-              <a:ext cx="710675" cy="519545"/>
+              <a:off x="3372232" y="3954512"/>
+              <a:ext cx="982665" cy="519545"/>
             </a:xfrm>
             <a:prstGeom prst="flowChartMagneticDisk">
               <a:avLst/>
             </a:prstGeom>
           </p:spPr>
           <p:style>
-            <a:lnRef idx="2">
-              <a:schemeClr val="accent1">
-                <a:shade val="50000"/>
-              </a:schemeClr>
+            <a:lnRef idx="1">
+              <a:schemeClr val="accent1"/>
             </a:lnRef>
-            <a:fillRef idx="1">
+            <a:fillRef idx="2">
               <a:schemeClr val="accent1"/>
             </a:fillRef>
-            <a:effectRef idx="0">
+            <a:effectRef idx="1">
               <a:schemeClr val="accent1"/>
             </a:effectRef>
             <a:fontRef idx="minor">
-              <a:schemeClr val="lt1"/>
+              <a:schemeClr val="dk1"/>
             </a:fontRef>
           </p:style>
           <p:txBody>
@@ -16245,27 +16227,25 @@
           </p:nvSpPr>
           <p:spPr>
             <a:xfrm>
-              <a:off x="4222067" y="3878837"/>
-              <a:ext cx="710675" cy="519545"/>
+              <a:off x="4409142" y="3954512"/>
+              <a:ext cx="982665" cy="519545"/>
             </a:xfrm>
             <a:prstGeom prst="flowChartMagneticDisk">
               <a:avLst/>
             </a:prstGeom>
           </p:spPr>
           <p:style>
-            <a:lnRef idx="2">
-              <a:schemeClr val="accent1">
-                <a:shade val="50000"/>
-              </a:schemeClr>
+            <a:lnRef idx="1">
+              <a:schemeClr val="accent1"/>
             </a:lnRef>
-            <a:fillRef idx="1">
+            <a:fillRef idx="2">
               <a:schemeClr val="accent1"/>
             </a:fillRef>
-            <a:effectRef idx="0">
+            <a:effectRef idx="1">
               <a:schemeClr val="accent1"/>
             </a:effectRef>
             <a:fontRef idx="minor">
-              <a:schemeClr val="lt1"/>
+              <a:schemeClr val="dk1"/>
             </a:fontRef>
           </p:style>
           <p:txBody>
@@ -16295,8 +16275,8 @@
           </p:nvSpPr>
           <p:spPr>
             <a:xfrm>
-              <a:off x="1999934" y="3277897"/>
-              <a:ext cx="914400" cy="263237"/>
+              <a:off x="1136127" y="3149607"/>
+              <a:ext cx="675077" cy="438625"/>
             </a:xfrm>
             <a:prstGeom prst="rect">
               <a:avLst/>
@@ -16343,8 +16323,8 @@
           </p:nvSpPr>
           <p:spPr>
             <a:xfrm>
-              <a:off x="3572635" y="3277897"/>
-              <a:ext cx="543791" cy="263237"/>
+              <a:off x="3412731" y="3149607"/>
+              <a:ext cx="515030" cy="438625"/>
             </a:xfrm>
             <a:prstGeom prst="rect">
               <a:avLst/>
@@ -16391,8 +16371,8 @@
           </p:nvSpPr>
           <p:spPr>
             <a:xfrm>
-              <a:off x="4184071" y="3277897"/>
-              <a:ext cx="796637" cy="263237"/>
+              <a:off x="4342765" y="3149607"/>
+              <a:ext cx="922013" cy="438625"/>
             </a:xfrm>
             <a:prstGeom prst="rect">
               <a:avLst/>
@@ -16422,7 +16402,7 @@
                   <a:latin typeface="Times New Roman" panose="02020603050405020304" pitchFamily="18" charset="0"/>
                   <a:cs typeface="Times New Roman" panose="02020603050405020304" pitchFamily="18" charset="0"/>
                 </a:rPr>
-                <a:t>blocks</a:t>
+                <a:t>Data blocks</a:t>
               </a:r>
               <a:endParaRPr lang="en-US" sz="1000" dirty="0">
                 <a:latin typeface="Times New Roman" panose="02020603050405020304" pitchFamily="18" charset="0"/>
@@ -16439,8 +16419,8 @@
           </p:nvSpPr>
           <p:spPr>
             <a:xfrm>
-              <a:off x="2981980" y="3273564"/>
-              <a:ext cx="523009" cy="263237"/>
+              <a:off x="1867989" y="3149607"/>
+              <a:ext cx="723175" cy="438625"/>
             </a:xfrm>
             <a:prstGeom prst="rect">
               <a:avLst/>
@@ -16470,7 +16450,14 @@
                   <a:latin typeface="Times New Roman" panose="02020603050405020304" pitchFamily="18" charset="0"/>
                   <a:cs typeface="Times New Roman" panose="02020603050405020304" pitchFamily="18" charset="0"/>
                 </a:rPr>
-                <a:t>ibmap</a:t>
+                <a:t>Ibmap</a:t>
+              </a:r>
+              <a:r>
+                <a:rPr lang="en-US" sz="1000" dirty="0" smtClean="0">
+                  <a:latin typeface="Times New Roman" panose="02020603050405020304" pitchFamily="18" charset="0"/>
+                  <a:cs typeface="Times New Roman" panose="02020603050405020304" pitchFamily="18" charset="0"/>
+                </a:rPr>
+                <a:t> blocks</a:t>
               </a:r>
               <a:endParaRPr lang="en-US" sz="1000" dirty="0">
                 <a:latin typeface="Times New Roman" panose="02020603050405020304" pitchFamily="18" charset="0"/>
@@ -16487,8 +16474,8 @@
           </p:nvSpPr>
           <p:spPr>
             <a:xfrm>
-              <a:off x="1999935" y="2161298"/>
-              <a:ext cx="2980774" cy="263237"/>
+              <a:off x="1136127" y="2016124"/>
+              <a:ext cx="4121579" cy="263237"/>
             </a:xfrm>
             <a:prstGeom prst="rect">
               <a:avLst/>
@@ -16518,7 +16505,7 @@
                   <a:latin typeface="Times New Roman" panose="02020603050405020304" pitchFamily="18" charset="0"/>
                   <a:cs typeface="Times New Roman" panose="02020603050405020304" pitchFamily="18" charset="0"/>
                 </a:rPr>
-                <a:t>Driver</a:t>
+                <a:t>Driver, File Handles</a:t>
               </a:r>
               <a:endParaRPr lang="en-US" sz="1000" dirty="0">
                 <a:latin typeface="Times New Roman" panose="02020603050405020304" pitchFamily="18" charset="0"/>
@@ -16538,8 +16525,8 @@
           </p:nvCxnSpPr>
           <p:spPr>
             <a:xfrm flipH="1" flipV="1">
-              <a:off x="2457134" y="3541134"/>
-              <a:ext cx="1" cy="337703"/>
+              <a:off x="1473666" y="3588232"/>
+              <a:ext cx="153794" cy="366280"/>
             </a:xfrm>
             <a:prstGeom prst="line">
               <a:avLst/>
@@ -16573,55 +16560,14 @@
             <p:cNvPr id="30" name="Straight Connector 29"/>
             <p:cNvCxnSpPr>
               <a:stCxn id="19" idx="2"/>
-              <a:endCxn id="22" idx="1"/>
+              <a:endCxn id="21" idx="1"/>
             </p:cNvCxnSpPr>
             <p:nvPr/>
           </p:nvCxnSpPr>
           <p:spPr>
-            <a:xfrm>
-              <a:off x="3243485" y="3536801"/>
-              <a:ext cx="273785" cy="342036"/>
-            </a:xfrm>
-            <a:prstGeom prst="line">
-              <a:avLst/>
-            </a:prstGeom>
-            <a:ln w="9525">
-              <a:solidFill>
-                <a:schemeClr val="tx1"/>
-              </a:solidFill>
-              <a:prstDash val="dash"/>
-              <a:headEnd type="triangle" w="med" len="med"/>
-              <a:tailEnd type="triangle" w="med" len="med"/>
-            </a:ln>
-          </p:spPr>
-          <p:style>
-            <a:lnRef idx="1">
-              <a:schemeClr val="accent1"/>
-            </a:lnRef>
-            <a:fillRef idx="0">
-              <a:schemeClr val="accent1"/>
-            </a:fillRef>
-            <a:effectRef idx="0">
-              <a:schemeClr val="accent1"/>
-            </a:effectRef>
-            <a:fontRef idx="minor">
-              <a:schemeClr val="tx1"/>
-            </a:fontRef>
-          </p:style>
-        </p:cxnSp>
-        <p:cxnSp>
-          <p:nvCxnSpPr>
-            <p:cNvPr id="32" name="Straight Connector 31"/>
-            <p:cNvCxnSpPr>
-              <a:stCxn id="19" idx="2"/>
-              <a:endCxn id="23" idx="1"/>
-            </p:cNvCxnSpPr>
-            <p:nvPr/>
-          </p:nvCxnSpPr>
-          <p:spPr>
-            <a:xfrm>
-              <a:off x="3243485" y="3536801"/>
-              <a:ext cx="1333920" cy="342036"/>
+            <a:xfrm flipH="1">
+              <a:off x="1627460" y="3588232"/>
+              <a:ext cx="602117" cy="366280"/>
             </a:xfrm>
             <a:prstGeom prst="line">
               <a:avLst/>
@@ -16655,55 +16601,14 @@
             <p:cNvPr id="34" name="Straight Connector 33"/>
             <p:cNvCxnSpPr>
               <a:stCxn id="17" idx="2"/>
-              <a:endCxn id="22" idx="1"/>
+              <a:endCxn id="21" idx="1"/>
             </p:cNvCxnSpPr>
             <p:nvPr/>
           </p:nvCxnSpPr>
           <p:spPr>
             <a:xfrm flipH="1">
-              <a:off x="3517270" y="3541134"/>
-              <a:ext cx="327261" cy="337703"/>
-            </a:xfrm>
-            <a:prstGeom prst="line">
-              <a:avLst/>
-            </a:prstGeom>
-            <a:ln w="9525">
-              <a:solidFill>
-                <a:schemeClr val="tx1"/>
-              </a:solidFill>
-              <a:prstDash val="dash"/>
-              <a:headEnd type="triangle" w="med" len="med"/>
-              <a:tailEnd type="triangle" w="med" len="med"/>
-            </a:ln>
-          </p:spPr>
-          <p:style>
-            <a:lnRef idx="1">
-              <a:schemeClr val="accent1"/>
-            </a:lnRef>
-            <a:fillRef idx="0">
-              <a:schemeClr val="accent1"/>
-            </a:fillRef>
-            <a:effectRef idx="0">
-              <a:schemeClr val="accent1"/>
-            </a:effectRef>
-            <a:fontRef idx="minor">
-              <a:schemeClr val="tx1"/>
-            </a:fontRef>
-          </p:style>
-        </p:cxnSp>
-        <p:cxnSp>
-          <p:nvCxnSpPr>
-            <p:cNvPr id="36" name="Straight Connector 35"/>
-            <p:cNvCxnSpPr>
-              <a:stCxn id="17" idx="2"/>
-              <a:endCxn id="23" idx="1"/>
-            </p:cNvCxnSpPr>
-            <p:nvPr/>
-          </p:nvCxnSpPr>
-          <p:spPr>
-            <a:xfrm>
-              <a:off x="3844531" y="3541134"/>
-              <a:ext cx="732874" cy="337703"/>
+              <a:off x="1627460" y="3588232"/>
+              <a:ext cx="2042786" cy="366280"/>
             </a:xfrm>
             <a:prstGeom prst="line">
               <a:avLst/>
@@ -16743,8 +16648,8 @@
           </p:nvCxnSpPr>
           <p:spPr>
             <a:xfrm flipH="1">
-              <a:off x="3517270" y="3541134"/>
-              <a:ext cx="1065120" cy="337703"/>
+              <a:off x="3863565" y="3588232"/>
+              <a:ext cx="940207" cy="366280"/>
             </a:xfrm>
             <a:prstGeom prst="line">
               <a:avLst/>
@@ -16783,9 +16688,9 @@
             <p:nvPr/>
           </p:nvCxnSpPr>
           <p:spPr>
-            <a:xfrm flipH="1">
-              <a:off x="4577405" y="3541134"/>
-              <a:ext cx="4985" cy="337703"/>
+            <a:xfrm>
+              <a:off x="4803772" y="3588232"/>
+              <a:ext cx="96703" cy="366280"/>
             </a:xfrm>
             <a:prstGeom prst="line">
               <a:avLst/>
@@ -16825,8 +16730,104 @@
           </p:nvCxnSpPr>
           <p:spPr>
             <a:xfrm>
-              <a:off x="3490322" y="2424535"/>
-              <a:ext cx="0" cy="495746"/>
+              <a:off x="3196917" y="2279361"/>
+              <a:ext cx="0" cy="514796"/>
+            </a:xfrm>
+            <a:prstGeom prst="straightConnector1">
+              <a:avLst/>
+            </a:prstGeom>
+            <a:ln w="9525">
+              <a:solidFill>
+                <a:schemeClr val="tx1"/>
+              </a:solidFill>
+              <a:prstDash val="dash"/>
+              <a:headEnd type="triangle" w="med" len="med"/>
+              <a:tailEnd type="triangle" w="med" len="med"/>
+            </a:ln>
+          </p:spPr>
+          <p:style>
+            <a:lnRef idx="1">
+              <a:schemeClr val="accent1"/>
+            </a:lnRef>
+            <a:fillRef idx="0">
+              <a:schemeClr val="accent1"/>
+            </a:fillRef>
+            <a:effectRef idx="0">
+              <a:schemeClr val="accent1"/>
+            </a:effectRef>
+            <a:fontRef idx="minor">
+              <a:schemeClr val="tx1"/>
+            </a:fontRef>
+          </p:style>
+        </p:cxnSp>
+        <p:sp>
+          <p:nvSpPr>
+            <p:cNvPr id="43" name="Rectangle 42"/>
+            <p:cNvSpPr/>
+            <p:nvPr/>
+          </p:nvSpPr>
+          <p:spPr>
+            <a:xfrm>
+              <a:off x="2636925" y="3149607"/>
+              <a:ext cx="723175" cy="438625"/>
+            </a:xfrm>
+            <a:prstGeom prst="rect">
+              <a:avLst/>
+            </a:prstGeom>
+          </p:spPr>
+          <p:style>
+            <a:lnRef idx="2">
+              <a:schemeClr val="accent2"/>
+            </a:lnRef>
+            <a:fillRef idx="1">
+              <a:schemeClr val="lt1"/>
+            </a:fillRef>
+            <a:effectRef idx="0">
+              <a:schemeClr val="accent2"/>
+            </a:effectRef>
+            <a:fontRef idx="minor">
+              <a:schemeClr val="dk1"/>
+            </a:fontRef>
+          </p:style>
+          <p:txBody>
+            <a:bodyPr rtlCol="0" anchor="ctr"/>
+            <a:lstStyle/>
+            <a:p>
+              <a:pPr algn="ctr"/>
+              <a:r>
+                <a:rPr lang="en-US" sz="1000" dirty="0" err="1" smtClean="0">
+                  <a:latin typeface="Times New Roman" panose="02020603050405020304" pitchFamily="18" charset="0"/>
+                  <a:cs typeface="Times New Roman" panose="02020603050405020304" pitchFamily="18" charset="0"/>
+                </a:rPr>
+                <a:t>Inode</a:t>
+              </a:r>
+              <a:r>
+                <a:rPr lang="en-US" sz="1000" dirty="0" smtClean="0">
+                  <a:latin typeface="Times New Roman" panose="02020603050405020304" pitchFamily="18" charset="0"/>
+                  <a:cs typeface="Times New Roman" panose="02020603050405020304" pitchFamily="18" charset="0"/>
+                </a:rPr>
+                <a:t> blocks</a:t>
+              </a:r>
+              <a:endParaRPr lang="en-US" sz="1000" dirty="0">
+                <a:latin typeface="Times New Roman" panose="02020603050405020304" pitchFamily="18" charset="0"/>
+                <a:cs typeface="Times New Roman" panose="02020603050405020304" pitchFamily="18" charset="0"/>
+              </a:endParaRPr>
+            </a:p>
+          </p:txBody>
+        </p:sp>
+        <p:cxnSp>
+          <p:nvCxnSpPr>
+            <p:cNvPr id="92" name="Straight Arrow Connector 91"/>
+            <p:cNvCxnSpPr>
+              <a:stCxn id="43" idx="2"/>
+              <a:endCxn id="21" idx="1"/>
+            </p:cNvCxnSpPr>
+            <p:nvPr/>
+          </p:nvCxnSpPr>
+          <p:spPr>
+            <a:xfrm flipH="1">
+              <a:off x="1627460" y="3588232"/>
+              <a:ext cx="1371053" cy="366280"/>
             </a:xfrm>
             <a:prstGeom prst="straightConnector1">
               <a:avLst/>

</xml_diff>

<commit_message>
Updates sections 3 and 4, and the architecture diagram.
</commit_message>
<xml_diff>
--- a/docs/design/figures/fs-design.pptx
+++ b/docs/design/figures/fs-design.pptx
@@ -248,7 +248,7 @@
           <a:p>
             <a:fld id="{305C3DB1-8177-46AD-AF81-2EEE95D844A8}" type="datetimeFigureOut">
               <a:rPr lang="en-US" smtClean="0"/>
-              <a:t>3/9/2017</a:t>
+              <a:t>3/10/2017</a:t>
             </a:fld>
             <a:endParaRPr lang="en-US"/>
           </a:p>
@@ -418,7 +418,7 @@
           <a:p>
             <a:fld id="{305C3DB1-8177-46AD-AF81-2EEE95D844A8}" type="datetimeFigureOut">
               <a:rPr lang="en-US" smtClean="0"/>
-              <a:t>3/9/2017</a:t>
+              <a:t>3/10/2017</a:t>
             </a:fld>
             <a:endParaRPr lang="en-US"/>
           </a:p>
@@ -598,7 +598,7 @@
           <a:p>
             <a:fld id="{305C3DB1-8177-46AD-AF81-2EEE95D844A8}" type="datetimeFigureOut">
               <a:rPr lang="en-US" smtClean="0"/>
-              <a:t>3/9/2017</a:t>
+              <a:t>3/10/2017</a:t>
             </a:fld>
             <a:endParaRPr lang="en-US"/>
           </a:p>
@@ -768,7 +768,7 @@
           <a:p>
             <a:fld id="{305C3DB1-8177-46AD-AF81-2EEE95D844A8}" type="datetimeFigureOut">
               <a:rPr lang="en-US" smtClean="0"/>
-              <a:t>3/9/2017</a:t>
+              <a:t>3/10/2017</a:t>
             </a:fld>
             <a:endParaRPr lang="en-US"/>
           </a:p>
@@ -1012,7 +1012,7 @@
           <a:p>
             <a:fld id="{305C3DB1-8177-46AD-AF81-2EEE95D844A8}" type="datetimeFigureOut">
               <a:rPr lang="en-US" smtClean="0"/>
-              <a:t>3/9/2017</a:t>
+              <a:t>3/10/2017</a:t>
             </a:fld>
             <a:endParaRPr lang="en-US"/>
           </a:p>
@@ -1244,7 +1244,7 @@
           <a:p>
             <a:fld id="{305C3DB1-8177-46AD-AF81-2EEE95D844A8}" type="datetimeFigureOut">
               <a:rPr lang="en-US" smtClean="0"/>
-              <a:t>3/9/2017</a:t>
+              <a:t>3/10/2017</a:t>
             </a:fld>
             <a:endParaRPr lang="en-US"/>
           </a:p>
@@ -1611,7 +1611,7 @@
           <a:p>
             <a:fld id="{305C3DB1-8177-46AD-AF81-2EEE95D844A8}" type="datetimeFigureOut">
               <a:rPr lang="en-US" smtClean="0"/>
-              <a:t>3/9/2017</a:t>
+              <a:t>3/10/2017</a:t>
             </a:fld>
             <a:endParaRPr lang="en-US"/>
           </a:p>
@@ -1729,7 +1729,7 @@
           <a:p>
             <a:fld id="{305C3DB1-8177-46AD-AF81-2EEE95D844A8}" type="datetimeFigureOut">
               <a:rPr lang="en-US" smtClean="0"/>
-              <a:t>3/9/2017</a:t>
+              <a:t>3/10/2017</a:t>
             </a:fld>
             <a:endParaRPr lang="en-US"/>
           </a:p>
@@ -1824,7 +1824,7 @@
           <a:p>
             <a:fld id="{305C3DB1-8177-46AD-AF81-2EEE95D844A8}" type="datetimeFigureOut">
               <a:rPr lang="en-US" smtClean="0"/>
-              <a:t>3/9/2017</a:t>
+              <a:t>3/10/2017</a:t>
             </a:fld>
             <a:endParaRPr lang="en-US"/>
           </a:p>
@@ -2101,7 +2101,7 @@
           <a:p>
             <a:fld id="{305C3DB1-8177-46AD-AF81-2EEE95D844A8}" type="datetimeFigureOut">
               <a:rPr lang="en-US" smtClean="0"/>
-              <a:t>3/9/2017</a:t>
+              <a:t>3/10/2017</a:t>
             </a:fld>
             <a:endParaRPr lang="en-US"/>
           </a:p>
@@ -2358,7 +2358,7 @@
           <a:p>
             <a:fld id="{305C3DB1-8177-46AD-AF81-2EEE95D844A8}" type="datetimeFigureOut">
               <a:rPr lang="en-US" smtClean="0"/>
-              <a:t>3/9/2017</a:t>
+              <a:t>3/10/2017</a:t>
             </a:fld>
             <a:endParaRPr lang="en-US"/>
           </a:p>
@@ -2571,7 +2571,7 @@
           <a:p>
             <a:fld id="{305C3DB1-8177-46AD-AF81-2EEE95D844A8}" type="datetimeFigureOut">
               <a:rPr lang="en-US" smtClean="0"/>
-              <a:t>3/9/2017</a:t>
+              <a:t>3/10/2017</a:t>
             </a:fld>
             <a:endParaRPr lang="en-US"/>
           </a:p>
@@ -15658,1205 +15658,1442 @@
           <a:chExt cx="0" cy="0"/>
         </a:xfrm>
       </p:grpSpPr>
-      <p:grpSp>
-        <p:nvGrpSpPr>
-          <p:cNvPr id="104" name="Group 103"/>
-          <p:cNvGrpSpPr/>
+      <p:sp>
+        <p:nvSpPr>
+          <p:cNvPr id="6" name="Rounded Rectangle 5"/>
+          <p:cNvSpPr/>
           <p:nvPr/>
-        </p:nvGrpSpPr>
-        <p:grpSpPr>
+        </p:nvSpPr>
+        <p:spPr>
           <a:xfrm>
-            <a:off x="976123" y="50519"/>
-            <a:ext cx="4415684" cy="4423538"/>
-            <a:chOff x="976123" y="50519"/>
-            <a:chExt cx="4415684" cy="4423538"/>
+            <a:off x="2048982" y="705147"/>
+            <a:ext cx="1044067" cy="401782"/>
           </a:xfrm>
-        </p:grpSpPr>
-        <p:sp>
-          <p:nvSpPr>
-            <p:cNvPr id="6" name="Rounded Rectangle 5"/>
-            <p:cNvSpPr/>
-            <p:nvPr/>
-          </p:nvSpPr>
-          <p:spPr>
-            <a:xfrm>
-              <a:off x="1308325" y="705147"/>
-              <a:ext cx="1044067" cy="401782"/>
-            </a:xfrm>
-            <a:prstGeom prst="roundRect">
-              <a:avLst/>
-            </a:prstGeom>
-          </p:spPr>
-          <p:style>
-            <a:lnRef idx="2">
-              <a:schemeClr val="accent1"/>
-            </a:lnRef>
-            <a:fillRef idx="1">
-              <a:schemeClr val="lt1"/>
-            </a:fillRef>
-            <a:effectRef idx="0">
-              <a:schemeClr val="accent1"/>
-            </a:effectRef>
-            <a:fontRef idx="minor">
-              <a:schemeClr val="dk1"/>
-            </a:fontRef>
-          </p:style>
-          <p:txBody>
-            <a:bodyPr rtlCol="0" anchor="ctr"/>
-            <a:lstStyle/>
-            <a:p>
-              <a:pPr algn="ctr"/>
-              <a:r>
-                <a:rPr lang="en-US" sz="1000" dirty="0" smtClean="0">
-                  <a:latin typeface="Times New Roman" panose="02020603050405020304" pitchFamily="18" charset="0"/>
-                  <a:cs typeface="Times New Roman" panose="02020603050405020304" pitchFamily="18" charset="0"/>
-                </a:rPr>
-                <a:t>Client Program</a:t>
-              </a:r>
-              <a:endParaRPr lang="en-US" sz="1000" dirty="0">
+          <a:prstGeom prst="roundRect">
+            <a:avLst/>
+          </a:prstGeom>
+        </p:spPr>
+        <p:style>
+          <a:lnRef idx="2">
+            <a:schemeClr val="accent1"/>
+          </a:lnRef>
+          <a:fillRef idx="1">
+            <a:schemeClr val="lt1"/>
+          </a:fillRef>
+          <a:effectRef idx="0">
+            <a:schemeClr val="accent1"/>
+          </a:effectRef>
+          <a:fontRef idx="minor">
+            <a:schemeClr val="dk1"/>
+          </a:fontRef>
+        </p:style>
+        <p:txBody>
+          <a:bodyPr rtlCol="0" anchor="ctr"/>
+          <a:lstStyle/>
+          <a:p>
+            <a:pPr algn="ctr"/>
+            <a:r>
+              <a:rPr lang="en-US" sz="1000" dirty="0" smtClean="0">
                 <a:latin typeface="Times New Roman" panose="02020603050405020304" pitchFamily="18" charset="0"/>
                 <a:cs typeface="Times New Roman" panose="02020603050405020304" pitchFamily="18" charset="0"/>
-              </a:endParaRPr>
-            </a:p>
-          </p:txBody>
-        </p:sp>
-        <p:sp>
-          <p:nvSpPr>
-            <p:cNvPr id="7" name="Rounded Rectangle 6"/>
-            <p:cNvSpPr/>
-            <p:nvPr/>
-          </p:nvSpPr>
-          <p:spPr>
-            <a:xfrm>
-              <a:off x="2558041" y="50519"/>
-              <a:ext cx="1044067" cy="401782"/>
-            </a:xfrm>
-            <a:prstGeom prst="roundRect">
-              <a:avLst/>
-            </a:prstGeom>
-          </p:spPr>
-          <p:style>
-            <a:lnRef idx="2">
-              <a:schemeClr val="accent1"/>
-            </a:lnRef>
-            <a:fillRef idx="1">
-              <a:schemeClr val="lt1"/>
-            </a:fillRef>
-            <a:effectRef idx="0">
-              <a:schemeClr val="accent1"/>
-            </a:effectRef>
-            <a:fontRef idx="minor">
-              <a:schemeClr val="dk1"/>
-            </a:fontRef>
-          </p:style>
-          <p:txBody>
-            <a:bodyPr rtlCol="0" anchor="ctr"/>
-            <a:lstStyle/>
-            <a:p>
-              <a:pPr algn="ctr"/>
-              <a:r>
-                <a:rPr lang="en-US" sz="1000" dirty="0" smtClean="0">
-                  <a:latin typeface="Times New Roman" panose="02020603050405020304" pitchFamily="18" charset="0"/>
-                  <a:cs typeface="Times New Roman" panose="02020603050405020304" pitchFamily="18" charset="0"/>
-                </a:rPr>
-                <a:t>Client Program</a:t>
-              </a:r>
-              <a:endParaRPr lang="en-US" sz="1000" dirty="0">
+              </a:rPr>
+              <a:t>Client Program</a:t>
+            </a:r>
+            <a:endParaRPr lang="en-US" sz="1000" dirty="0">
+              <a:latin typeface="Times New Roman" panose="02020603050405020304" pitchFamily="18" charset="0"/>
+              <a:cs typeface="Times New Roman" panose="02020603050405020304" pitchFamily="18" charset="0"/>
+            </a:endParaRPr>
+          </a:p>
+        </p:txBody>
+      </p:sp>
+      <p:sp>
+        <p:nvSpPr>
+          <p:cNvPr id="7" name="Rounded Rectangle 6"/>
+          <p:cNvSpPr/>
+          <p:nvPr/>
+        </p:nvSpPr>
+        <p:spPr>
+          <a:xfrm>
+            <a:off x="3298698" y="50519"/>
+            <a:ext cx="1044067" cy="401782"/>
+          </a:xfrm>
+          <a:prstGeom prst="roundRect">
+            <a:avLst/>
+          </a:prstGeom>
+        </p:spPr>
+        <p:style>
+          <a:lnRef idx="2">
+            <a:schemeClr val="accent1"/>
+          </a:lnRef>
+          <a:fillRef idx="1">
+            <a:schemeClr val="lt1"/>
+          </a:fillRef>
+          <a:effectRef idx="0">
+            <a:schemeClr val="accent1"/>
+          </a:effectRef>
+          <a:fontRef idx="minor">
+            <a:schemeClr val="dk1"/>
+          </a:fontRef>
+        </p:style>
+        <p:txBody>
+          <a:bodyPr rtlCol="0" anchor="ctr"/>
+          <a:lstStyle/>
+          <a:p>
+            <a:pPr algn="ctr"/>
+            <a:r>
+              <a:rPr lang="en-US" sz="1000" dirty="0" smtClean="0">
                 <a:latin typeface="Times New Roman" panose="02020603050405020304" pitchFamily="18" charset="0"/>
                 <a:cs typeface="Times New Roman" panose="02020603050405020304" pitchFamily="18" charset="0"/>
-              </a:endParaRPr>
-            </a:p>
-          </p:txBody>
-        </p:sp>
-        <p:sp>
-          <p:nvSpPr>
-            <p:cNvPr id="8" name="Rounded Rectangle 7"/>
-            <p:cNvSpPr/>
-            <p:nvPr/>
-          </p:nvSpPr>
-          <p:spPr>
-            <a:xfrm>
-              <a:off x="2558041" y="705147"/>
-              <a:ext cx="1044067" cy="401782"/>
-            </a:xfrm>
-            <a:prstGeom prst="roundRect">
-              <a:avLst/>
-            </a:prstGeom>
-          </p:spPr>
-          <p:style>
-            <a:lnRef idx="2">
-              <a:schemeClr val="accent1"/>
-            </a:lnRef>
-            <a:fillRef idx="1">
-              <a:schemeClr val="lt1"/>
-            </a:fillRef>
-            <a:effectRef idx="0">
-              <a:schemeClr val="accent1"/>
-            </a:effectRef>
-            <a:fontRef idx="minor">
-              <a:schemeClr val="dk1"/>
-            </a:fontRef>
-          </p:style>
-          <p:txBody>
-            <a:bodyPr rtlCol="0" anchor="ctr"/>
-            <a:lstStyle/>
-            <a:p>
-              <a:pPr algn="ctr"/>
-              <a:r>
-                <a:rPr lang="en-US" sz="1000" dirty="0" smtClean="0">
-                  <a:latin typeface="Times New Roman" panose="02020603050405020304" pitchFamily="18" charset="0"/>
-                  <a:cs typeface="Times New Roman" panose="02020603050405020304" pitchFamily="18" charset="0"/>
-                </a:rPr>
-                <a:t>RPC Framework</a:t>
-              </a:r>
-              <a:endParaRPr lang="en-US" sz="1000" dirty="0">
+              </a:rPr>
+              <a:t>Client Program</a:t>
+            </a:r>
+            <a:endParaRPr lang="en-US" sz="1000" dirty="0">
+              <a:latin typeface="Times New Roman" panose="02020603050405020304" pitchFamily="18" charset="0"/>
+              <a:cs typeface="Times New Roman" panose="02020603050405020304" pitchFamily="18" charset="0"/>
+            </a:endParaRPr>
+          </a:p>
+        </p:txBody>
+      </p:sp>
+      <p:sp>
+        <p:nvSpPr>
+          <p:cNvPr id="8" name="Rounded Rectangle 7"/>
+          <p:cNvSpPr/>
+          <p:nvPr/>
+        </p:nvSpPr>
+        <p:spPr>
+          <a:xfrm>
+            <a:off x="3298698" y="705147"/>
+            <a:ext cx="1044067" cy="401782"/>
+          </a:xfrm>
+          <a:prstGeom prst="roundRect">
+            <a:avLst/>
+          </a:prstGeom>
+        </p:spPr>
+        <p:style>
+          <a:lnRef idx="2">
+            <a:schemeClr val="accent1"/>
+          </a:lnRef>
+          <a:fillRef idx="1">
+            <a:schemeClr val="lt1"/>
+          </a:fillRef>
+          <a:effectRef idx="0">
+            <a:schemeClr val="accent1"/>
+          </a:effectRef>
+          <a:fontRef idx="minor">
+            <a:schemeClr val="dk1"/>
+          </a:fontRef>
+        </p:style>
+        <p:txBody>
+          <a:bodyPr rtlCol="0" anchor="ctr"/>
+          <a:lstStyle/>
+          <a:p>
+            <a:pPr algn="ctr"/>
+            <a:r>
+              <a:rPr lang="en-US" sz="1000" dirty="0" smtClean="0">
                 <a:latin typeface="Times New Roman" panose="02020603050405020304" pitchFamily="18" charset="0"/>
                 <a:cs typeface="Times New Roman" panose="02020603050405020304" pitchFamily="18" charset="0"/>
-              </a:endParaRPr>
-            </a:p>
-          </p:txBody>
-        </p:sp>
-        <p:cxnSp>
-          <p:nvCxnSpPr>
-            <p:cNvPr id="10" name="Straight Arrow Connector 9"/>
-            <p:cNvCxnSpPr>
-              <a:stCxn id="6" idx="2"/>
-            </p:cNvCxnSpPr>
-            <p:nvPr/>
-          </p:nvCxnSpPr>
-          <p:spPr>
-            <a:xfrm>
-              <a:off x="1830359" y="1106929"/>
-              <a:ext cx="0" cy="256309"/>
-            </a:xfrm>
-            <a:prstGeom prst="straightConnector1">
-              <a:avLst/>
-            </a:prstGeom>
-            <a:ln w="12700">
-              <a:solidFill>
-                <a:schemeClr val="tx1"/>
-              </a:solidFill>
-              <a:headEnd type="triangle" w="med" len="med"/>
-              <a:tailEnd type="triangle" w="med" len="med"/>
-            </a:ln>
-          </p:spPr>
-          <p:style>
-            <a:lnRef idx="1">
-              <a:schemeClr val="accent1"/>
-            </a:lnRef>
-            <a:fillRef idx="0">
-              <a:schemeClr val="accent1"/>
-            </a:fillRef>
-            <a:effectRef idx="0">
-              <a:schemeClr val="accent1"/>
-            </a:effectRef>
-            <a:fontRef idx="minor">
+              </a:rPr>
+              <a:t>RPC Framework</a:t>
+            </a:r>
+            <a:endParaRPr lang="en-US" sz="1000" dirty="0">
+              <a:latin typeface="Times New Roman" panose="02020603050405020304" pitchFamily="18" charset="0"/>
+              <a:cs typeface="Times New Roman" panose="02020603050405020304" pitchFamily="18" charset="0"/>
+            </a:endParaRPr>
+          </a:p>
+        </p:txBody>
+      </p:sp>
+      <p:cxnSp>
+        <p:nvCxnSpPr>
+          <p:cNvPr id="10" name="Straight Arrow Connector 9"/>
+          <p:cNvCxnSpPr>
+            <a:stCxn id="6" idx="2"/>
+          </p:cNvCxnSpPr>
+          <p:nvPr/>
+        </p:nvCxnSpPr>
+        <p:spPr>
+          <a:xfrm>
+            <a:off x="2571016" y="1106929"/>
+            <a:ext cx="0" cy="256309"/>
+          </a:xfrm>
+          <a:prstGeom prst="straightConnector1">
+            <a:avLst/>
+          </a:prstGeom>
+          <a:ln w="12700">
+            <a:solidFill>
               <a:schemeClr val="tx1"/>
-            </a:fontRef>
-          </p:style>
-        </p:cxnSp>
-        <p:cxnSp>
-          <p:nvCxnSpPr>
-            <p:cNvPr id="11" name="Straight Arrow Connector 10"/>
-            <p:cNvCxnSpPr/>
-            <p:nvPr/>
-          </p:nvCxnSpPr>
-          <p:spPr>
-            <a:xfrm>
-              <a:off x="3080075" y="1106929"/>
-              <a:ext cx="0" cy="256309"/>
-            </a:xfrm>
-            <a:prstGeom prst="straightConnector1">
-              <a:avLst/>
-            </a:prstGeom>
-            <a:ln w="12700">
-              <a:solidFill>
-                <a:schemeClr val="tx1"/>
-              </a:solidFill>
-              <a:headEnd type="triangle" w="med" len="med"/>
-              <a:tailEnd type="triangle" w="med" len="med"/>
-            </a:ln>
-          </p:spPr>
-          <p:style>
-            <a:lnRef idx="1">
-              <a:schemeClr val="accent1"/>
-            </a:lnRef>
-            <a:fillRef idx="0">
-              <a:schemeClr val="accent1"/>
-            </a:fillRef>
-            <a:effectRef idx="0">
-              <a:schemeClr val="accent1"/>
-            </a:effectRef>
-            <a:fontRef idx="minor">
+            </a:solidFill>
+            <a:headEnd type="triangle" w="med" len="med"/>
+            <a:tailEnd type="triangle" w="med" len="med"/>
+          </a:ln>
+        </p:spPr>
+        <p:style>
+          <a:lnRef idx="1">
+            <a:schemeClr val="accent1"/>
+          </a:lnRef>
+          <a:fillRef idx="0">
+            <a:schemeClr val="accent1"/>
+          </a:fillRef>
+          <a:effectRef idx="0">
+            <a:schemeClr val="accent1"/>
+          </a:effectRef>
+          <a:fontRef idx="minor">
+            <a:schemeClr val="tx1"/>
+          </a:fontRef>
+        </p:style>
+      </p:cxnSp>
+      <p:cxnSp>
+        <p:nvCxnSpPr>
+          <p:cNvPr id="11" name="Straight Arrow Connector 10"/>
+          <p:cNvCxnSpPr/>
+          <p:nvPr/>
+        </p:nvCxnSpPr>
+        <p:spPr>
+          <a:xfrm>
+            <a:off x="3820732" y="1106929"/>
+            <a:ext cx="0" cy="256309"/>
+          </a:xfrm>
+          <a:prstGeom prst="straightConnector1">
+            <a:avLst/>
+          </a:prstGeom>
+          <a:ln w="12700">
+            <a:solidFill>
               <a:schemeClr val="tx1"/>
-            </a:fontRef>
-          </p:style>
-        </p:cxnSp>
-        <p:cxnSp>
-          <p:nvCxnSpPr>
-            <p:cNvPr id="12" name="Straight Arrow Connector 11"/>
-            <p:cNvCxnSpPr/>
-            <p:nvPr/>
-          </p:nvCxnSpPr>
-          <p:spPr>
-            <a:xfrm>
-              <a:off x="3080075" y="448838"/>
-              <a:ext cx="0" cy="256309"/>
-            </a:xfrm>
-            <a:prstGeom prst="straightConnector1">
-              <a:avLst/>
-            </a:prstGeom>
-            <a:ln w="12700">
-              <a:solidFill>
-                <a:schemeClr val="tx1"/>
-              </a:solidFill>
-              <a:headEnd type="triangle" w="med" len="med"/>
-              <a:tailEnd type="triangle" w="med" len="med"/>
-            </a:ln>
-          </p:spPr>
-          <p:style>
-            <a:lnRef idx="1">
-              <a:schemeClr val="accent1"/>
-            </a:lnRef>
-            <a:fillRef idx="0">
-              <a:schemeClr val="accent1"/>
-            </a:fillRef>
-            <a:effectRef idx="0">
-              <a:schemeClr val="accent1"/>
-            </a:effectRef>
-            <a:fontRef idx="minor">
+            </a:solidFill>
+            <a:headEnd type="triangle" w="med" len="med"/>
+            <a:tailEnd type="triangle" w="med" len="med"/>
+          </a:ln>
+        </p:spPr>
+        <p:style>
+          <a:lnRef idx="1">
+            <a:schemeClr val="accent1"/>
+          </a:lnRef>
+          <a:fillRef idx="0">
+            <a:schemeClr val="accent1"/>
+          </a:fillRef>
+          <a:effectRef idx="0">
+            <a:schemeClr val="accent1"/>
+          </a:effectRef>
+          <a:fontRef idx="minor">
+            <a:schemeClr val="tx1"/>
+          </a:fontRef>
+        </p:style>
+      </p:cxnSp>
+      <p:cxnSp>
+        <p:nvCxnSpPr>
+          <p:cNvPr id="12" name="Straight Arrow Connector 11"/>
+          <p:cNvCxnSpPr/>
+          <p:nvPr/>
+        </p:nvCxnSpPr>
+        <p:spPr>
+          <a:xfrm>
+            <a:off x="3820732" y="448838"/>
+            <a:ext cx="0" cy="256309"/>
+          </a:xfrm>
+          <a:prstGeom prst="straightConnector1">
+            <a:avLst/>
+          </a:prstGeom>
+          <a:ln w="12700">
+            <a:solidFill>
               <a:schemeClr val="tx1"/>
-            </a:fontRef>
-          </p:style>
-        </p:cxnSp>
-        <p:sp>
-          <p:nvSpPr>
-            <p:cNvPr id="4" name="Rounded Rectangle 3"/>
-            <p:cNvSpPr/>
-            <p:nvPr/>
-          </p:nvSpPr>
-          <p:spPr>
-            <a:xfrm>
-              <a:off x="976123" y="1370165"/>
-              <a:ext cx="4415684" cy="346364"/>
-            </a:xfrm>
-            <a:prstGeom prst="roundRect">
-              <a:avLst/>
-            </a:prstGeom>
-          </p:spPr>
-          <p:style>
-            <a:lnRef idx="2">
-              <a:schemeClr val="accent1"/>
-            </a:lnRef>
-            <a:fillRef idx="1">
-              <a:schemeClr val="lt1"/>
-            </a:fillRef>
-            <a:effectRef idx="0">
-              <a:schemeClr val="accent1"/>
-            </a:effectRef>
-            <a:fontRef idx="minor">
-              <a:schemeClr val="dk1"/>
-            </a:fontRef>
-          </p:style>
-          <p:txBody>
-            <a:bodyPr rtlCol="0" anchor="ctr"/>
-            <a:lstStyle/>
-            <a:p>
-              <a:pPr algn="ctr"/>
-              <a:r>
-                <a:rPr lang="en-US" sz="1000" b="1" dirty="0" smtClean="0">
-                  <a:latin typeface="Times New Roman" panose="02020603050405020304" pitchFamily="18" charset="0"/>
-                  <a:cs typeface="Times New Roman" panose="02020603050405020304" pitchFamily="18" charset="0"/>
-                </a:rPr>
-                <a:t>API</a:t>
-              </a:r>
-              <a:endParaRPr lang="en-US" sz="1000" b="1" dirty="0">
+            </a:solidFill>
+            <a:headEnd type="triangle" w="med" len="med"/>
+            <a:tailEnd type="triangle" w="med" len="med"/>
+          </a:ln>
+        </p:spPr>
+        <p:style>
+          <a:lnRef idx="1">
+            <a:schemeClr val="accent1"/>
+          </a:lnRef>
+          <a:fillRef idx="0">
+            <a:schemeClr val="accent1"/>
+          </a:fillRef>
+          <a:effectRef idx="0">
+            <a:schemeClr val="accent1"/>
+          </a:effectRef>
+          <a:fontRef idx="minor">
+            <a:schemeClr val="tx1"/>
+          </a:fontRef>
+        </p:style>
+      </p:cxnSp>
+      <p:sp>
+        <p:nvSpPr>
+          <p:cNvPr id="4" name="Rounded Rectangle 3"/>
+          <p:cNvSpPr/>
+          <p:nvPr/>
+        </p:nvSpPr>
+        <p:spPr>
+          <a:xfrm>
+            <a:off x="1072055" y="1370165"/>
+            <a:ext cx="4262996" cy="346364"/>
+          </a:xfrm>
+          <a:prstGeom prst="roundRect">
+            <a:avLst/>
+          </a:prstGeom>
+        </p:spPr>
+        <p:style>
+          <a:lnRef idx="2">
+            <a:schemeClr val="accent1"/>
+          </a:lnRef>
+          <a:fillRef idx="1">
+            <a:schemeClr val="lt1"/>
+          </a:fillRef>
+          <a:effectRef idx="0">
+            <a:schemeClr val="accent1"/>
+          </a:effectRef>
+          <a:fontRef idx="minor">
+            <a:schemeClr val="dk1"/>
+          </a:fontRef>
+        </p:style>
+        <p:txBody>
+          <a:bodyPr rtlCol="0" anchor="ctr"/>
+          <a:lstStyle/>
+          <a:p>
+            <a:pPr algn="ctr"/>
+            <a:r>
+              <a:rPr lang="en-US" sz="1000" b="1" dirty="0" smtClean="0">
                 <a:latin typeface="Times New Roman" panose="02020603050405020304" pitchFamily="18" charset="0"/>
                 <a:cs typeface="Times New Roman" panose="02020603050405020304" pitchFamily="18" charset="0"/>
-              </a:endParaRPr>
-            </a:p>
-          </p:txBody>
-        </p:sp>
-        <p:sp>
-          <p:nvSpPr>
-            <p:cNvPr id="5" name="Rounded Rectangle 4"/>
-            <p:cNvSpPr/>
-            <p:nvPr/>
-          </p:nvSpPr>
-          <p:spPr>
-            <a:xfrm>
-              <a:off x="976123" y="1785801"/>
-              <a:ext cx="4415684" cy="615676"/>
-            </a:xfrm>
-            <a:prstGeom prst="roundRect">
-              <a:avLst>
-                <a:gd name="adj" fmla="val 4740"/>
-              </a:avLst>
-            </a:prstGeom>
-          </p:spPr>
-          <p:style>
-            <a:lnRef idx="2">
-              <a:schemeClr val="accent1"/>
-            </a:lnRef>
-            <a:fillRef idx="1">
-              <a:schemeClr val="lt1"/>
-            </a:fillRef>
-            <a:effectRef idx="0">
-              <a:schemeClr val="accent1"/>
-            </a:effectRef>
-            <a:fontRef idx="minor">
-              <a:schemeClr val="dk1"/>
-            </a:fontRef>
-          </p:style>
-          <p:txBody>
-            <a:bodyPr rtlCol="0" anchor="t"/>
-            <a:lstStyle/>
-            <a:p>
-              <a:r>
-                <a:rPr lang="en-US" sz="1000" b="1" dirty="0" smtClean="0">
-                  <a:latin typeface="Times New Roman" panose="02020603050405020304" pitchFamily="18" charset="0"/>
-                  <a:cs typeface="Times New Roman" panose="02020603050405020304" pitchFamily="18" charset="0"/>
-                </a:rPr>
-                <a:t>Core</a:t>
-              </a:r>
-              <a:endParaRPr lang="en-US" sz="1000" b="1" dirty="0">
+              </a:rPr>
+              <a:t>API</a:t>
+            </a:r>
+            <a:endParaRPr lang="en-US" sz="1000" b="1" dirty="0">
+              <a:latin typeface="Times New Roman" panose="02020603050405020304" pitchFamily="18" charset="0"/>
+              <a:cs typeface="Times New Roman" panose="02020603050405020304" pitchFamily="18" charset="0"/>
+            </a:endParaRPr>
+          </a:p>
+        </p:txBody>
+      </p:sp>
+      <p:sp>
+        <p:nvSpPr>
+          <p:cNvPr id="5" name="Rounded Rectangle 4"/>
+          <p:cNvSpPr/>
+          <p:nvPr/>
+        </p:nvSpPr>
+        <p:spPr>
+          <a:xfrm>
+            <a:off x="1072055" y="1785801"/>
+            <a:ext cx="4262996" cy="615676"/>
+          </a:xfrm>
+          <a:prstGeom prst="roundRect">
+            <a:avLst>
+              <a:gd name="adj" fmla="val 4740"/>
+            </a:avLst>
+          </a:prstGeom>
+        </p:spPr>
+        <p:style>
+          <a:lnRef idx="2">
+            <a:schemeClr val="accent1"/>
+          </a:lnRef>
+          <a:fillRef idx="1">
+            <a:schemeClr val="lt1"/>
+          </a:fillRef>
+          <a:effectRef idx="0">
+            <a:schemeClr val="accent1"/>
+          </a:effectRef>
+          <a:fontRef idx="minor">
+            <a:schemeClr val="dk1"/>
+          </a:fontRef>
+        </p:style>
+        <p:txBody>
+          <a:bodyPr rtlCol="0" anchor="t"/>
+          <a:lstStyle/>
+          <a:p>
+            <a:r>
+              <a:rPr lang="en-US" sz="1000" b="1" dirty="0" smtClean="0">
                 <a:latin typeface="Times New Roman" panose="02020603050405020304" pitchFamily="18" charset="0"/>
                 <a:cs typeface="Times New Roman" panose="02020603050405020304" pitchFamily="18" charset="0"/>
-              </a:endParaRPr>
-            </a:p>
-          </p:txBody>
-        </p:sp>
-        <p:sp>
-          <p:nvSpPr>
-            <p:cNvPr id="16" name="Rounded Rectangle 15"/>
-            <p:cNvSpPr/>
-            <p:nvPr/>
-          </p:nvSpPr>
-          <p:spPr>
-            <a:xfrm>
-              <a:off x="976123" y="2464659"/>
-              <a:ext cx="4415684" cy="1205553"/>
-            </a:xfrm>
-            <a:prstGeom prst="roundRect">
-              <a:avLst>
-                <a:gd name="adj" fmla="val 4740"/>
-              </a:avLst>
-            </a:prstGeom>
-          </p:spPr>
-          <p:style>
-            <a:lnRef idx="2">
-              <a:schemeClr val="accent1"/>
-            </a:lnRef>
-            <a:fillRef idx="1">
-              <a:schemeClr val="lt1"/>
-            </a:fillRef>
-            <a:effectRef idx="0">
-              <a:schemeClr val="accent1"/>
-            </a:effectRef>
-            <a:fontRef idx="minor">
-              <a:schemeClr val="dk1"/>
-            </a:fontRef>
-          </p:style>
-          <p:txBody>
-            <a:bodyPr rtlCol="0" anchor="t"/>
-            <a:lstStyle/>
-            <a:p>
-              <a:r>
-                <a:rPr lang="en-US" sz="1000" b="1" dirty="0" smtClean="0">
-                  <a:latin typeface="Times New Roman" panose="02020603050405020304" pitchFamily="18" charset="0"/>
-                  <a:cs typeface="Times New Roman" panose="02020603050405020304" pitchFamily="18" charset="0"/>
-                </a:rPr>
-                <a:t>Persistence</a:t>
-              </a:r>
-              <a:endParaRPr lang="en-US" sz="1000" b="1" dirty="0">
+              </a:rPr>
+              <a:t>Core</a:t>
+            </a:r>
+            <a:endParaRPr lang="en-US" sz="1000" b="1" dirty="0">
+              <a:latin typeface="Times New Roman" panose="02020603050405020304" pitchFamily="18" charset="0"/>
+              <a:cs typeface="Times New Roman" panose="02020603050405020304" pitchFamily="18" charset="0"/>
+            </a:endParaRPr>
+          </a:p>
+        </p:txBody>
+      </p:sp>
+      <p:sp>
+        <p:nvSpPr>
+          <p:cNvPr id="16" name="Rounded Rectangle 15"/>
+          <p:cNvSpPr/>
+          <p:nvPr/>
+        </p:nvSpPr>
+        <p:spPr>
+          <a:xfrm>
+            <a:off x="1072055" y="2464659"/>
+            <a:ext cx="4262996" cy="1205553"/>
+          </a:xfrm>
+          <a:prstGeom prst="roundRect">
+            <a:avLst>
+              <a:gd name="adj" fmla="val 4740"/>
+            </a:avLst>
+          </a:prstGeom>
+        </p:spPr>
+        <p:style>
+          <a:lnRef idx="2">
+            <a:schemeClr val="accent1"/>
+          </a:lnRef>
+          <a:fillRef idx="1">
+            <a:schemeClr val="lt1"/>
+          </a:fillRef>
+          <a:effectRef idx="0">
+            <a:schemeClr val="accent1"/>
+          </a:effectRef>
+          <a:fontRef idx="minor">
+            <a:schemeClr val="dk1"/>
+          </a:fontRef>
+        </p:style>
+        <p:txBody>
+          <a:bodyPr rtlCol="0" anchor="t"/>
+          <a:lstStyle/>
+          <a:p>
+            <a:r>
+              <a:rPr lang="en-US" sz="1000" b="1" dirty="0" smtClean="0">
                 <a:latin typeface="Times New Roman" panose="02020603050405020304" pitchFamily="18" charset="0"/>
                 <a:cs typeface="Times New Roman" panose="02020603050405020304" pitchFamily="18" charset="0"/>
-              </a:endParaRPr>
-            </a:p>
-          </p:txBody>
-        </p:sp>
-        <p:sp>
-          <p:nvSpPr>
-            <p:cNvPr id="20" name="Rectangle 19"/>
-            <p:cNvSpPr/>
-            <p:nvPr/>
-          </p:nvSpPr>
-          <p:spPr>
-            <a:xfrm>
-              <a:off x="1136127" y="2794157"/>
-              <a:ext cx="4121579" cy="263237"/>
-            </a:xfrm>
-            <a:prstGeom prst="rect">
-              <a:avLst/>
-            </a:prstGeom>
-          </p:spPr>
-          <p:style>
-            <a:lnRef idx="2">
-              <a:schemeClr val="accent2"/>
-            </a:lnRef>
-            <a:fillRef idx="1">
-              <a:schemeClr val="lt1"/>
-            </a:fillRef>
-            <a:effectRef idx="0">
-              <a:schemeClr val="accent2"/>
-            </a:effectRef>
-            <a:fontRef idx="minor">
-              <a:schemeClr val="dk1"/>
-            </a:fontRef>
-          </p:style>
-          <p:txBody>
-            <a:bodyPr rtlCol="0" anchor="ctr"/>
-            <a:lstStyle/>
-            <a:p>
-              <a:pPr algn="ctr"/>
-              <a:r>
-                <a:rPr lang="en-US" sz="1000" dirty="0" smtClean="0">
-                  <a:latin typeface="Times New Roman" panose="02020603050405020304" pitchFamily="18" charset="0"/>
-                  <a:cs typeface="Times New Roman" panose="02020603050405020304" pitchFamily="18" charset="0"/>
-                </a:rPr>
-                <a:t>Caching</a:t>
-              </a:r>
-              <a:endParaRPr lang="en-US" sz="1000" dirty="0">
+              </a:rPr>
+              <a:t>Persistence</a:t>
+            </a:r>
+            <a:endParaRPr lang="en-US" sz="1000" b="1" dirty="0">
+              <a:latin typeface="Times New Roman" panose="02020603050405020304" pitchFamily="18" charset="0"/>
+              <a:cs typeface="Times New Roman" panose="02020603050405020304" pitchFamily="18" charset="0"/>
+            </a:endParaRPr>
+          </a:p>
+        </p:txBody>
+      </p:sp>
+      <p:sp>
+        <p:nvSpPr>
+          <p:cNvPr id="20" name="Rectangle 19"/>
+          <p:cNvSpPr/>
+          <p:nvPr/>
+        </p:nvSpPr>
+        <p:spPr>
+          <a:xfrm>
+            <a:off x="1136127" y="2794157"/>
+            <a:ext cx="4121579" cy="263237"/>
+          </a:xfrm>
+          <a:prstGeom prst="rect">
+            <a:avLst/>
+          </a:prstGeom>
+        </p:spPr>
+        <p:style>
+          <a:lnRef idx="2">
+            <a:schemeClr val="accent2"/>
+          </a:lnRef>
+          <a:fillRef idx="1">
+            <a:schemeClr val="lt1"/>
+          </a:fillRef>
+          <a:effectRef idx="0">
+            <a:schemeClr val="accent2"/>
+          </a:effectRef>
+          <a:fontRef idx="minor">
+            <a:schemeClr val="dk1"/>
+          </a:fontRef>
+        </p:style>
+        <p:txBody>
+          <a:bodyPr rtlCol="0" anchor="ctr"/>
+          <a:lstStyle/>
+          <a:p>
+            <a:pPr algn="ctr"/>
+            <a:r>
+              <a:rPr lang="en-US" sz="1000" dirty="0" smtClean="0">
                 <a:latin typeface="Times New Roman" panose="02020603050405020304" pitchFamily="18" charset="0"/>
                 <a:cs typeface="Times New Roman" panose="02020603050405020304" pitchFamily="18" charset="0"/>
-              </a:endParaRPr>
-            </a:p>
-          </p:txBody>
-        </p:sp>
-        <p:sp>
-          <p:nvSpPr>
-            <p:cNvPr id="21" name="Flowchart: Magnetic Disk 20"/>
-            <p:cNvSpPr/>
-            <p:nvPr/>
-          </p:nvSpPr>
-          <p:spPr>
-            <a:xfrm>
-              <a:off x="1136127" y="3954512"/>
-              <a:ext cx="982665" cy="519545"/>
-            </a:xfrm>
-            <a:prstGeom prst="flowChartMagneticDisk">
-              <a:avLst/>
-            </a:prstGeom>
-          </p:spPr>
-          <p:style>
-            <a:lnRef idx="1">
-              <a:schemeClr val="accent1"/>
-            </a:lnRef>
-            <a:fillRef idx="2">
-              <a:schemeClr val="accent1"/>
-            </a:fillRef>
-            <a:effectRef idx="1">
-              <a:schemeClr val="accent1"/>
-            </a:effectRef>
-            <a:fontRef idx="minor">
-              <a:schemeClr val="dk1"/>
-            </a:fontRef>
-          </p:style>
-          <p:txBody>
-            <a:bodyPr rtlCol="0" anchor="ctr"/>
-            <a:lstStyle/>
-            <a:p>
-              <a:pPr algn="ctr"/>
-              <a:r>
-                <a:rPr lang="en-US" sz="1000" dirty="0" err="1" smtClean="0">
-                  <a:latin typeface="Times New Roman" panose="02020603050405020304" pitchFamily="18" charset="0"/>
-                  <a:cs typeface="Times New Roman" panose="02020603050405020304" pitchFamily="18" charset="0"/>
-                </a:rPr>
-                <a:t>ZooKeeper</a:t>
-              </a:r>
-              <a:endParaRPr lang="en-US" sz="1000" dirty="0">
+              </a:rPr>
+              <a:t>In-memory Cache</a:t>
+            </a:r>
+            <a:endParaRPr lang="en-US" sz="1000" dirty="0">
+              <a:latin typeface="Times New Roman" panose="02020603050405020304" pitchFamily="18" charset="0"/>
+              <a:cs typeface="Times New Roman" panose="02020603050405020304" pitchFamily="18" charset="0"/>
+            </a:endParaRPr>
+          </a:p>
+        </p:txBody>
+      </p:sp>
+      <p:sp>
+        <p:nvSpPr>
+          <p:cNvPr id="21" name="Flowchart: Magnetic Disk 20"/>
+          <p:cNvSpPr/>
+          <p:nvPr/>
+        </p:nvSpPr>
+        <p:spPr>
+          <a:xfrm>
+            <a:off x="1236018" y="3954512"/>
+            <a:ext cx="782884" cy="519545"/>
+          </a:xfrm>
+          <a:prstGeom prst="flowChartMagneticDisk">
+            <a:avLst/>
+          </a:prstGeom>
+        </p:spPr>
+        <p:style>
+          <a:lnRef idx="1">
+            <a:schemeClr val="accent1"/>
+          </a:lnRef>
+          <a:fillRef idx="2">
+            <a:schemeClr val="accent1"/>
+          </a:fillRef>
+          <a:effectRef idx="1">
+            <a:schemeClr val="accent1"/>
+          </a:effectRef>
+          <a:fontRef idx="minor">
+            <a:schemeClr val="dk1"/>
+          </a:fontRef>
+        </p:style>
+        <p:txBody>
+          <a:bodyPr rtlCol="0" anchor="ctr"/>
+          <a:lstStyle/>
+          <a:p>
+            <a:pPr algn="ctr"/>
+            <a:r>
+              <a:rPr lang="en-US" sz="1000" dirty="0" err="1" smtClean="0">
                 <a:latin typeface="Times New Roman" panose="02020603050405020304" pitchFamily="18" charset="0"/>
                 <a:cs typeface="Times New Roman" panose="02020603050405020304" pitchFamily="18" charset="0"/>
-              </a:endParaRPr>
-            </a:p>
-          </p:txBody>
-        </p:sp>
-        <p:sp>
-          <p:nvSpPr>
-            <p:cNvPr id="22" name="Flowchart: Magnetic Disk 21"/>
-            <p:cNvSpPr/>
-            <p:nvPr/>
-          </p:nvSpPr>
-          <p:spPr>
-            <a:xfrm>
-              <a:off x="3372232" y="3954512"/>
-              <a:ext cx="982665" cy="519545"/>
-            </a:xfrm>
-            <a:prstGeom prst="flowChartMagneticDisk">
-              <a:avLst/>
-            </a:prstGeom>
-          </p:spPr>
-          <p:style>
-            <a:lnRef idx="1">
-              <a:schemeClr val="accent1"/>
-            </a:lnRef>
-            <a:fillRef idx="2">
-              <a:schemeClr val="accent1"/>
-            </a:fillRef>
-            <a:effectRef idx="1">
-              <a:schemeClr val="accent1"/>
-            </a:effectRef>
-            <a:fontRef idx="minor">
-              <a:schemeClr val="dk1"/>
-            </a:fontRef>
-          </p:style>
-          <p:txBody>
-            <a:bodyPr rtlCol="0" anchor="ctr"/>
-            <a:lstStyle/>
-            <a:p>
-              <a:pPr algn="ctr"/>
-              <a:r>
-                <a:rPr lang="en-US" sz="1000" dirty="0" smtClean="0">
-                  <a:latin typeface="Times New Roman" panose="02020603050405020304" pitchFamily="18" charset="0"/>
-                  <a:cs typeface="Times New Roman" panose="02020603050405020304" pitchFamily="18" charset="0"/>
-                </a:rPr>
-                <a:t>Local Storage</a:t>
-              </a:r>
-              <a:endParaRPr lang="en-US" sz="1000" dirty="0">
+              </a:rPr>
+              <a:t>ZooKeeper</a:t>
+            </a:r>
+            <a:endParaRPr lang="en-US" sz="1000" dirty="0">
+              <a:latin typeface="Times New Roman" panose="02020603050405020304" pitchFamily="18" charset="0"/>
+              <a:cs typeface="Times New Roman" panose="02020603050405020304" pitchFamily="18" charset="0"/>
+            </a:endParaRPr>
+          </a:p>
+        </p:txBody>
+      </p:sp>
+      <p:sp>
+        <p:nvSpPr>
+          <p:cNvPr id="22" name="Flowchart: Magnetic Disk 21"/>
+          <p:cNvSpPr/>
+          <p:nvPr/>
+        </p:nvSpPr>
+        <p:spPr>
+          <a:xfrm>
+            <a:off x="3351050" y="3954512"/>
+            <a:ext cx="782884" cy="519545"/>
+          </a:xfrm>
+          <a:prstGeom prst="flowChartMagneticDisk">
+            <a:avLst/>
+          </a:prstGeom>
+        </p:spPr>
+        <p:style>
+          <a:lnRef idx="1">
+            <a:schemeClr val="accent1"/>
+          </a:lnRef>
+          <a:fillRef idx="2">
+            <a:schemeClr val="accent1"/>
+          </a:fillRef>
+          <a:effectRef idx="1">
+            <a:schemeClr val="accent1"/>
+          </a:effectRef>
+          <a:fontRef idx="minor">
+            <a:schemeClr val="dk1"/>
+          </a:fontRef>
+        </p:style>
+        <p:txBody>
+          <a:bodyPr rtlCol="0" anchor="ctr"/>
+          <a:lstStyle/>
+          <a:p>
+            <a:pPr algn="ctr"/>
+            <a:r>
+              <a:rPr lang="en-US" sz="1000" dirty="0" smtClean="0">
                 <a:latin typeface="Times New Roman" panose="02020603050405020304" pitchFamily="18" charset="0"/>
                 <a:cs typeface="Times New Roman" panose="02020603050405020304" pitchFamily="18" charset="0"/>
-              </a:endParaRPr>
-            </a:p>
-          </p:txBody>
-        </p:sp>
-        <p:sp>
-          <p:nvSpPr>
-            <p:cNvPr id="23" name="Flowchart: Magnetic Disk 22"/>
-            <p:cNvSpPr/>
-            <p:nvPr/>
-          </p:nvSpPr>
-          <p:spPr>
-            <a:xfrm>
-              <a:off x="4409142" y="3954512"/>
-              <a:ext cx="982665" cy="519545"/>
-            </a:xfrm>
-            <a:prstGeom prst="flowChartMagneticDisk">
-              <a:avLst/>
-            </a:prstGeom>
-          </p:spPr>
-          <p:style>
-            <a:lnRef idx="1">
-              <a:schemeClr val="accent1"/>
-            </a:lnRef>
-            <a:fillRef idx="2">
-              <a:schemeClr val="accent1"/>
-            </a:fillRef>
-            <a:effectRef idx="1">
-              <a:schemeClr val="accent1"/>
-            </a:effectRef>
-            <a:fontRef idx="minor">
-              <a:schemeClr val="dk1"/>
-            </a:fontRef>
-          </p:style>
-          <p:txBody>
-            <a:bodyPr rtlCol="0" anchor="ctr"/>
-            <a:lstStyle/>
-            <a:p>
-              <a:pPr algn="ctr"/>
-              <a:r>
-                <a:rPr lang="en-US" sz="1000" dirty="0" smtClean="0">
-                  <a:latin typeface="Times New Roman" panose="02020603050405020304" pitchFamily="18" charset="0"/>
-                  <a:cs typeface="Times New Roman" panose="02020603050405020304" pitchFamily="18" charset="0"/>
-                </a:rPr>
-                <a:t>Remote Storage</a:t>
-              </a:r>
-              <a:endParaRPr lang="en-US" sz="1000" dirty="0">
+              </a:rPr>
+              <a:t>Local Storage</a:t>
+            </a:r>
+            <a:endParaRPr lang="en-US" sz="1000" dirty="0">
+              <a:latin typeface="Times New Roman" panose="02020603050405020304" pitchFamily="18" charset="0"/>
+              <a:cs typeface="Times New Roman" panose="02020603050405020304" pitchFamily="18" charset="0"/>
+            </a:endParaRPr>
+          </a:p>
+        </p:txBody>
+      </p:sp>
+      <p:sp>
+        <p:nvSpPr>
+          <p:cNvPr id="23" name="Flowchart: Magnetic Disk 22"/>
+          <p:cNvSpPr/>
+          <p:nvPr/>
+        </p:nvSpPr>
+        <p:spPr>
+          <a:xfrm>
+            <a:off x="4387960" y="3954512"/>
+            <a:ext cx="782884" cy="519545"/>
+          </a:xfrm>
+          <a:prstGeom prst="flowChartMagneticDisk">
+            <a:avLst/>
+          </a:prstGeom>
+        </p:spPr>
+        <p:style>
+          <a:lnRef idx="1">
+            <a:schemeClr val="accent1"/>
+          </a:lnRef>
+          <a:fillRef idx="2">
+            <a:schemeClr val="accent1"/>
+          </a:fillRef>
+          <a:effectRef idx="1">
+            <a:schemeClr val="accent1"/>
+          </a:effectRef>
+          <a:fontRef idx="minor">
+            <a:schemeClr val="dk1"/>
+          </a:fontRef>
+        </p:style>
+        <p:txBody>
+          <a:bodyPr rtlCol="0" anchor="ctr"/>
+          <a:lstStyle/>
+          <a:p>
+            <a:pPr algn="ctr"/>
+            <a:r>
+              <a:rPr lang="en-US" sz="1000" dirty="0" smtClean="0">
                 <a:latin typeface="Times New Roman" panose="02020603050405020304" pitchFamily="18" charset="0"/>
                 <a:cs typeface="Times New Roman" panose="02020603050405020304" pitchFamily="18" charset="0"/>
-              </a:endParaRPr>
-            </a:p>
-          </p:txBody>
-        </p:sp>
-        <p:sp>
-          <p:nvSpPr>
-            <p:cNvPr id="13" name="Rectangle 12"/>
-            <p:cNvSpPr/>
-            <p:nvPr/>
-          </p:nvSpPr>
-          <p:spPr>
-            <a:xfrm>
-              <a:off x="1136127" y="3149607"/>
-              <a:ext cx="675077" cy="438625"/>
-            </a:xfrm>
-            <a:prstGeom prst="rect">
-              <a:avLst/>
-            </a:prstGeom>
-          </p:spPr>
-          <p:style>
-            <a:lnRef idx="2">
-              <a:schemeClr val="accent2"/>
-            </a:lnRef>
-            <a:fillRef idx="1">
-              <a:schemeClr val="lt1"/>
-            </a:fillRef>
-            <a:effectRef idx="0">
-              <a:schemeClr val="accent2"/>
-            </a:effectRef>
-            <a:fontRef idx="minor">
-              <a:schemeClr val="dk1"/>
-            </a:fontRef>
-          </p:style>
-          <p:txBody>
-            <a:bodyPr rtlCol="0" anchor="ctr"/>
-            <a:lstStyle/>
-            <a:p>
-              <a:pPr algn="ctr"/>
-              <a:r>
-                <a:rPr lang="en-US" sz="1000" dirty="0" smtClean="0">
-                  <a:latin typeface="Times New Roman" panose="02020603050405020304" pitchFamily="18" charset="0"/>
-                  <a:cs typeface="Times New Roman" panose="02020603050405020304" pitchFamily="18" charset="0"/>
-                </a:rPr>
-                <a:t>File Directory</a:t>
-              </a:r>
-              <a:endParaRPr lang="en-US" sz="1000" dirty="0">
+              </a:rPr>
+              <a:t>Cloud Storage</a:t>
+            </a:r>
+            <a:endParaRPr lang="en-US" sz="1000" dirty="0">
+              <a:latin typeface="Times New Roman" panose="02020603050405020304" pitchFamily="18" charset="0"/>
+              <a:cs typeface="Times New Roman" panose="02020603050405020304" pitchFamily="18" charset="0"/>
+            </a:endParaRPr>
+          </a:p>
+        </p:txBody>
+      </p:sp>
+      <p:sp>
+        <p:nvSpPr>
+          <p:cNvPr id="13" name="Rectangle 12"/>
+          <p:cNvSpPr/>
+          <p:nvPr/>
+        </p:nvSpPr>
+        <p:spPr>
+          <a:xfrm>
+            <a:off x="1136127" y="3149607"/>
+            <a:ext cx="982665" cy="438625"/>
+          </a:xfrm>
+          <a:prstGeom prst="rect">
+            <a:avLst/>
+          </a:prstGeom>
+        </p:spPr>
+        <p:style>
+          <a:lnRef idx="2">
+            <a:schemeClr val="accent2"/>
+          </a:lnRef>
+          <a:fillRef idx="1">
+            <a:schemeClr val="lt1"/>
+          </a:fillRef>
+          <a:effectRef idx="0">
+            <a:schemeClr val="accent2"/>
+          </a:effectRef>
+          <a:fontRef idx="minor">
+            <a:schemeClr val="dk1"/>
+          </a:fontRef>
+        </p:style>
+        <p:txBody>
+          <a:bodyPr rtlCol="0" anchor="ctr"/>
+          <a:lstStyle/>
+          <a:p>
+            <a:pPr algn="ctr"/>
+            <a:r>
+              <a:rPr lang="en-US" sz="1000" dirty="0" smtClean="0">
                 <a:latin typeface="Times New Roman" panose="02020603050405020304" pitchFamily="18" charset="0"/>
                 <a:cs typeface="Times New Roman" panose="02020603050405020304" pitchFamily="18" charset="0"/>
-              </a:endParaRPr>
-            </a:p>
-          </p:txBody>
-        </p:sp>
-        <p:sp>
-          <p:nvSpPr>
-            <p:cNvPr id="17" name="Rectangle 16"/>
-            <p:cNvSpPr/>
-            <p:nvPr/>
-          </p:nvSpPr>
-          <p:spPr>
-            <a:xfrm>
-              <a:off x="3412731" y="3149607"/>
-              <a:ext cx="515030" cy="438625"/>
-            </a:xfrm>
-            <a:prstGeom prst="rect">
-              <a:avLst/>
-            </a:prstGeom>
-          </p:spPr>
-          <p:style>
-            <a:lnRef idx="2">
-              <a:schemeClr val="accent2"/>
-            </a:lnRef>
-            <a:fillRef idx="1">
-              <a:schemeClr val="lt1"/>
-            </a:fillRef>
-            <a:effectRef idx="0">
-              <a:schemeClr val="accent2"/>
-            </a:effectRef>
-            <a:fontRef idx="minor">
-              <a:schemeClr val="dk1"/>
-            </a:fontRef>
-          </p:style>
-          <p:txBody>
-            <a:bodyPr rtlCol="0" anchor="ctr"/>
-            <a:lstStyle/>
-            <a:p>
-              <a:pPr algn="ctr"/>
-              <a:r>
-                <a:rPr lang="en-US" sz="1000" dirty="0" err="1" smtClean="0">
-                  <a:latin typeface="Times New Roman" panose="02020603050405020304" pitchFamily="18" charset="0"/>
-                  <a:cs typeface="Times New Roman" panose="02020603050405020304" pitchFamily="18" charset="0"/>
-                </a:rPr>
-                <a:t>inodes</a:t>
-              </a:r>
-              <a:endParaRPr lang="en-US" sz="1000" dirty="0">
+              </a:rPr>
+              <a:t>File Directory</a:t>
+            </a:r>
+            <a:endParaRPr lang="en-US" sz="1000" dirty="0">
+              <a:latin typeface="Times New Roman" panose="02020603050405020304" pitchFamily="18" charset="0"/>
+              <a:cs typeface="Times New Roman" panose="02020603050405020304" pitchFamily="18" charset="0"/>
+            </a:endParaRPr>
+          </a:p>
+        </p:txBody>
+      </p:sp>
+      <p:sp>
+        <p:nvSpPr>
+          <p:cNvPr id="17" name="Rectangle 16"/>
+          <p:cNvSpPr/>
+          <p:nvPr/>
+        </p:nvSpPr>
+        <p:spPr>
+          <a:xfrm>
+            <a:off x="3773039" y="3149607"/>
+            <a:ext cx="515030" cy="438625"/>
+          </a:xfrm>
+          <a:prstGeom prst="rect">
+            <a:avLst/>
+          </a:prstGeom>
+        </p:spPr>
+        <p:style>
+          <a:lnRef idx="2">
+            <a:schemeClr val="accent2"/>
+          </a:lnRef>
+          <a:fillRef idx="1">
+            <a:schemeClr val="lt1"/>
+          </a:fillRef>
+          <a:effectRef idx="0">
+            <a:schemeClr val="accent2"/>
+          </a:effectRef>
+          <a:fontRef idx="minor">
+            <a:schemeClr val="dk1"/>
+          </a:fontRef>
+        </p:style>
+        <p:txBody>
+          <a:bodyPr rtlCol="0" anchor="ctr"/>
+          <a:lstStyle/>
+          <a:p>
+            <a:pPr algn="ctr"/>
+            <a:r>
+              <a:rPr lang="en-US" sz="1000" dirty="0" err="1" smtClean="0">
                 <a:latin typeface="Times New Roman" panose="02020603050405020304" pitchFamily="18" charset="0"/>
                 <a:cs typeface="Times New Roman" panose="02020603050405020304" pitchFamily="18" charset="0"/>
-              </a:endParaRPr>
-            </a:p>
-          </p:txBody>
-        </p:sp>
-        <p:sp>
-          <p:nvSpPr>
-            <p:cNvPr id="18" name="Rectangle 17"/>
-            <p:cNvSpPr/>
-            <p:nvPr/>
-          </p:nvSpPr>
-          <p:spPr>
-            <a:xfrm>
-              <a:off x="4342765" y="3149607"/>
-              <a:ext cx="922013" cy="438625"/>
-            </a:xfrm>
-            <a:prstGeom prst="rect">
-              <a:avLst/>
-            </a:prstGeom>
-          </p:spPr>
-          <p:style>
-            <a:lnRef idx="2">
-              <a:schemeClr val="accent2"/>
-            </a:lnRef>
-            <a:fillRef idx="1">
-              <a:schemeClr val="lt1"/>
-            </a:fillRef>
-            <a:effectRef idx="0">
-              <a:schemeClr val="accent2"/>
-            </a:effectRef>
-            <a:fontRef idx="minor">
-              <a:schemeClr val="dk1"/>
-            </a:fontRef>
-          </p:style>
-          <p:txBody>
-            <a:bodyPr rtlCol="0" anchor="ctr"/>
-            <a:lstStyle/>
-            <a:p>
-              <a:pPr algn="ctr"/>
-              <a:r>
-                <a:rPr lang="en-US" sz="1000" dirty="0" smtClean="0">
-                  <a:latin typeface="Times New Roman" panose="02020603050405020304" pitchFamily="18" charset="0"/>
-                  <a:cs typeface="Times New Roman" panose="02020603050405020304" pitchFamily="18" charset="0"/>
-                </a:rPr>
-                <a:t>Data blocks</a:t>
-              </a:r>
-              <a:endParaRPr lang="en-US" sz="1000" dirty="0">
+              </a:rPr>
+              <a:t>inodes</a:t>
+            </a:r>
+            <a:endParaRPr lang="en-US" sz="1000" dirty="0">
+              <a:latin typeface="Times New Roman" panose="02020603050405020304" pitchFamily="18" charset="0"/>
+              <a:cs typeface="Times New Roman" panose="02020603050405020304" pitchFamily="18" charset="0"/>
+            </a:endParaRPr>
+          </a:p>
+        </p:txBody>
+      </p:sp>
+      <p:sp>
+        <p:nvSpPr>
+          <p:cNvPr id="18" name="Rectangle 17"/>
+          <p:cNvSpPr/>
+          <p:nvPr/>
+        </p:nvSpPr>
+        <p:spPr>
+          <a:xfrm>
+            <a:off x="4342765" y="3149607"/>
+            <a:ext cx="922013" cy="438625"/>
+          </a:xfrm>
+          <a:prstGeom prst="rect">
+            <a:avLst/>
+          </a:prstGeom>
+        </p:spPr>
+        <p:style>
+          <a:lnRef idx="2">
+            <a:schemeClr val="accent2"/>
+          </a:lnRef>
+          <a:fillRef idx="1">
+            <a:schemeClr val="lt1"/>
+          </a:fillRef>
+          <a:effectRef idx="0">
+            <a:schemeClr val="accent2"/>
+          </a:effectRef>
+          <a:fontRef idx="minor">
+            <a:schemeClr val="dk1"/>
+          </a:fontRef>
+        </p:style>
+        <p:txBody>
+          <a:bodyPr rtlCol="0" anchor="ctr"/>
+          <a:lstStyle/>
+          <a:p>
+            <a:pPr algn="ctr"/>
+            <a:r>
+              <a:rPr lang="en-US" sz="1000" dirty="0" smtClean="0">
                 <a:latin typeface="Times New Roman" panose="02020603050405020304" pitchFamily="18" charset="0"/>
                 <a:cs typeface="Times New Roman" panose="02020603050405020304" pitchFamily="18" charset="0"/>
-              </a:endParaRPr>
-            </a:p>
-          </p:txBody>
-        </p:sp>
-        <p:sp>
-          <p:nvSpPr>
-            <p:cNvPr id="19" name="Rectangle 18"/>
-            <p:cNvSpPr/>
-            <p:nvPr/>
-          </p:nvSpPr>
-          <p:spPr>
-            <a:xfrm>
-              <a:off x="1867989" y="3149607"/>
-              <a:ext cx="723175" cy="438625"/>
-            </a:xfrm>
-            <a:prstGeom prst="rect">
-              <a:avLst/>
-            </a:prstGeom>
-          </p:spPr>
-          <p:style>
-            <a:lnRef idx="2">
-              <a:schemeClr val="accent2"/>
-            </a:lnRef>
-            <a:fillRef idx="1">
-              <a:schemeClr val="lt1"/>
-            </a:fillRef>
-            <a:effectRef idx="0">
-              <a:schemeClr val="accent2"/>
-            </a:effectRef>
-            <a:fontRef idx="minor">
-              <a:schemeClr val="dk1"/>
-            </a:fontRef>
-          </p:style>
-          <p:txBody>
-            <a:bodyPr rtlCol="0" anchor="ctr"/>
-            <a:lstStyle/>
-            <a:p>
-              <a:pPr algn="ctr"/>
-              <a:r>
-                <a:rPr lang="en-US" sz="1000" dirty="0" err="1" smtClean="0">
-                  <a:latin typeface="Times New Roman" panose="02020603050405020304" pitchFamily="18" charset="0"/>
-                  <a:cs typeface="Times New Roman" panose="02020603050405020304" pitchFamily="18" charset="0"/>
-                </a:rPr>
-                <a:t>Ibmap</a:t>
-              </a:r>
-              <a:r>
-                <a:rPr lang="en-US" sz="1000" dirty="0" smtClean="0">
-                  <a:latin typeface="Times New Roman" panose="02020603050405020304" pitchFamily="18" charset="0"/>
-                  <a:cs typeface="Times New Roman" panose="02020603050405020304" pitchFamily="18" charset="0"/>
-                </a:rPr>
-                <a:t> blocks</a:t>
-              </a:r>
-              <a:endParaRPr lang="en-US" sz="1000" dirty="0">
+              </a:rPr>
+              <a:t>Data blocks</a:t>
+            </a:r>
+            <a:endParaRPr lang="en-US" sz="1000" dirty="0">
+              <a:latin typeface="Times New Roman" panose="02020603050405020304" pitchFamily="18" charset="0"/>
+              <a:cs typeface="Times New Roman" panose="02020603050405020304" pitchFamily="18" charset="0"/>
+            </a:endParaRPr>
+          </a:p>
+        </p:txBody>
+      </p:sp>
+      <p:sp>
+        <p:nvSpPr>
+          <p:cNvPr id="19" name="Rectangle 18"/>
+          <p:cNvSpPr/>
+          <p:nvPr/>
+        </p:nvSpPr>
+        <p:spPr>
+          <a:xfrm>
+            <a:off x="2217295" y="3149607"/>
+            <a:ext cx="723175" cy="438625"/>
+          </a:xfrm>
+          <a:prstGeom prst="rect">
+            <a:avLst/>
+          </a:prstGeom>
+        </p:spPr>
+        <p:style>
+          <a:lnRef idx="2">
+            <a:schemeClr val="accent2"/>
+          </a:lnRef>
+          <a:fillRef idx="1">
+            <a:schemeClr val="lt1"/>
+          </a:fillRef>
+          <a:effectRef idx="0">
+            <a:schemeClr val="accent2"/>
+          </a:effectRef>
+          <a:fontRef idx="minor">
+            <a:schemeClr val="dk1"/>
+          </a:fontRef>
+        </p:style>
+        <p:txBody>
+          <a:bodyPr rtlCol="0" anchor="ctr"/>
+          <a:lstStyle/>
+          <a:p>
+            <a:pPr algn="ctr"/>
+            <a:r>
+              <a:rPr lang="en-US" sz="1000" dirty="0" err="1" smtClean="0">
                 <a:latin typeface="Times New Roman" panose="02020603050405020304" pitchFamily="18" charset="0"/>
                 <a:cs typeface="Times New Roman" panose="02020603050405020304" pitchFamily="18" charset="0"/>
-              </a:endParaRPr>
-            </a:p>
-          </p:txBody>
-        </p:sp>
-        <p:sp>
-          <p:nvSpPr>
-            <p:cNvPr id="25" name="Rectangle 24"/>
-            <p:cNvSpPr/>
-            <p:nvPr/>
-          </p:nvSpPr>
-          <p:spPr>
-            <a:xfrm>
-              <a:off x="1136127" y="2016124"/>
-              <a:ext cx="4121579" cy="263237"/>
-            </a:xfrm>
-            <a:prstGeom prst="rect">
-              <a:avLst/>
-            </a:prstGeom>
-          </p:spPr>
-          <p:style>
-            <a:lnRef idx="2">
-              <a:schemeClr val="accent2"/>
-            </a:lnRef>
-            <a:fillRef idx="1">
-              <a:schemeClr val="lt1"/>
-            </a:fillRef>
-            <a:effectRef idx="0">
-              <a:schemeClr val="accent2"/>
-            </a:effectRef>
-            <a:fontRef idx="minor">
-              <a:schemeClr val="dk1"/>
-            </a:fontRef>
-          </p:style>
-          <p:txBody>
-            <a:bodyPr rtlCol="0" anchor="ctr"/>
-            <a:lstStyle/>
-            <a:p>
-              <a:pPr algn="ctr"/>
-              <a:r>
-                <a:rPr lang="en-US" sz="1000" dirty="0" smtClean="0">
-                  <a:latin typeface="Times New Roman" panose="02020603050405020304" pitchFamily="18" charset="0"/>
-                  <a:cs typeface="Times New Roman" panose="02020603050405020304" pitchFamily="18" charset="0"/>
-                </a:rPr>
-                <a:t>Driver, File Handles</a:t>
-              </a:r>
-              <a:endParaRPr lang="en-US" sz="1000" dirty="0">
+              </a:rPr>
+              <a:t>Ibmap</a:t>
+            </a:r>
+            <a:r>
+              <a:rPr lang="en-US" sz="1000" dirty="0" smtClean="0">
                 <a:latin typeface="Times New Roman" panose="02020603050405020304" pitchFamily="18" charset="0"/>
                 <a:cs typeface="Times New Roman" panose="02020603050405020304" pitchFamily="18" charset="0"/>
-              </a:endParaRPr>
-            </a:p>
-          </p:txBody>
-        </p:sp>
-        <p:cxnSp>
-          <p:nvCxnSpPr>
-            <p:cNvPr id="28" name="Straight Connector 27"/>
-            <p:cNvCxnSpPr>
-              <a:stCxn id="21" idx="1"/>
-              <a:endCxn id="13" idx="2"/>
-            </p:cNvCxnSpPr>
-            <p:nvPr/>
-          </p:nvCxnSpPr>
-          <p:spPr>
-            <a:xfrm flipH="1" flipV="1">
-              <a:off x="1473666" y="3588232"/>
-              <a:ext cx="153794" cy="366280"/>
-            </a:xfrm>
-            <a:prstGeom prst="line">
-              <a:avLst/>
-            </a:prstGeom>
-            <a:ln w="9525">
-              <a:solidFill>
-                <a:schemeClr val="tx1"/>
-              </a:solidFill>
-              <a:prstDash val="dash"/>
-              <a:headEnd type="triangle" w="med" len="med"/>
-              <a:tailEnd type="triangle" w="med" len="med"/>
-            </a:ln>
-          </p:spPr>
-          <p:style>
-            <a:lnRef idx="1">
-              <a:schemeClr val="accent1"/>
-            </a:lnRef>
-            <a:fillRef idx="0">
-              <a:schemeClr val="accent1"/>
-            </a:fillRef>
-            <a:effectRef idx="0">
-              <a:schemeClr val="accent1"/>
-            </a:effectRef>
-            <a:fontRef idx="minor">
-              <a:schemeClr val="tx1"/>
-            </a:fontRef>
-          </p:style>
-        </p:cxnSp>
-        <p:cxnSp>
-          <p:nvCxnSpPr>
-            <p:cNvPr id="30" name="Straight Connector 29"/>
-            <p:cNvCxnSpPr>
-              <a:stCxn id="19" idx="2"/>
-              <a:endCxn id="21" idx="1"/>
-            </p:cNvCxnSpPr>
-            <p:nvPr/>
-          </p:nvCxnSpPr>
-          <p:spPr>
-            <a:xfrm flipH="1">
-              <a:off x="1627460" y="3588232"/>
-              <a:ext cx="602117" cy="366280"/>
-            </a:xfrm>
-            <a:prstGeom prst="line">
-              <a:avLst/>
-            </a:prstGeom>
-            <a:ln w="9525">
-              <a:solidFill>
-                <a:schemeClr val="tx1"/>
-              </a:solidFill>
-              <a:prstDash val="dash"/>
-              <a:headEnd type="triangle" w="med" len="med"/>
-              <a:tailEnd type="triangle" w="med" len="med"/>
-            </a:ln>
-          </p:spPr>
-          <p:style>
-            <a:lnRef idx="1">
-              <a:schemeClr val="accent1"/>
-            </a:lnRef>
-            <a:fillRef idx="0">
-              <a:schemeClr val="accent1"/>
-            </a:fillRef>
-            <a:effectRef idx="0">
-              <a:schemeClr val="accent1"/>
-            </a:effectRef>
-            <a:fontRef idx="minor">
-              <a:schemeClr val="tx1"/>
-            </a:fontRef>
-          </p:style>
-        </p:cxnSp>
-        <p:cxnSp>
-          <p:nvCxnSpPr>
-            <p:cNvPr id="34" name="Straight Connector 33"/>
-            <p:cNvCxnSpPr>
-              <a:stCxn id="17" idx="2"/>
-              <a:endCxn id="21" idx="1"/>
-            </p:cNvCxnSpPr>
-            <p:nvPr/>
-          </p:nvCxnSpPr>
-          <p:spPr>
-            <a:xfrm flipH="1">
-              <a:off x="1627460" y="3588232"/>
-              <a:ext cx="2042786" cy="366280"/>
-            </a:xfrm>
-            <a:prstGeom prst="line">
-              <a:avLst/>
-            </a:prstGeom>
-            <a:ln w="9525">
-              <a:solidFill>
-                <a:schemeClr val="tx1"/>
-              </a:solidFill>
-              <a:prstDash val="dash"/>
-              <a:headEnd type="triangle" w="med" len="med"/>
-              <a:tailEnd type="triangle" w="med" len="med"/>
-            </a:ln>
-          </p:spPr>
-          <p:style>
-            <a:lnRef idx="1">
-              <a:schemeClr val="accent1"/>
-            </a:lnRef>
-            <a:fillRef idx="0">
-              <a:schemeClr val="accent1"/>
-            </a:fillRef>
-            <a:effectRef idx="0">
-              <a:schemeClr val="accent1"/>
-            </a:effectRef>
-            <a:fontRef idx="minor">
-              <a:schemeClr val="tx1"/>
-            </a:fontRef>
-          </p:style>
-        </p:cxnSp>
-        <p:cxnSp>
-          <p:nvCxnSpPr>
-            <p:cNvPr id="38" name="Straight Connector 37"/>
-            <p:cNvCxnSpPr>
-              <a:stCxn id="18" idx="2"/>
-              <a:endCxn id="22" idx="1"/>
-            </p:cNvCxnSpPr>
-            <p:nvPr/>
-          </p:nvCxnSpPr>
-          <p:spPr>
-            <a:xfrm flipH="1">
-              <a:off x="3863565" y="3588232"/>
-              <a:ext cx="940207" cy="366280"/>
-            </a:xfrm>
-            <a:prstGeom prst="line">
-              <a:avLst/>
-            </a:prstGeom>
-            <a:ln w="9525">
-              <a:solidFill>
-                <a:schemeClr val="tx1"/>
-              </a:solidFill>
-              <a:prstDash val="dash"/>
-              <a:headEnd type="triangle" w="med" len="med"/>
-              <a:tailEnd type="triangle" w="med" len="med"/>
-            </a:ln>
-          </p:spPr>
-          <p:style>
-            <a:lnRef idx="1">
-              <a:schemeClr val="accent1"/>
-            </a:lnRef>
-            <a:fillRef idx="0">
-              <a:schemeClr val="accent1"/>
-            </a:fillRef>
-            <a:effectRef idx="0">
-              <a:schemeClr val="accent1"/>
-            </a:effectRef>
-            <a:fontRef idx="minor">
-              <a:schemeClr val="tx1"/>
-            </a:fontRef>
-          </p:style>
-        </p:cxnSp>
-        <p:cxnSp>
-          <p:nvCxnSpPr>
-            <p:cNvPr id="40" name="Straight Connector 39"/>
-            <p:cNvCxnSpPr>
-              <a:stCxn id="18" idx="2"/>
-              <a:endCxn id="23" idx="1"/>
-            </p:cNvCxnSpPr>
-            <p:nvPr/>
-          </p:nvCxnSpPr>
-          <p:spPr>
-            <a:xfrm>
-              <a:off x="4803772" y="3588232"/>
-              <a:ext cx="96703" cy="366280"/>
-            </a:xfrm>
-            <a:prstGeom prst="line">
-              <a:avLst/>
-            </a:prstGeom>
-            <a:ln w="9525">
-              <a:solidFill>
-                <a:schemeClr val="tx1"/>
-              </a:solidFill>
-              <a:prstDash val="dash"/>
-              <a:headEnd type="triangle" w="med" len="med"/>
-              <a:tailEnd type="triangle" w="med" len="med"/>
-            </a:ln>
-          </p:spPr>
-          <p:style>
-            <a:lnRef idx="1">
-              <a:schemeClr val="accent1"/>
-            </a:lnRef>
-            <a:fillRef idx="0">
-              <a:schemeClr val="accent1"/>
-            </a:fillRef>
-            <a:effectRef idx="0">
-              <a:schemeClr val="accent1"/>
-            </a:effectRef>
-            <a:fontRef idx="minor">
-              <a:schemeClr val="tx1"/>
-            </a:fontRef>
-          </p:style>
-        </p:cxnSp>
-        <p:cxnSp>
-          <p:nvCxnSpPr>
-            <p:cNvPr id="42" name="Straight Arrow Connector 41"/>
-            <p:cNvCxnSpPr>
-              <a:stCxn id="25" idx="2"/>
-              <a:endCxn id="20" idx="0"/>
-            </p:cNvCxnSpPr>
-            <p:nvPr/>
-          </p:nvCxnSpPr>
-          <p:spPr>
-            <a:xfrm>
-              <a:off x="3196917" y="2279361"/>
-              <a:ext cx="0" cy="514796"/>
-            </a:xfrm>
-            <a:prstGeom prst="straightConnector1">
-              <a:avLst/>
-            </a:prstGeom>
-            <a:ln w="9525">
-              <a:solidFill>
-                <a:schemeClr val="tx1"/>
-              </a:solidFill>
-              <a:prstDash val="dash"/>
-              <a:headEnd type="triangle" w="med" len="med"/>
-              <a:tailEnd type="triangle" w="med" len="med"/>
-            </a:ln>
-          </p:spPr>
-          <p:style>
-            <a:lnRef idx="1">
-              <a:schemeClr val="accent1"/>
-            </a:lnRef>
-            <a:fillRef idx="0">
-              <a:schemeClr val="accent1"/>
-            </a:fillRef>
-            <a:effectRef idx="0">
-              <a:schemeClr val="accent1"/>
-            </a:effectRef>
-            <a:fontRef idx="minor">
-              <a:schemeClr val="tx1"/>
-            </a:fontRef>
-          </p:style>
-        </p:cxnSp>
-        <p:sp>
-          <p:nvSpPr>
-            <p:cNvPr id="43" name="Rectangle 42"/>
-            <p:cNvSpPr/>
-            <p:nvPr/>
-          </p:nvSpPr>
-          <p:spPr>
-            <a:xfrm>
-              <a:off x="2636925" y="3149607"/>
-              <a:ext cx="723175" cy="438625"/>
-            </a:xfrm>
-            <a:prstGeom prst="rect">
-              <a:avLst/>
-            </a:prstGeom>
-          </p:spPr>
-          <p:style>
-            <a:lnRef idx="2">
-              <a:schemeClr val="accent2"/>
-            </a:lnRef>
-            <a:fillRef idx="1">
-              <a:schemeClr val="lt1"/>
-            </a:fillRef>
-            <a:effectRef idx="0">
-              <a:schemeClr val="accent2"/>
-            </a:effectRef>
-            <a:fontRef idx="minor">
-              <a:schemeClr val="dk1"/>
-            </a:fontRef>
-          </p:style>
-          <p:txBody>
-            <a:bodyPr rtlCol="0" anchor="ctr"/>
-            <a:lstStyle/>
-            <a:p>
-              <a:pPr algn="ctr"/>
-              <a:r>
-                <a:rPr lang="en-US" sz="1000" dirty="0" err="1" smtClean="0">
-                  <a:latin typeface="Times New Roman" panose="02020603050405020304" pitchFamily="18" charset="0"/>
-                  <a:cs typeface="Times New Roman" panose="02020603050405020304" pitchFamily="18" charset="0"/>
-                </a:rPr>
-                <a:t>Inode</a:t>
-              </a:r>
-              <a:r>
-                <a:rPr lang="en-US" sz="1000" dirty="0" smtClean="0">
-                  <a:latin typeface="Times New Roman" panose="02020603050405020304" pitchFamily="18" charset="0"/>
-                  <a:cs typeface="Times New Roman" panose="02020603050405020304" pitchFamily="18" charset="0"/>
-                </a:rPr>
-                <a:t> blocks</a:t>
-              </a:r>
-              <a:endParaRPr lang="en-US" sz="1000" dirty="0">
+              </a:rPr>
+              <a:t> blocks</a:t>
+            </a:r>
+            <a:endParaRPr lang="en-US" sz="1000" dirty="0">
+              <a:latin typeface="Times New Roman" panose="02020603050405020304" pitchFamily="18" charset="0"/>
+              <a:cs typeface="Times New Roman" panose="02020603050405020304" pitchFamily="18" charset="0"/>
+            </a:endParaRPr>
+          </a:p>
+        </p:txBody>
+      </p:sp>
+      <p:sp>
+        <p:nvSpPr>
+          <p:cNvPr id="25" name="Rectangle 24"/>
+          <p:cNvSpPr/>
+          <p:nvPr/>
+        </p:nvSpPr>
+        <p:spPr>
+          <a:xfrm>
+            <a:off x="1136127" y="2016124"/>
+            <a:ext cx="4121579" cy="263237"/>
+          </a:xfrm>
+          <a:prstGeom prst="rect">
+            <a:avLst/>
+          </a:prstGeom>
+        </p:spPr>
+        <p:style>
+          <a:lnRef idx="2">
+            <a:schemeClr val="accent2"/>
+          </a:lnRef>
+          <a:fillRef idx="1">
+            <a:schemeClr val="lt1"/>
+          </a:fillRef>
+          <a:effectRef idx="0">
+            <a:schemeClr val="accent2"/>
+          </a:effectRef>
+          <a:fontRef idx="minor">
+            <a:schemeClr val="dk1"/>
+          </a:fontRef>
+        </p:style>
+        <p:txBody>
+          <a:bodyPr rtlCol="0" anchor="ctr"/>
+          <a:lstStyle/>
+          <a:p>
+            <a:pPr algn="ctr"/>
+            <a:r>
+              <a:rPr lang="en-US" sz="1000" dirty="0" smtClean="0">
                 <a:latin typeface="Times New Roman" panose="02020603050405020304" pitchFamily="18" charset="0"/>
                 <a:cs typeface="Times New Roman" panose="02020603050405020304" pitchFamily="18" charset="0"/>
-              </a:endParaRPr>
-            </a:p>
-          </p:txBody>
-        </p:sp>
-        <p:cxnSp>
-          <p:nvCxnSpPr>
-            <p:cNvPr id="92" name="Straight Arrow Connector 91"/>
-            <p:cNvCxnSpPr>
-              <a:stCxn id="43" idx="2"/>
-              <a:endCxn id="21" idx="1"/>
-            </p:cNvCxnSpPr>
-            <p:nvPr/>
-          </p:nvCxnSpPr>
-          <p:spPr>
-            <a:xfrm flipH="1">
-              <a:off x="1627460" y="3588232"/>
-              <a:ext cx="1371053" cy="366280"/>
-            </a:xfrm>
-            <a:prstGeom prst="straightConnector1">
-              <a:avLst/>
-            </a:prstGeom>
-            <a:ln w="9525">
-              <a:solidFill>
-                <a:schemeClr val="tx1"/>
-              </a:solidFill>
-              <a:prstDash val="dash"/>
-              <a:headEnd type="triangle" w="med" len="med"/>
-              <a:tailEnd type="triangle" w="med" len="med"/>
-            </a:ln>
-          </p:spPr>
-          <p:style>
-            <a:lnRef idx="1">
-              <a:schemeClr val="accent1"/>
-            </a:lnRef>
-            <a:fillRef idx="0">
-              <a:schemeClr val="accent1"/>
-            </a:fillRef>
-            <a:effectRef idx="0">
-              <a:schemeClr val="accent1"/>
-            </a:effectRef>
-            <a:fontRef idx="minor">
+              </a:rPr>
+              <a:t>Driver, File Handles</a:t>
+            </a:r>
+            <a:endParaRPr lang="en-US" sz="1000" dirty="0">
+              <a:latin typeface="Times New Roman" panose="02020603050405020304" pitchFamily="18" charset="0"/>
+              <a:cs typeface="Times New Roman" panose="02020603050405020304" pitchFamily="18" charset="0"/>
+            </a:endParaRPr>
+          </a:p>
+        </p:txBody>
+      </p:sp>
+      <p:cxnSp>
+        <p:nvCxnSpPr>
+          <p:cNvPr id="28" name="Straight Connector 27"/>
+          <p:cNvCxnSpPr>
+            <a:stCxn id="21" idx="1"/>
+            <a:endCxn id="13" idx="2"/>
+          </p:cNvCxnSpPr>
+          <p:nvPr/>
+        </p:nvCxnSpPr>
+        <p:spPr>
+          <a:xfrm flipV="1">
+            <a:off x="1627460" y="3588232"/>
+            <a:ext cx="0" cy="366280"/>
+          </a:xfrm>
+          <a:prstGeom prst="line">
+            <a:avLst/>
+          </a:prstGeom>
+          <a:ln w="9525">
+            <a:solidFill>
               <a:schemeClr val="tx1"/>
-            </a:fontRef>
-          </p:style>
-        </p:cxnSp>
-      </p:grpSp>
+            </a:solidFill>
+            <a:prstDash val="dash"/>
+            <a:headEnd type="triangle" w="med" len="med"/>
+            <a:tailEnd type="triangle" w="med" len="med"/>
+          </a:ln>
+        </p:spPr>
+        <p:style>
+          <a:lnRef idx="1">
+            <a:schemeClr val="accent1"/>
+          </a:lnRef>
+          <a:fillRef idx="0">
+            <a:schemeClr val="accent1"/>
+          </a:fillRef>
+          <a:effectRef idx="0">
+            <a:schemeClr val="accent1"/>
+          </a:effectRef>
+          <a:fontRef idx="minor">
+            <a:schemeClr val="tx1"/>
+          </a:fontRef>
+        </p:style>
+      </p:cxnSp>
+      <p:cxnSp>
+        <p:nvCxnSpPr>
+          <p:cNvPr id="30" name="Straight Connector 29"/>
+          <p:cNvCxnSpPr>
+            <a:stCxn id="19" idx="2"/>
+            <a:endCxn id="23" idx="1"/>
+          </p:cNvCxnSpPr>
+          <p:nvPr/>
+        </p:nvCxnSpPr>
+        <p:spPr>
+          <a:xfrm>
+            <a:off x="2578883" y="3588232"/>
+            <a:ext cx="2200519" cy="366280"/>
+          </a:xfrm>
+          <a:prstGeom prst="line">
+            <a:avLst/>
+          </a:prstGeom>
+          <a:ln w="9525">
+            <a:solidFill>
+              <a:schemeClr val="tx1"/>
+            </a:solidFill>
+            <a:prstDash val="dash"/>
+            <a:headEnd type="triangle" w="med" len="med"/>
+            <a:tailEnd type="triangle" w="med" len="med"/>
+          </a:ln>
+        </p:spPr>
+        <p:style>
+          <a:lnRef idx="1">
+            <a:schemeClr val="accent1"/>
+          </a:lnRef>
+          <a:fillRef idx="0">
+            <a:schemeClr val="accent1"/>
+          </a:fillRef>
+          <a:effectRef idx="0">
+            <a:schemeClr val="accent1"/>
+          </a:effectRef>
+          <a:fontRef idx="minor">
+            <a:schemeClr val="tx1"/>
+          </a:fontRef>
+        </p:style>
+      </p:cxnSp>
+      <p:cxnSp>
+        <p:nvCxnSpPr>
+          <p:cNvPr id="34" name="Straight Connector 33"/>
+          <p:cNvCxnSpPr>
+            <a:stCxn id="17" idx="2"/>
+            <a:endCxn id="23" idx="1"/>
+          </p:cNvCxnSpPr>
+          <p:nvPr/>
+        </p:nvCxnSpPr>
+        <p:spPr>
+          <a:xfrm>
+            <a:off x="4030554" y="3588232"/>
+            <a:ext cx="748848" cy="366280"/>
+          </a:xfrm>
+          <a:prstGeom prst="line">
+            <a:avLst/>
+          </a:prstGeom>
+          <a:ln w="9525">
+            <a:solidFill>
+              <a:schemeClr val="tx1"/>
+            </a:solidFill>
+            <a:prstDash val="dash"/>
+            <a:headEnd type="triangle" w="med" len="med"/>
+            <a:tailEnd type="triangle" w="med" len="med"/>
+          </a:ln>
+        </p:spPr>
+        <p:style>
+          <a:lnRef idx="1">
+            <a:schemeClr val="accent1"/>
+          </a:lnRef>
+          <a:fillRef idx="0">
+            <a:schemeClr val="accent1"/>
+          </a:fillRef>
+          <a:effectRef idx="0">
+            <a:schemeClr val="accent1"/>
+          </a:effectRef>
+          <a:fontRef idx="minor">
+            <a:schemeClr val="tx1"/>
+          </a:fontRef>
+        </p:style>
+      </p:cxnSp>
+      <p:cxnSp>
+        <p:nvCxnSpPr>
+          <p:cNvPr id="38" name="Straight Connector 37"/>
+          <p:cNvCxnSpPr>
+            <a:stCxn id="18" idx="2"/>
+            <a:endCxn id="22" idx="1"/>
+          </p:cNvCxnSpPr>
+          <p:nvPr/>
+        </p:nvCxnSpPr>
+        <p:spPr>
+          <a:xfrm flipH="1">
+            <a:off x="3742492" y="3588232"/>
+            <a:ext cx="1061280" cy="366280"/>
+          </a:xfrm>
+          <a:prstGeom prst="line">
+            <a:avLst/>
+          </a:prstGeom>
+          <a:ln w="9525">
+            <a:solidFill>
+              <a:schemeClr val="tx1"/>
+            </a:solidFill>
+            <a:prstDash val="dash"/>
+            <a:headEnd type="triangle" w="med" len="med"/>
+            <a:tailEnd type="triangle" w="med" len="med"/>
+          </a:ln>
+        </p:spPr>
+        <p:style>
+          <a:lnRef idx="1">
+            <a:schemeClr val="accent1"/>
+          </a:lnRef>
+          <a:fillRef idx="0">
+            <a:schemeClr val="accent1"/>
+          </a:fillRef>
+          <a:effectRef idx="0">
+            <a:schemeClr val="accent1"/>
+          </a:effectRef>
+          <a:fontRef idx="minor">
+            <a:schemeClr val="tx1"/>
+          </a:fontRef>
+        </p:style>
+      </p:cxnSp>
+      <p:cxnSp>
+        <p:nvCxnSpPr>
+          <p:cNvPr id="40" name="Straight Connector 39"/>
+          <p:cNvCxnSpPr>
+            <a:stCxn id="18" idx="2"/>
+            <a:endCxn id="23" idx="1"/>
+          </p:cNvCxnSpPr>
+          <p:nvPr/>
+        </p:nvCxnSpPr>
+        <p:spPr>
+          <a:xfrm flipH="1">
+            <a:off x="4779402" y="3588232"/>
+            <a:ext cx="24370" cy="366280"/>
+          </a:xfrm>
+          <a:prstGeom prst="line">
+            <a:avLst/>
+          </a:prstGeom>
+          <a:ln w="9525">
+            <a:solidFill>
+              <a:schemeClr val="tx1"/>
+            </a:solidFill>
+            <a:prstDash val="dash"/>
+            <a:headEnd type="triangle" w="med" len="med"/>
+            <a:tailEnd type="triangle" w="med" len="med"/>
+          </a:ln>
+        </p:spPr>
+        <p:style>
+          <a:lnRef idx="1">
+            <a:schemeClr val="accent1"/>
+          </a:lnRef>
+          <a:fillRef idx="0">
+            <a:schemeClr val="accent1"/>
+          </a:fillRef>
+          <a:effectRef idx="0">
+            <a:schemeClr val="accent1"/>
+          </a:effectRef>
+          <a:fontRef idx="minor">
+            <a:schemeClr val="tx1"/>
+          </a:fontRef>
+        </p:style>
+      </p:cxnSp>
+      <p:cxnSp>
+        <p:nvCxnSpPr>
+          <p:cNvPr id="42" name="Straight Arrow Connector 41"/>
+          <p:cNvCxnSpPr>
+            <a:stCxn id="25" idx="2"/>
+            <a:endCxn id="20" idx="0"/>
+          </p:cNvCxnSpPr>
+          <p:nvPr/>
+        </p:nvCxnSpPr>
+        <p:spPr>
+          <a:xfrm>
+            <a:off x="3196917" y="2279361"/>
+            <a:ext cx="0" cy="514796"/>
+          </a:xfrm>
+          <a:prstGeom prst="straightConnector1">
+            <a:avLst/>
+          </a:prstGeom>
+          <a:ln w="9525">
+            <a:solidFill>
+              <a:schemeClr val="tx1"/>
+            </a:solidFill>
+            <a:prstDash val="dash"/>
+            <a:headEnd type="triangle" w="med" len="med"/>
+            <a:tailEnd type="triangle" w="med" len="med"/>
+          </a:ln>
+        </p:spPr>
+        <p:style>
+          <a:lnRef idx="1">
+            <a:schemeClr val="accent1"/>
+          </a:lnRef>
+          <a:fillRef idx="0">
+            <a:schemeClr val="accent1"/>
+          </a:fillRef>
+          <a:effectRef idx="0">
+            <a:schemeClr val="accent1"/>
+          </a:effectRef>
+          <a:fontRef idx="minor">
+            <a:schemeClr val="tx1"/>
+          </a:fontRef>
+        </p:style>
+      </p:cxnSp>
+      <p:sp>
+        <p:nvSpPr>
+          <p:cNvPr id="43" name="Rectangle 42"/>
+          <p:cNvSpPr/>
+          <p:nvPr/>
+        </p:nvSpPr>
+        <p:spPr>
+          <a:xfrm>
+            <a:off x="2995167" y="3149607"/>
+            <a:ext cx="723175" cy="438625"/>
+          </a:xfrm>
+          <a:prstGeom prst="rect">
+            <a:avLst/>
+          </a:prstGeom>
+        </p:spPr>
+        <p:style>
+          <a:lnRef idx="2">
+            <a:schemeClr val="accent2"/>
+          </a:lnRef>
+          <a:fillRef idx="1">
+            <a:schemeClr val="lt1"/>
+          </a:fillRef>
+          <a:effectRef idx="0">
+            <a:schemeClr val="accent2"/>
+          </a:effectRef>
+          <a:fontRef idx="minor">
+            <a:schemeClr val="dk1"/>
+          </a:fontRef>
+        </p:style>
+        <p:txBody>
+          <a:bodyPr rtlCol="0" anchor="ctr"/>
+          <a:lstStyle/>
+          <a:p>
+            <a:pPr algn="ctr"/>
+            <a:r>
+              <a:rPr lang="en-US" sz="1000" dirty="0" err="1" smtClean="0">
+                <a:latin typeface="Times New Roman" panose="02020603050405020304" pitchFamily="18" charset="0"/>
+                <a:cs typeface="Times New Roman" panose="02020603050405020304" pitchFamily="18" charset="0"/>
+              </a:rPr>
+              <a:t>Inode</a:t>
+            </a:r>
+            <a:r>
+              <a:rPr lang="en-US" sz="1000" dirty="0" smtClean="0">
+                <a:latin typeface="Times New Roman" panose="02020603050405020304" pitchFamily="18" charset="0"/>
+                <a:cs typeface="Times New Roman" panose="02020603050405020304" pitchFamily="18" charset="0"/>
+              </a:rPr>
+              <a:t> blocks</a:t>
+            </a:r>
+            <a:endParaRPr lang="en-US" sz="1000" dirty="0">
+              <a:latin typeface="Times New Roman" panose="02020603050405020304" pitchFamily="18" charset="0"/>
+              <a:cs typeface="Times New Roman" panose="02020603050405020304" pitchFamily="18" charset="0"/>
+            </a:endParaRPr>
+          </a:p>
+        </p:txBody>
+      </p:sp>
+      <p:cxnSp>
+        <p:nvCxnSpPr>
+          <p:cNvPr id="92" name="Straight Arrow Connector 91"/>
+          <p:cNvCxnSpPr>
+            <a:stCxn id="43" idx="2"/>
+            <a:endCxn id="23" idx="1"/>
+          </p:cNvCxnSpPr>
+          <p:nvPr/>
+        </p:nvCxnSpPr>
+        <p:spPr>
+          <a:xfrm>
+            <a:off x="3356755" y="3588232"/>
+            <a:ext cx="1422647" cy="366280"/>
+          </a:xfrm>
+          <a:prstGeom prst="straightConnector1">
+            <a:avLst/>
+          </a:prstGeom>
+          <a:ln w="9525">
+            <a:solidFill>
+              <a:schemeClr val="tx1"/>
+            </a:solidFill>
+            <a:prstDash val="dash"/>
+            <a:headEnd type="triangle" w="med" len="med"/>
+            <a:tailEnd type="triangle" w="med" len="med"/>
+          </a:ln>
+        </p:spPr>
+        <p:style>
+          <a:lnRef idx="1">
+            <a:schemeClr val="accent1"/>
+          </a:lnRef>
+          <a:fillRef idx="0">
+            <a:schemeClr val="accent1"/>
+          </a:fillRef>
+          <a:effectRef idx="0">
+            <a:schemeClr val="accent1"/>
+          </a:effectRef>
+          <a:fontRef idx="minor">
+            <a:schemeClr val="tx1"/>
+          </a:fontRef>
+        </p:style>
+      </p:cxnSp>
+      <p:cxnSp>
+        <p:nvCxnSpPr>
+          <p:cNvPr id="27" name="Straight Arrow Connector 26"/>
+          <p:cNvCxnSpPr>
+            <a:stCxn id="19" idx="2"/>
+            <a:endCxn id="22" idx="1"/>
+          </p:cNvCxnSpPr>
+          <p:nvPr/>
+        </p:nvCxnSpPr>
+        <p:spPr>
+          <a:xfrm>
+            <a:off x="2578883" y="3588232"/>
+            <a:ext cx="1163609" cy="366280"/>
+          </a:xfrm>
+          <a:prstGeom prst="straightConnector1">
+            <a:avLst/>
+          </a:prstGeom>
+          <a:ln w="9525">
+            <a:solidFill>
+              <a:schemeClr val="tx1"/>
+            </a:solidFill>
+            <a:prstDash val="dash"/>
+            <a:headEnd type="triangle" w="med" len="med"/>
+            <a:tailEnd type="triangle" w="med" len="med"/>
+          </a:ln>
+        </p:spPr>
+        <p:style>
+          <a:lnRef idx="1">
+            <a:schemeClr val="accent1"/>
+          </a:lnRef>
+          <a:fillRef idx="0">
+            <a:schemeClr val="accent1"/>
+          </a:fillRef>
+          <a:effectRef idx="0">
+            <a:schemeClr val="accent1"/>
+          </a:effectRef>
+          <a:fontRef idx="minor">
+            <a:schemeClr val="tx1"/>
+          </a:fontRef>
+        </p:style>
+      </p:cxnSp>
+      <p:cxnSp>
+        <p:nvCxnSpPr>
+          <p:cNvPr id="32" name="Straight Arrow Connector 31"/>
+          <p:cNvCxnSpPr>
+            <a:endCxn id="22" idx="1"/>
+          </p:cNvCxnSpPr>
+          <p:nvPr/>
+        </p:nvCxnSpPr>
+        <p:spPr>
+          <a:xfrm>
+            <a:off x="3243932" y="3588232"/>
+            <a:ext cx="498560" cy="366280"/>
+          </a:xfrm>
+          <a:prstGeom prst="straightConnector1">
+            <a:avLst/>
+          </a:prstGeom>
+          <a:ln w="9525">
+            <a:solidFill>
+              <a:schemeClr val="tx1"/>
+            </a:solidFill>
+            <a:prstDash val="dash"/>
+            <a:headEnd type="triangle" w="med" len="med"/>
+            <a:tailEnd type="triangle" w="med" len="med"/>
+          </a:ln>
+        </p:spPr>
+        <p:style>
+          <a:lnRef idx="1">
+            <a:schemeClr val="accent1"/>
+          </a:lnRef>
+          <a:fillRef idx="0">
+            <a:schemeClr val="accent1"/>
+          </a:fillRef>
+          <a:effectRef idx="0">
+            <a:schemeClr val="accent1"/>
+          </a:effectRef>
+          <a:fontRef idx="minor">
+            <a:schemeClr val="tx1"/>
+          </a:fontRef>
+        </p:style>
+      </p:cxnSp>
+      <p:cxnSp>
+        <p:nvCxnSpPr>
+          <p:cNvPr id="35" name="Straight Arrow Connector 34"/>
+          <p:cNvCxnSpPr>
+            <a:endCxn id="22" idx="1"/>
+          </p:cNvCxnSpPr>
+          <p:nvPr/>
+        </p:nvCxnSpPr>
+        <p:spPr>
+          <a:xfrm flipH="1">
+            <a:off x="3742492" y="3588232"/>
+            <a:ext cx="155988" cy="366280"/>
+          </a:xfrm>
+          <a:prstGeom prst="straightConnector1">
+            <a:avLst/>
+          </a:prstGeom>
+          <a:ln w="9525">
+            <a:solidFill>
+              <a:schemeClr val="tx1"/>
+            </a:solidFill>
+            <a:prstDash val="dash"/>
+            <a:headEnd type="triangle" w="med" len="med"/>
+            <a:tailEnd type="triangle" w="med" len="med"/>
+          </a:ln>
+        </p:spPr>
+        <p:style>
+          <a:lnRef idx="1">
+            <a:schemeClr val="accent1"/>
+          </a:lnRef>
+          <a:fillRef idx="0">
+            <a:schemeClr val="accent1"/>
+          </a:fillRef>
+          <a:effectRef idx="0">
+            <a:schemeClr val="accent1"/>
+          </a:effectRef>
+          <a:fontRef idx="minor">
+            <a:schemeClr val="tx1"/>
+          </a:fontRef>
+        </p:style>
+      </p:cxnSp>
+      <p:sp>
+        <p:nvSpPr>
+          <p:cNvPr id="63" name="Rounded Rectangle 62"/>
+          <p:cNvSpPr/>
+          <p:nvPr/>
+        </p:nvSpPr>
+        <p:spPr>
+          <a:xfrm>
+            <a:off x="2227776" y="3999710"/>
+            <a:ext cx="914400" cy="395533"/>
+          </a:xfrm>
+          <a:prstGeom prst="roundRect">
+            <a:avLst>
+              <a:gd name="adj" fmla="val 7702"/>
+            </a:avLst>
+          </a:prstGeom>
+        </p:spPr>
+        <p:style>
+          <a:lnRef idx="1">
+            <a:schemeClr val="accent2"/>
+          </a:lnRef>
+          <a:fillRef idx="2">
+            <a:schemeClr val="accent2"/>
+          </a:fillRef>
+          <a:effectRef idx="1">
+            <a:schemeClr val="accent2"/>
+          </a:effectRef>
+          <a:fontRef idx="minor">
+            <a:schemeClr val="dk1"/>
+          </a:fontRef>
+        </p:style>
+        <p:txBody>
+          <a:bodyPr rtlCol="0" anchor="ctr"/>
+          <a:lstStyle/>
+          <a:p>
+            <a:pPr algn="ctr"/>
+            <a:r>
+              <a:rPr lang="en-US" sz="1000" dirty="0">
+                <a:solidFill>
+                  <a:schemeClr val="dk1"/>
+                </a:solidFill>
+                <a:latin typeface="Times New Roman" panose="02020603050405020304" pitchFamily="18" charset="0"/>
+                <a:cs typeface="Times New Roman" panose="02020603050405020304" pitchFamily="18" charset="0"/>
+              </a:rPr>
+              <a:t>pub-sub channels</a:t>
+            </a:r>
+          </a:p>
+        </p:txBody>
+      </p:sp>
+      <p:cxnSp>
+        <p:nvCxnSpPr>
+          <p:cNvPr id="65" name="Straight Arrow Connector 64"/>
+          <p:cNvCxnSpPr>
+            <a:stCxn id="19" idx="2"/>
+            <a:endCxn id="63" idx="0"/>
+          </p:cNvCxnSpPr>
+          <p:nvPr/>
+        </p:nvCxnSpPr>
+        <p:spPr>
+          <a:xfrm>
+            <a:off x="2578883" y="3588232"/>
+            <a:ext cx="106093" cy="411478"/>
+          </a:xfrm>
+          <a:prstGeom prst="straightConnector1">
+            <a:avLst/>
+          </a:prstGeom>
+          <a:ln w="9525">
+            <a:solidFill>
+              <a:schemeClr val="tx1"/>
+            </a:solidFill>
+            <a:prstDash val="dash"/>
+            <a:headEnd type="triangle" w="med" len="med"/>
+            <a:tailEnd type="triangle" w="med" len="med"/>
+          </a:ln>
+        </p:spPr>
+        <p:style>
+          <a:lnRef idx="1">
+            <a:schemeClr val="accent1"/>
+          </a:lnRef>
+          <a:fillRef idx="0">
+            <a:schemeClr val="accent1"/>
+          </a:fillRef>
+          <a:effectRef idx="0">
+            <a:schemeClr val="accent1"/>
+          </a:effectRef>
+          <a:fontRef idx="minor">
+            <a:schemeClr val="tx1"/>
+          </a:fontRef>
+        </p:style>
+      </p:cxnSp>
+      <p:cxnSp>
+        <p:nvCxnSpPr>
+          <p:cNvPr id="67" name="Straight Arrow Connector 66"/>
+          <p:cNvCxnSpPr>
+            <a:stCxn id="43" idx="2"/>
+            <a:endCxn id="63" idx="0"/>
+          </p:cNvCxnSpPr>
+          <p:nvPr/>
+        </p:nvCxnSpPr>
+        <p:spPr>
+          <a:xfrm flipH="1">
+            <a:off x="2684976" y="3588232"/>
+            <a:ext cx="671779" cy="411478"/>
+          </a:xfrm>
+          <a:prstGeom prst="straightConnector1">
+            <a:avLst/>
+          </a:prstGeom>
+          <a:ln w="9525">
+            <a:solidFill>
+              <a:schemeClr val="tx1"/>
+            </a:solidFill>
+            <a:prstDash val="dash"/>
+            <a:headEnd type="triangle" w="med" len="med"/>
+            <a:tailEnd type="triangle" w="med" len="med"/>
+          </a:ln>
+        </p:spPr>
+        <p:style>
+          <a:lnRef idx="1">
+            <a:schemeClr val="accent1"/>
+          </a:lnRef>
+          <a:fillRef idx="0">
+            <a:schemeClr val="accent1"/>
+          </a:fillRef>
+          <a:effectRef idx="0">
+            <a:schemeClr val="accent1"/>
+          </a:effectRef>
+          <a:fontRef idx="minor">
+            <a:schemeClr val="tx1"/>
+          </a:fontRef>
+        </p:style>
+      </p:cxnSp>
     </p:spTree>
     <p:extLst>
       <p:ext uri="{BB962C8B-B14F-4D97-AF65-F5344CB8AC3E}">

</xml_diff>